<commit_message>
Addressed mrshirts comments to fix KNN classifier output graph
</commit_message>
<xml_diff>
--- a/Wi19_content/DSMCER/L8_SubsetRegularization.pptx
+++ b/Wi19_content/DSMCER/L8_SubsetRegularization.pptx
@@ -251,7 +251,7 @@
           <a:p>
             <a:fld id="{BBEA69A4-43A8-4442-8088-0B845332DB30}" type="datetimeFigureOut">
               <a:rPr lang="en-US" smtClean="0"/>
-              <a:t>2/19/18</a:t>
+              <a:t>2/13/2019</a:t>
             </a:fld>
             <a:endParaRPr lang="en-US"/>
           </a:p>
@@ -315,38 +315,37 @@
           <a:p>
             <a:pPr lvl="0"/>
             <a:r>
-              <a:rPr lang="en-US" smtClean="0"/>
+              <a:rPr lang="en-US"/>
               <a:t>Click to edit Master text styles</a:t>
             </a:r>
           </a:p>
           <a:p>
             <a:pPr lvl="1"/>
             <a:r>
-              <a:rPr lang="en-US" smtClean="0"/>
+              <a:rPr lang="en-US"/>
               <a:t>Second level</a:t>
             </a:r>
           </a:p>
           <a:p>
             <a:pPr lvl="2"/>
             <a:r>
-              <a:rPr lang="en-US" smtClean="0"/>
+              <a:rPr lang="en-US"/>
               <a:t>Third level</a:t>
             </a:r>
           </a:p>
           <a:p>
             <a:pPr lvl="3"/>
             <a:r>
-              <a:rPr lang="en-US" smtClean="0"/>
+              <a:rPr lang="en-US"/>
               <a:t>Fourth level</a:t>
             </a:r>
           </a:p>
           <a:p>
             <a:pPr lvl="4"/>
             <a:r>
-              <a:rPr lang="en-US" smtClean="0"/>
+              <a:rPr lang="en-US"/>
               <a:t>Fifth level</a:t>
             </a:r>
-            <a:endParaRPr lang="en-US"/>
           </a:p>
         </p:txBody>
       </p:sp>
@@ -732,10 +731,9 @@
           <a:lstStyle/>
           <a:p>
             <a:r>
-              <a:rPr lang="en-US" dirty="0" smtClean="0"/>
+              <a:rPr lang="en-US" dirty="0"/>
               <a:t>Work through explanation and take some notes here! </a:t>
             </a:r>
-            <a:endParaRPr lang="en-US" dirty="0"/>
           </a:p>
         </p:txBody>
       </p:sp>
@@ -935,24 +933,23 @@
           <a:p>
             <a:pPr lvl="0"/>
             <a:r>
-              <a:rPr lang="en-US" dirty="0" smtClean="0"/>
+              <a:rPr lang="en-US" dirty="0"/>
               <a:t>TITLE HERE</a:t>
             </a:r>
           </a:p>
           <a:p>
             <a:pPr lvl="0"/>
             <a:r>
-              <a:rPr lang="en-US" dirty="0" smtClean="0"/>
+              <a:rPr lang="en-US" dirty="0"/>
               <a:t>ENCODE NORMAL</a:t>
             </a:r>
           </a:p>
           <a:p>
             <a:pPr lvl="0"/>
             <a:r>
-              <a:rPr lang="en-US" dirty="0" smtClean="0"/>
+              <a:rPr lang="en-US" dirty="0"/>
               <a:t>BLACK, 50 PT. </a:t>
             </a:r>
-            <a:endParaRPr lang="en-US" dirty="0"/>
           </a:p>
         </p:txBody>
       </p:sp>
@@ -1097,17 +1094,16 @@
           <a:p>
             <a:pPr lvl="0"/>
             <a:r>
-              <a:rPr lang="en-US" dirty="0" smtClean="0"/>
+              <a:rPr lang="en-US" dirty="0"/>
               <a:t>HEADER HERE </a:t>
             </a:r>
           </a:p>
           <a:p>
             <a:pPr lvl="0"/>
             <a:r>
-              <a:rPr lang="en-US" dirty="0" smtClean="0"/>
+              <a:rPr lang="en-US" dirty="0"/>
               <a:t>(ENCODE NORMAL BLACK, 30 PT.)</a:t>
             </a:r>
-            <a:endParaRPr lang="en-US" dirty="0"/>
           </a:p>
         </p:txBody>
       </p:sp>
@@ -1189,38 +1185,37 @@
           <a:p>
             <a:pPr lvl="0"/>
             <a:r>
-              <a:rPr lang="en-US" dirty="0" smtClean="0"/>
+              <a:rPr lang="en-US" dirty="0"/>
               <a:t>Content here (Open Sans Bold, 24 pt.)</a:t>
             </a:r>
           </a:p>
           <a:p>
             <a:pPr lvl="1"/>
             <a:r>
-              <a:rPr lang="en-US" dirty="0" smtClean="0"/>
+              <a:rPr lang="en-US" dirty="0"/>
               <a:t>Second level (Open Sans Bold, 20)</a:t>
             </a:r>
           </a:p>
           <a:p>
             <a:pPr lvl="2"/>
             <a:r>
-              <a:rPr lang="en-US" dirty="0" smtClean="0"/>
+              <a:rPr lang="en-US" dirty="0"/>
               <a:t>Third level (Open Sans Bold, 18)</a:t>
             </a:r>
           </a:p>
           <a:p>
             <a:pPr lvl="3"/>
             <a:r>
-              <a:rPr lang="en-US" dirty="0" smtClean="0"/>
+              <a:rPr lang="en-US" dirty="0"/>
               <a:t>Fourth level (Open Sans Bold, 16)</a:t>
             </a:r>
           </a:p>
           <a:p>
             <a:pPr lvl="4"/>
             <a:r>
-              <a:rPr lang="en-US" dirty="0" smtClean="0"/>
+              <a:rPr lang="en-US" dirty="0"/>
               <a:t>Fifth level (Open Sans Bold, 14)</a:t>
             </a:r>
-            <a:endParaRPr lang="en-US" dirty="0"/>
           </a:p>
         </p:txBody>
       </p:sp>
@@ -1305,10 +1300,9 @@
           <a:p>
             <a:pPr lvl="0"/>
             <a:r>
-              <a:rPr lang="en-US" dirty="0" smtClean="0"/>
+              <a:rPr lang="en-US" dirty="0"/>
               <a:t>SUB-HEADER HERE (UNI SANS REGULAR	, 24 PT.)</a:t>
             </a:r>
-            <a:endParaRPr lang="en-US" dirty="0"/>
           </a:p>
         </p:txBody>
       </p:sp>
@@ -1515,17 +1509,16 @@
           <a:p>
             <a:pPr lvl="0"/>
             <a:r>
-              <a:rPr lang="en-US" dirty="0" smtClean="0"/>
+              <a:rPr lang="en-US" dirty="0"/>
               <a:t>HEADER HERE </a:t>
             </a:r>
           </a:p>
           <a:p>
             <a:pPr lvl="0"/>
             <a:r>
-              <a:rPr lang="en-US" dirty="0" smtClean="0"/>
+              <a:rPr lang="en-US" dirty="0"/>
               <a:t>(ENCODE NORMAL BLACK, 30 PT.)</a:t>
             </a:r>
-            <a:endParaRPr lang="en-US" dirty="0"/>
           </a:p>
         </p:txBody>
       </p:sp>
@@ -1607,38 +1600,37 @@
           <a:p>
             <a:pPr lvl="0"/>
             <a:r>
-              <a:rPr lang="en-US" dirty="0" smtClean="0"/>
+              <a:rPr lang="en-US" dirty="0"/>
               <a:t>Bulleted content here (Open Sans Light, 24 pt.)</a:t>
             </a:r>
           </a:p>
           <a:p>
             <a:pPr lvl="1"/>
             <a:r>
-              <a:rPr lang="en-US" dirty="0" smtClean="0"/>
+              <a:rPr lang="en-US" dirty="0"/>
               <a:t>Second level (Open Sans Light, 20)</a:t>
             </a:r>
           </a:p>
           <a:p>
             <a:pPr lvl="2"/>
             <a:r>
-              <a:rPr lang="en-US" dirty="0" smtClean="0"/>
+              <a:rPr lang="en-US" dirty="0"/>
               <a:t>Third level (Open Sans Light, 18)</a:t>
             </a:r>
           </a:p>
           <a:p>
             <a:pPr lvl="3"/>
             <a:r>
-              <a:rPr lang="en-US" dirty="0" smtClean="0"/>
+              <a:rPr lang="en-US" dirty="0"/>
               <a:t>Fourth level (Open Sans Light, 16)</a:t>
             </a:r>
           </a:p>
           <a:p>
             <a:pPr lvl="4"/>
             <a:r>
-              <a:rPr lang="en-US" dirty="0" smtClean="0"/>
+              <a:rPr lang="en-US" dirty="0"/>
               <a:t>Fifth level (Open Sans Light, 14)</a:t>
             </a:r>
-            <a:endParaRPr lang="en-US" dirty="0"/>
           </a:p>
         </p:txBody>
       </p:sp>
@@ -1771,17 +1763,16 @@
           </a:lstStyle>
           <a:p>
             <a:r>
-              <a:rPr lang="en-US" dirty="0" smtClean="0"/>
+              <a:rPr lang="en-US" dirty="0"/>
               <a:t>Graphics can go here – </a:t>
             </a:r>
             <a:br>
-              <a:rPr lang="en-US" dirty="0" smtClean="0"/>
+              <a:rPr lang="en-US" dirty="0"/>
             </a:br>
             <a:r>
-              <a:rPr lang="en-US" dirty="0" smtClean="0"/>
+              <a:rPr lang="en-US" dirty="0"/>
               <a:t>replace this box with your image or chart</a:t>
             </a:r>
-            <a:endParaRPr lang="en-US" dirty="0"/>
           </a:p>
         </p:txBody>
       </p:sp>
@@ -1866,17 +1857,16 @@
           <a:p>
             <a:pPr lvl="0"/>
             <a:r>
-              <a:rPr lang="en-US" dirty="0" smtClean="0"/>
+              <a:rPr lang="en-US" dirty="0"/>
               <a:t>HEADER HERE </a:t>
             </a:r>
           </a:p>
           <a:p>
             <a:pPr lvl="0"/>
             <a:r>
-              <a:rPr lang="en-US" dirty="0" smtClean="0"/>
+              <a:rPr lang="en-US" dirty="0"/>
               <a:t>(ENCODE NORMAL BLACK, 30 PT.)</a:t>
             </a:r>
-            <a:endParaRPr lang="en-US" dirty="0"/>
           </a:p>
         </p:txBody>
       </p:sp>
@@ -2021,24 +2011,23 @@
           <a:p>
             <a:pPr lvl="0"/>
             <a:r>
-              <a:rPr lang="en-US" dirty="0" smtClean="0"/>
+              <a:rPr lang="en-US" dirty="0"/>
               <a:t>TITLE HERE</a:t>
             </a:r>
           </a:p>
           <a:p>
             <a:pPr lvl="0"/>
             <a:r>
-              <a:rPr lang="en-US" dirty="0" smtClean="0"/>
+              <a:rPr lang="en-US" dirty="0"/>
               <a:t>ENCODE NORMAL</a:t>
             </a:r>
           </a:p>
           <a:p>
             <a:pPr lvl="0"/>
             <a:r>
-              <a:rPr lang="en-US" dirty="0" smtClean="0"/>
+              <a:rPr lang="en-US" dirty="0"/>
               <a:t>BLACK, 50 PT. </a:t>
             </a:r>
-            <a:endParaRPr lang="en-US" dirty="0"/>
           </a:p>
         </p:txBody>
       </p:sp>
@@ -2243,17 +2232,16 @@
           <a:p>
             <a:pPr lvl="0"/>
             <a:r>
-              <a:rPr lang="en-US" dirty="0" smtClean="0"/>
+              <a:rPr lang="en-US" dirty="0"/>
               <a:t>HEADER HERE </a:t>
             </a:r>
           </a:p>
           <a:p>
             <a:pPr lvl="0"/>
             <a:r>
-              <a:rPr lang="en-US" dirty="0" smtClean="0"/>
+              <a:rPr lang="en-US" dirty="0"/>
               <a:t>(ENCODE NORMAL BLACK, 30 PT.)</a:t>
             </a:r>
-            <a:endParaRPr lang="en-US" dirty="0"/>
           </a:p>
         </p:txBody>
       </p:sp>
@@ -2335,38 +2323,37 @@
           <a:p>
             <a:pPr lvl="0"/>
             <a:r>
-              <a:rPr lang="en-US" dirty="0" smtClean="0"/>
+              <a:rPr lang="en-US" dirty="0"/>
               <a:t>Content here (Open Sans Bold, 24 pt.)</a:t>
             </a:r>
           </a:p>
           <a:p>
             <a:pPr lvl="1"/>
             <a:r>
-              <a:rPr lang="en-US" dirty="0" smtClean="0"/>
+              <a:rPr lang="en-US" dirty="0"/>
               <a:t>Second level (Open Sans Bold, 20)</a:t>
             </a:r>
           </a:p>
           <a:p>
             <a:pPr lvl="2"/>
             <a:r>
-              <a:rPr lang="en-US" dirty="0" smtClean="0"/>
+              <a:rPr lang="en-US" dirty="0"/>
               <a:t>Third level (Open Sans Bold, 18)</a:t>
             </a:r>
           </a:p>
           <a:p>
             <a:pPr lvl="3"/>
             <a:r>
-              <a:rPr lang="en-US" dirty="0" smtClean="0"/>
+              <a:rPr lang="en-US" dirty="0"/>
               <a:t>Fourth level (Open Sans Bold, 16)</a:t>
             </a:r>
           </a:p>
           <a:p>
             <a:pPr lvl="4"/>
             <a:r>
-              <a:rPr lang="en-US" dirty="0" smtClean="0"/>
+              <a:rPr lang="en-US" dirty="0"/>
               <a:t>Fifth level (Open Sans Bold, 14)</a:t>
             </a:r>
-            <a:endParaRPr lang="en-US" dirty="0"/>
           </a:p>
         </p:txBody>
       </p:sp>
@@ -2451,10 +2438,9 @@
           <a:p>
             <a:pPr lvl="0"/>
             <a:r>
-              <a:rPr lang="en-US" dirty="0" smtClean="0"/>
+              <a:rPr lang="en-US" dirty="0"/>
               <a:t>SUB-HEADER HERE (UNI SANS LIGHT, 24 PT.)</a:t>
             </a:r>
-            <a:endParaRPr lang="en-US" dirty="0"/>
           </a:p>
         </p:txBody>
       </p:sp>
@@ -2629,17 +2615,16 @@
           <a:p>
             <a:pPr lvl="0"/>
             <a:r>
-              <a:rPr lang="en-US" dirty="0" smtClean="0"/>
+              <a:rPr lang="en-US" dirty="0"/>
               <a:t>HEADER HERE </a:t>
             </a:r>
           </a:p>
           <a:p>
             <a:pPr lvl="0"/>
             <a:r>
-              <a:rPr lang="en-US" dirty="0" smtClean="0"/>
+              <a:rPr lang="en-US" dirty="0"/>
               <a:t>(ENCODE NORMAL BLACK, 30 PT.)</a:t>
             </a:r>
-            <a:endParaRPr lang="en-US" dirty="0"/>
           </a:p>
         </p:txBody>
       </p:sp>
@@ -2721,38 +2706,37 @@
           <a:p>
             <a:pPr lvl="0"/>
             <a:r>
-              <a:rPr lang="en-US" dirty="0" smtClean="0"/>
+              <a:rPr lang="en-US" dirty="0"/>
               <a:t>Content here (Open Sans Bold, 24 pt.)</a:t>
             </a:r>
           </a:p>
           <a:p>
             <a:pPr lvl="1"/>
             <a:r>
-              <a:rPr lang="en-US" dirty="0" smtClean="0"/>
+              <a:rPr lang="en-US" dirty="0"/>
               <a:t>Second level (Open Sans Bold, 20)</a:t>
             </a:r>
           </a:p>
           <a:p>
             <a:pPr lvl="2"/>
             <a:r>
-              <a:rPr lang="en-US" dirty="0" smtClean="0"/>
+              <a:rPr lang="en-US" dirty="0"/>
               <a:t>Third level (Open Sans Bold, 18)</a:t>
             </a:r>
           </a:p>
           <a:p>
             <a:pPr lvl="3"/>
             <a:r>
-              <a:rPr lang="en-US" dirty="0" smtClean="0"/>
+              <a:rPr lang="en-US" dirty="0"/>
               <a:t>Fourth level (Open Sans Bold, 16)</a:t>
             </a:r>
           </a:p>
           <a:p>
             <a:pPr lvl="4"/>
             <a:r>
-              <a:rPr lang="en-US" dirty="0" smtClean="0"/>
+              <a:rPr lang="en-US" dirty="0"/>
               <a:t>Fifth level (Open Sans Bold, 14)</a:t>
             </a:r>
-            <a:endParaRPr lang="en-US" dirty="0"/>
           </a:p>
         </p:txBody>
       </p:sp>
@@ -2883,17 +2867,16 @@
           </a:lstStyle>
           <a:p>
             <a:r>
-              <a:rPr lang="en-US" dirty="0" smtClean="0"/>
+              <a:rPr lang="en-US" dirty="0"/>
               <a:t>Graphics can go here – </a:t>
             </a:r>
             <a:br>
-              <a:rPr lang="en-US" dirty="0" smtClean="0"/>
+              <a:rPr lang="en-US" dirty="0"/>
             </a:br>
             <a:r>
-              <a:rPr lang="en-US" dirty="0" smtClean="0"/>
+              <a:rPr lang="en-US" dirty="0"/>
               <a:t>replace this box with your image or chart</a:t>
             </a:r>
-            <a:endParaRPr lang="en-US" dirty="0"/>
           </a:p>
         </p:txBody>
       </p:sp>
@@ -2978,17 +2961,16 @@
           <a:p>
             <a:pPr lvl="0"/>
             <a:r>
-              <a:rPr lang="en-US" dirty="0" smtClean="0"/>
+              <a:rPr lang="en-US" dirty="0"/>
               <a:t>HEADER HERE </a:t>
             </a:r>
           </a:p>
           <a:p>
             <a:pPr lvl="0"/>
             <a:r>
-              <a:rPr lang="en-US" dirty="0" smtClean="0"/>
+              <a:rPr lang="en-US" dirty="0"/>
               <a:t>(ENCODE NORMAL BLACK, 30 PT.)</a:t>
             </a:r>
-            <a:endParaRPr lang="en-US" dirty="0"/>
           </a:p>
         </p:txBody>
       </p:sp>
@@ -3679,10 +3661,9 @@
           <a:lstStyle/>
           <a:p>
             <a:r>
-              <a:rPr lang="en-US" dirty="0" smtClean="0"/>
+              <a:rPr lang="en-US" dirty="0"/>
               <a:t>Data Science Methods for Clean Energy Research </a:t>
             </a:r>
-            <a:endParaRPr lang="en-US" dirty="0"/>
           </a:p>
         </p:txBody>
       </p:sp>
@@ -3712,29 +3693,18 @@
               <a:buAutoNum type="arabicParenR"/>
             </a:pPr>
             <a:r>
-              <a:rPr lang="en-US" dirty="0" smtClean="0"/>
-              <a:t>k-fold </a:t>
-            </a:r>
-            <a:r>
-              <a:rPr lang="en-US" dirty="0" smtClean="0"/>
-              <a:t>cross validation + finish </a:t>
-            </a:r>
-            <a:r>
-              <a:rPr lang="en-US" dirty="0" smtClean="0"/>
-              <a:t>resampling</a:t>
-            </a:r>
+              <a:rPr lang="en-US"/>
+              <a:t>k-fold cross validation</a:t>
+            </a:r>
+            <a:endParaRPr lang="en-US" dirty="0"/>
           </a:p>
           <a:p>
             <a:pPr marL="342900" indent="-342900">
               <a:buAutoNum type="arabicParenR"/>
             </a:pPr>
             <a:r>
-              <a:rPr lang="en-US" dirty="0" smtClean="0"/>
-              <a:t>model </a:t>
-            </a:r>
-            <a:r>
-              <a:rPr lang="en-US" dirty="0" smtClean="0"/>
-              <a:t>selection and regularization </a:t>
+              <a:rPr lang="en-US" dirty="0"/>
+              <a:t>model selection and regularization </a:t>
             </a:r>
           </a:p>
           <a:p>
@@ -3742,81 +3712,12 @@
           </a:p>
           <a:p>
             <a:r>
-              <a:rPr lang="en-US" dirty="0" smtClean="0"/>
-              <a:t>Feb </a:t>
-            </a:r>
-            <a:r>
-              <a:rPr lang="en-US" dirty="0" smtClean="0"/>
-              <a:t>20, </a:t>
-            </a:r>
-            <a:r>
-              <a:rPr lang="en-US" dirty="0" smtClean="0"/>
-              <a:t>2017 </a:t>
-            </a:r>
-            <a:endParaRPr lang="en-US" dirty="0"/>
-          </a:p>
-        </p:txBody>
-      </p:sp>
-      <p:pic>
-        <p:nvPicPr>
-          <p:cNvPr id="4" name="Picture 3"/>
-          <p:cNvPicPr>
-            <a:picLocks noChangeAspect="1"/>
-          </p:cNvPicPr>
-          <p:nvPr/>
-        </p:nvPicPr>
-        <p:blipFill>
-          <a:blip r:embed="rId2">
-            <a:extLst>
-              <a:ext uri="{28A0092B-C50C-407E-A947-70E740481C1C}">
-                <a14:useLocalDpi xmlns:a14="http://schemas.microsoft.com/office/drawing/2010/main" val="0"/>
-              </a:ext>
-            </a:extLst>
-          </a:blip>
-          <a:stretch>
-            <a:fillRect/>
-          </a:stretch>
-        </p:blipFill>
-        <p:spPr>
-          <a:xfrm flipH="1">
-            <a:off x="6520338" y="4098787"/>
-            <a:ext cx="2623662" cy="2759213"/>
-          </a:xfrm>
-          <a:prstGeom prst="rect">
-            <a:avLst/>
-          </a:prstGeom>
-        </p:spPr>
-      </p:pic>
-      <p:sp>
-        <p:nvSpPr>
-          <p:cNvPr id="5" name="TextBox 4"/>
-          <p:cNvSpPr txBox="1"/>
-          <p:nvPr/>
-        </p:nvSpPr>
-        <p:spPr>
-          <a:xfrm>
-            <a:off x="4333731" y="5934670"/>
-            <a:ext cx="2077010" cy="923330"/>
-          </a:xfrm>
-          <a:prstGeom prst="rect">
-            <a:avLst/>
-          </a:prstGeom>
-          <a:noFill/>
-        </p:spPr>
-        <p:txBody>
-          <a:bodyPr wrap="square" rtlCol="0">
-            <a:spAutoFit/>
-          </a:bodyPr>
-          <a:lstStyle/>
-          <a:p>
-            <a:pPr algn="r"/>
-            <a:r>
-              <a:rPr lang="en-US" dirty="0" smtClean="0"/>
-              <a:t>This is not my dog, but he is a really good dog</a:t>
-            </a:r>
-            <a:r>
-              <a:rPr lang="mr-IN" dirty="0" smtClean="0"/>
-              <a:t>…</a:t>
+              <a:rPr lang="en-US" dirty="0"/>
+              <a:t>Feb 20</a:t>
+            </a:r>
+            <a:r>
+              <a:rPr lang="en-US"/>
+              <a:t>, 2019</a:t>
             </a:r>
             <a:endParaRPr lang="en-US" dirty="0"/>
           </a:p>
@@ -3832,13 +3733,6 @@
   <p:clrMapOvr>
     <a:masterClrMapping/>
   </p:clrMapOvr>
-  <p:timing>
-    <p:tnLst>
-      <p:par>
-        <p:cTn id="1" dur="indefinite" restart="never" nodeType="tmRoot"/>
-      </p:par>
-    </p:tnLst>
-  </p:timing>
 </p:sld>
 </file>
 
@@ -3875,10 +3769,9 @@
           <a:lstStyle/>
           <a:p>
             <a:r>
-              <a:rPr lang="en-US" dirty="0" smtClean="0"/>
+              <a:rPr lang="en-US" dirty="0"/>
               <a:t>Bias/variance tradeoff: use 5 or 10 folds</a:t>
             </a:r>
-            <a:endParaRPr lang="en-US" dirty="0"/>
           </a:p>
         </p:txBody>
       </p:sp>
@@ -3898,30 +3791,24 @@
           <a:lstStyle/>
           <a:p>
             <a:r>
-              <a:rPr lang="en-US" dirty="0" smtClean="0"/>
-              <a:t>Empirically </a:t>
-            </a:r>
-            <a:r>
-              <a:rPr lang="en-US" dirty="0" smtClean="0"/>
-              <a:t>people usually use 5 or 10 folds to avoid too much bias or variance in their resampling algorithm </a:t>
-            </a:r>
-          </a:p>
-          <a:p>
-            <a:r>
-              <a:rPr lang="en-US" dirty="0" smtClean="0"/>
+              <a:rPr lang="en-US" dirty="0"/>
+              <a:t>Empirically people usually use 5 or 10 folds to avoid too much bias or variance in their resampling algorithm </a:t>
+            </a:r>
+          </a:p>
+          <a:p>
+            <a:r>
+              <a:rPr lang="en-US" dirty="0"/>
               <a:t>This is a great way to get a true estimate of your model’s MSE </a:t>
             </a:r>
-            <a:endParaRPr lang="en-US" dirty="0" smtClean="0"/>
           </a:p>
           <a:p>
             <a:endParaRPr lang="en-US" dirty="0"/>
           </a:p>
           <a:p>
             <a:r>
-              <a:rPr lang="en-US" dirty="0" smtClean="0"/>
+              <a:rPr lang="en-US" dirty="0"/>
               <a:t>CV does not yield a new estimate, but evaluates the model itself</a:t>
             </a:r>
-            <a:endParaRPr lang="en-US" dirty="0"/>
           </a:p>
         </p:txBody>
       </p:sp>
@@ -3972,10 +3859,9 @@
           <a:lstStyle/>
           <a:p>
             <a:r>
-              <a:rPr lang="en-US" dirty="0" smtClean="0"/>
+              <a:rPr lang="en-US" dirty="0"/>
               <a:t>Fig 5.6 revisits Fig 2.9 in the context of k-fold cross validation  </a:t>
             </a:r>
-            <a:endParaRPr lang="en-US" dirty="0"/>
           </a:p>
         </p:txBody>
       </p:sp>
@@ -3989,13 +3875,6 @@
   <p:clrMapOvr>
     <a:masterClrMapping/>
   </p:clrMapOvr>
-  <p:timing>
-    <p:tnLst>
-      <p:par>
-        <p:cTn id="1" dur="indefinite" restart="never" nodeType="tmRoot"/>
-      </p:par>
-    </p:tnLst>
-  </p:timing>
 </p:sld>
 </file>
 
@@ -4032,10 +3911,9 @@
           <a:lstStyle/>
           <a:p>
             <a:r>
-              <a:rPr lang="en-US" dirty="0" smtClean="0"/>
+              <a:rPr lang="en-US" dirty="0"/>
               <a:t>Bootstrap</a:t>
             </a:r>
-            <a:endParaRPr lang="en-US" dirty="0"/>
           </a:p>
         </p:txBody>
       </p:sp>
@@ -4055,51 +3933,50 @@
           <a:lstStyle/>
           <a:p>
             <a:r>
-              <a:rPr lang="en-US" dirty="0" smtClean="0"/>
+              <a:rPr lang="en-US" dirty="0"/>
               <a:t>The bootstrap is one of the most versatile tools you will use in statistical analysis of data sets </a:t>
             </a:r>
           </a:p>
           <a:p>
             <a:r>
-              <a:rPr lang="en-US" dirty="0" smtClean="0"/>
+              <a:rPr lang="en-US" dirty="0"/>
               <a:t>It involves resampling </a:t>
             </a:r>
             <a:r>
-              <a:rPr lang="en-US" b="0" dirty="0" smtClean="0"/>
+              <a:rPr lang="en-US" b="0" dirty="0"/>
               <a:t>with replacement</a:t>
             </a:r>
             <a:r>
-              <a:rPr lang="en-US" dirty="0" smtClean="0"/>
+              <a:rPr lang="en-US" dirty="0"/>
               <a:t> from your data set </a:t>
             </a:r>
           </a:p>
           <a:p>
             <a:r>
-              <a:rPr lang="en-US" dirty="0" smtClean="0"/>
+              <a:rPr lang="en-US" dirty="0"/>
               <a:t>Algorithm: </a:t>
             </a:r>
           </a:p>
           <a:p>
             <a:pPr lvl="1"/>
             <a:r>
-              <a:rPr lang="en-US" dirty="0" smtClean="0"/>
+              <a:rPr lang="en-US" dirty="0"/>
               <a:t>Randomly draw, with replacement, some subset from your training data </a:t>
             </a:r>
           </a:p>
           <a:p>
             <a:pPr lvl="1"/>
             <a:r>
-              <a:rPr lang="en-US" dirty="0" smtClean="0"/>
+              <a:rPr lang="en-US" dirty="0"/>
               <a:t>Train your model and make an estimate of your coefficient and MSE </a:t>
             </a:r>
           </a:p>
           <a:p>
             <a:pPr lvl="1"/>
             <a:r>
-              <a:rPr lang="en-US" dirty="0" smtClean="0"/>
+              <a:rPr lang="en-US" dirty="0"/>
               <a:t>Rinse and repeat until the errors converge </a:t>
             </a:r>
-            <a:endParaRPr lang="en-US" dirty="0"/>
           </a:p>
         </p:txBody>
       </p:sp>
@@ -4113,13 +3990,6 @@
   <p:clrMapOvr>
     <a:masterClrMapping/>
   </p:clrMapOvr>
-  <p:timing>
-    <p:tnLst>
-      <p:par>
-        <p:cTn id="1" dur="indefinite" restart="never" nodeType="tmRoot"/>
-      </p:par>
-    </p:tnLst>
-  </p:timing>
 </p:sld>
 </file>
 
@@ -4156,10 +4026,9 @@
           <a:lstStyle/>
           <a:p>
             <a:r>
-              <a:rPr lang="en-US" dirty="0" smtClean="0"/>
+              <a:rPr lang="en-US" dirty="0"/>
               <a:t>Bootstrap</a:t>
             </a:r>
-            <a:endParaRPr lang="en-US" dirty="0"/>
           </a:p>
         </p:txBody>
       </p:sp>
@@ -4179,35 +4048,35 @@
           <a:lstStyle/>
           <a:p>
             <a:r>
-              <a:rPr lang="en-US" dirty="0" smtClean="0"/>
+              <a:rPr lang="en-US" dirty="0"/>
               <a:t>Estimate variance and confidence intervals of </a:t>
             </a:r>
           </a:p>
           <a:p>
             <a:pPr lvl="1"/>
             <a:r>
-              <a:rPr lang="en-US" dirty="0" smtClean="0"/>
+              <a:rPr lang="en-US" dirty="0"/>
               <a:t>Your predictions</a:t>
             </a:r>
           </a:p>
           <a:p>
             <a:pPr lvl="1"/>
             <a:r>
-              <a:rPr lang="en-US" dirty="0" smtClean="0"/>
+              <a:rPr lang="en-US" dirty="0"/>
               <a:t>Your coefficients</a:t>
             </a:r>
           </a:p>
           <a:p>
             <a:pPr lvl="1"/>
             <a:r>
-              <a:rPr lang="en-US" dirty="0" smtClean="0"/>
+              <a:rPr lang="en-US" dirty="0"/>
               <a:t>Your </a:t>
             </a:r>
             <a:r>
-              <a:rPr lang="mr-IN" dirty="0" smtClean="0"/>
+              <a:rPr lang="mr-IN" dirty="0"/>
               <a:t>…</a:t>
             </a:r>
-            <a:endParaRPr lang="en-US" dirty="0" smtClean="0"/>
+            <a:endParaRPr lang="en-US" dirty="0"/>
           </a:p>
           <a:p>
             <a:pPr lvl="1"/>
@@ -4215,29 +4084,28 @@
           </a:p>
           <a:p>
             <a:r>
-              <a:rPr lang="en-US" dirty="0" smtClean="0"/>
+              <a:rPr lang="en-US" dirty="0"/>
               <a:t>But why?</a:t>
             </a:r>
           </a:p>
           <a:p>
             <a:pPr lvl="1"/>
             <a:r>
-              <a:rPr lang="en-US" dirty="0" smtClean="0"/>
+              <a:rPr lang="en-US" dirty="0"/>
               <a:t>We already can get 95% CI of </a:t>
             </a:r>
             <a:r>
-              <a:rPr lang="en-US" dirty="0" err="1" smtClean="0"/>
+              <a:rPr lang="en-US" dirty="0" err="1"/>
               <a:t>coeffecients</a:t>
             </a:r>
-            <a:endParaRPr lang="en-US" dirty="0" smtClean="0"/>
+            <a:endParaRPr lang="en-US" dirty="0"/>
           </a:p>
           <a:p>
             <a:pPr lvl="1"/>
             <a:r>
-              <a:rPr lang="en-US" dirty="0" smtClean="0"/>
+              <a:rPr lang="en-US" dirty="0"/>
               <a:t>In SLR, sure, but with more complex or non-linear models harder.</a:t>
             </a:r>
-            <a:endParaRPr lang="en-US" dirty="0"/>
           </a:p>
         </p:txBody>
       </p:sp>
@@ -4446,10 +4314,9 @@
           <a:lstStyle/>
           <a:p>
             <a:r>
-              <a:rPr lang="en-US" dirty="0" smtClean="0"/>
+              <a:rPr lang="en-US" dirty="0"/>
               <a:t>Bootstrap</a:t>
             </a:r>
-            <a:endParaRPr lang="en-US" dirty="0"/>
           </a:p>
         </p:txBody>
       </p:sp>
@@ -4506,13 +4373,6 @@
   <p:clrMapOvr>
     <a:masterClrMapping/>
   </p:clrMapOvr>
-  <p:timing>
-    <p:tnLst>
-      <p:par>
-        <p:cTn id="1" dur="indefinite" restart="never" nodeType="tmRoot"/>
-      </p:par>
-    </p:tnLst>
-  </p:timing>
 </p:sld>
 </file>
 
@@ -4549,10 +4409,9 @@
           <a:lstStyle/>
           <a:p>
             <a:r>
-              <a:rPr lang="en-US" dirty="0" smtClean="0"/>
+              <a:rPr lang="en-US" dirty="0"/>
               <a:t>The power of the bootstrap in one figure </a:t>
             </a:r>
-            <a:endParaRPr lang="en-US" dirty="0"/>
           </a:p>
         </p:txBody>
       </p:sp>
@@ -4572,20 +4431,19 @@
           <a:lstStyle/>
           <a:p>
             <a:r>
-              <a:rPr lang="en-US" dirty="0" smtClean="0"/>
+              <a:rPr lang="en-US" dirty="0"/>
               <a:t>Fig 5.10, estimates of some parameter, </a:t>
             </a:r>
             <a:r>
-              <a:rPr lang="en-US" dirty="0" smtClean="0">
+              <a:rPr lang="en-US" dirty="0">
                 <a:latin typeface="symbol" charset="2"/>
               </a:rPr>
               <a:t>a</a:t>
             </a:r>
             <a:r>
-              <a:rPr lang="en-US" dirty="0" smtClean="0"/>
+              <a:rPr lang="en-US" dirty="0"/>
               <a:t> </a:t>
             </a:r>
-            <a:endParaRPr lang="en-US" dirty="0"/>
           </a:p>
         </p:txBody>
       </p:sp>
@@ -4623,13 +4481,6 @@
   <p:clrMapOvr>
     <a:masterClrMapping/>
   </p:clrMapOvr>
-  <p:timing>
-    <p:tnLst>
-      <p:par>
-        <p:cTn id="1" dur="indefinite" restart="never" nodeType="tmRoot"/>
-      </p:par>
-    </p:tnLst>
-  </p:timing>
 </p:sld>
 </file>
 
@@ -4666,10 +4517,9 @@
           <a:lstStyle/>
           <a:p>
             <a:r>
-              <a:rPr lang="en-US" dirty="0" smtClean="0"/>
+              <a:rPr lang="en-US" dirty="0"/>
               <a:t>Take care</a:t>
             </a:r>
-            <a:endParaRPr lang="en-US" dirty="0"/>
           </a:p>
         </p:txBody>
       </p:sp>
@@ -4689,51 +4539,50 @@
           <a:lstStyle/>
           <a:p>
             <a:r>
-              <a:rPr lang="en-US" dirty="0" smtClean="0"/>
+              <a:rPr lang="en-US" dirty="0"/>
               <a:t>Depending on how large your bootstrap sample data set is, I recommend you avoid using the standard error formula (</a:t>
             </a:r>
             <a:r>
-              <a:rPr lang="en-US" dirty="0" err="1" smtClean="0"/>
+              <a:rPr lang="en-US" dirty="0" err="1"/>
               <a:t>Eq</a:t>
             </a:r>
             <a:r>
-              <a:rPr lang="en-US" dirty="0" smtClean="0"/>
+              <a:rPr lang="en-US" dirty="0"/>
               <a:t> 5.8) and instead you should use simply the standard deviation of the bootstrap estimates. </a:t>
             </a:r>
           </a:p>
           <a:p>
             <a:pPr lvl="1"/>
             <a:r>
-              <a:rPr lang="en-US" b="0" dirty="0" smtClean="0"/>
+              <a:rPr lang="en-US" b="0" dirty="0"/>
               <a:t>Can anyone explain why? </a:t>
             </a:r>
           </a:p>
           <a:p>
             <a:r>
-              <a:rPr lang="en-US" dirty="0" smtClean="0"/>
+              <a:rPr lang="en-US" dirty="0"/>
               <a:t>In this context </a:t>
             </a:r>
             <a:r>
-              <a:rPr lang="en-US" dirty="0" smtClean="0">
+              <a:rPr lang="en-US" dirty="0">
                 <a:latin typeface="symbol" charset="2"/>
               </a:rPr>
               <a:t>a</a:t>
             </a:r>
             <a:r>
-              <a:rPr lang="en-US" dirty="0" smtClean="0"/>
+              <a:rPr lang="en-US" dirty="0"/>
               <a:t>, could be any quantity from your training procedure (MSE, </a:t>
             </a:r>
             <a:r>
-              <a:rPr lang="en-US" dirty="0" smtClean="0">
+              <a:rPr lang="en-US" dirty="0">
                 <a:latin typeface="symbol" charset="2"/>
               </a:rPr>
               <a:t>b</a:t>
             </a:r>
             <a:r>
-              <a:rPr lang="en-US" dirty="0" smtClean="0"/>
+              <a:rPr lang="en-US" dirty="0"/>
               <a:t>, etc..) </a:t>
             </a:r>
-            <a:endParaRPr lang="en-US" dirty="0"/>
           </a:p>
         </p:txBody>
       </p:sp>
@@ -4771,13 +4620,6 @@
   <p:clrMapOvr>
     <a:masterClrMapping/>
   </p:clrMapOvr>
-  <p:timing>
-    <p:tnLst>
-      <p:par>
-        <p:cTn id="1" dur="indefinite" restart="never" nodeType="tmRoot"/>
-      </p:par>
-    </p:tnLst>
-  </p:timing>
 </p:sld>
 </file>
 
@@ -4815,13 +4657,8 @@
           <a:p>
             <a:r>
               <a:rPr lang="en-US" dirty="0"/>
-              <a:t>Linear model selection and regularization </a:t>
-            </a:r>
-            <a:r>
-              <a:rPr lang="en-US" dirty="0" smtClean="0"/>
-              <a:t>(CH6 ISL)</a:t>
-            </a:r>
-            <a:endParaRPr lang="en-US" dirty="0"/>
+              <a:t>Linear model selection and regularization (CH6 ISL)</a:t>
+            </a:r>
           </a:p>
         </p:txBody>
       </p:sp>
@@ -4841,18 +4678,14 @@
           <a:lstStyle/>
           <a:p>
             <a:r>
-              <a:rPr lang="en-US" dirty="0" smtClean="0"/>
+              <a:rPr lang="en-US" dirty="0"/>
               <a:t>The curse of high dimensionality and taking care with your training data </a:t>
             </a:r>
           </a:p>
           <a:p>
             <a:r>
-              <a:rPr lang="en-US" dirty="0" smtClean="0"/>
-              <a:t>Linear </a:t>
-            </a:r>
-            <a:r>
-              <a:rPr lang="en-US" dirty="0"/>
-              <a:t>model selection / regularization </a:t>
+              <a:rPr lang="en-US" dirty="0"/>
+              <a:t>Linear model selection / regularization </a:t>
             </a:r>
           </a:p>
           <a:p>
@@ -4904,13 +4737,6 @@
   <p:clrMapOvr>
     <a:masterClrMapping/>
   </p:clrMapOvr>
-  <p:timing>
-    <p:tnLst>
-      <p:par>
-        <p:cTn id="1" dur="indefinite" restart="never" nodeType="tmRoot"/>
-      </p:par>
-    </p:tnLst>
-  </p:timing>
 </p:sld>
 </file>
 
@@ -4947,10 +4773,9 @@
           <a:lstStyle/>
           <a:p>
             <a:r>
-              <a:rPr lang="en-US" dirty="0" smtClean="0"/>
+              <a:rPr lang="en-US" dirty="0"/>
               <a:t>When good models go bad </a:t>
             </a:r>
-            <a:endParaRPr lang="en-US" dirty="0"/>
           </a:p>
         </p:txBody>
       </p:sp>
@@ -4970,19 +4795,19 @@
           <a:lstStyle/>
           <a:p>
             <a:r>
-              <a:rPr lang="en-US" dirty="0" smtClean="0"/>
+              <a:rPr lang="en-US" dirty="0"/>
               <a:t>Increasing </a:t>
             </a:r>
             <a:r>
-              <a:rPr lang="en-US" b="0" dirty="0" smtClean="0"/>
+              <a:rPr lang="en-US" b="0" dirty="0"/>
               <a:t>P</a:t>
             </a:r>
             <a:r>
-              <a:rPr lang="en-US" dirty="0" smtClean="0"/>
+              <a:rPr lang="en-US" dirty="0"/>
               <a:t> can be seductive, especially if you “feel” like you have a large data set: </a:t>
             </a:r>
             <a:r>
-              <a:rPr lang="en-US" b="0" dirty="0" smtClean="0"/>
+              <a:rPr lang="en-US" b="0" dirty="0"/>
               <a:t>In high dimension your training data may severely under sample the space of P </a:t>
             </a:r>
           </a:p>
@@ -5011,7 +4836,7 @@
               <a:rPr lang="en-US" dirty="0"/>
               <a:t> (the number of parameters) gets large.. </a:t>
             </a:r>
-            <a:endParaRPr lang="en-US" b="0" dirty="0" smtClean="0"/>
+            <a:endParaRPr lang="en-US" b="0" dirty="0"/>
           </a:p>
           <a:p>
             <a:endParaRPr lang="en-US" u="sng" dirty="0"/>
@@ -5028,13 +4853,6 @@
   <p:clrMapOvr>
     <a:masterClrMapping/>
   </p:clrMapOvr>
-  <p:timing>
-    <p:tnLst>
-      <p:par>
-        <p:cTn id="1" dur="indefinite" restart="never" nodeType="tmRoot"/>
-      </p:par>
-    </p:tnLst>
-  </p:timing>
 </p:sld>
 </file>
 
@@ -5071,10 +4889,9 @@
           <a:lstStyle/>
           <a:p>
             <a:r>
-              <a:rPr lang="en-US" dirty="0" smtClean="0"/>
+              <a:rPr lang="en-US" dirty="0"/>
               <a:t>The curse of dimensionality</a:t>
             </a:r>
-            <a:endParaRPr lang="en-US" dirty="0"/>
           </a:p>
         </p:txBody>
       </p:sp>
@@ -5099,37 +4916,37 @@
           <a:lstStyle/>
           <a:p>
             <a:r>
-              <a:rPr lang="en-US" dirty="0" smtClean="0"/>
+              <a:rPr lang="en-US" dirty="0"/>
               <a:t>Consider a situation in which you need n=10 in order to cover response range (in Y) for each X</a:t>
             </a:r>
             <a:r>
-              <a:rPr lang="en-US" baseline="-25000" dirty="0" smtClean="0"/>
+              <a:rPr lang="en-US" baseline="-25000" dirty="0"/>
               <a:t>i</a:t>
             </a:r>
             <a:r>
-              <a:rPr lang="en-US" dirty="0" smtClean="0"/>
+              <a:rPr lang="en-US" dirty="0"/>
               <a:t>.</a:t>
             </a:r>
           </a:p>
           <a:p>
             <a:pPr lvl="1"/>
             <a:r>
-              <a:rPr lang="en-US" dirty="0" smtClean="0"/>
+              <a:rPr lang="en-US" dirty="0"/>
               <a:t>For P=1, n=1</a:t>
             </a:r>
             <a:r>
-              <a:rPr lang="mr-IN" dirty="0" smtClean="0"/>
+              <a:rPr lang="mr-IN" dirty="0"/>
               <a:t>…</a:t>
             </a:r>
             <a:r>
-              <a:rPr lang="en-US" dirty="0" smtClean="0"/>
+              <a:rPr lang="en-US" dirty="0"/>
               <a:t> P=2, n=100 P=3, n=1000</a:t>
             </a:r>
             <a:r>
-              <a:rPr lang="mr-IN" dirty="0" smtClean="0"/>
+              <a:rPr lang="mr-IN" dirty="0"/>
               <a:t>…</a:t>
             </a:r>
-            <a:endParaRPr lang="en-US" dirty="0" smtClean="0"/>
+            <a:endParaRPr lang="en-US" dirty="0"/>
           </a:p>
           <a:p>
             <a:pPr lvl="1"/>
@@ -5137,7 +4954,7 @@
           </a:p>
           <a:p>
             <a:pPr lvl="1"/>
-            <a:endParaRPr lang="en-US" dirty="0" smtClean="0"/>
+            <a:endParaRPr lang="en-US" dirty="0"/>
           </a:p>
           <a:p>
             <a:pPr lvl="1"/>
@@ -5145,7 +4962,7 @@
           </a:p>
           <a:p>
             <a:pPr lvl="1"/>
-            <a:endParaRPr lang="en-US" dirty="0" smtClean="0"/>
+            <a:endParaRPr lang="en-US" dirty="0"/>
           </a:p>
           <a:p>
             <a:pPr lvl="1"/>
@@ -5153,18 +4970,18 @@
           </a:p>
           <a:p>
             <a:pPr lvl="1"/>
-            <a:endParaRPr lang="en-US" dirty="0" smtClean="0"/>
+            <a:endParaRPr lang="en-US" dirty="0"/>
           </a:p>
           <a:p>
             <a:pPr lvl="1"/>
             <a:r>
-              <a:rPr lang="en-US" dirty="0" smtClean="0"/>
+              <a:rPr lang="en-US" dirty="0"/>
               <a:t>Our ability to capture significant fractions of the predictor space collapses after a few dimensions</a:t>
             </a:r>
           </a:p>
           <a:p>
             <a:pPr lvl="1"/>
-            <a:endParaRPr lang="en-US" dirty="0" smtClean="0"/>
+            <a:endParaRPr lang="en-US" dirty="0"/>
           </a:p>
           <a:p>
             <a:endParaRPr lang="en-US" dirty="0"/>
@@ -5300,11 +5117,11 @@
           <a:lstStyle/>
           <a:p>
             <a:r>
-              <a:rPr lang="en-US" dirty="0" smtClean="0"/>
+              <a:rPr lang="en-US" dirty="0"/>
               <a:t>P</a:t>
             </a:r>
             <a:r>
-              <a:rPr lang="en-US" baseline="-25000" dirty="0" smtClean="0"/>
+              <a:rPr lang="en-US" baseline="-25000" dirty="0"/>
               <a:t>1</a:t>
             </a:r>
             <a:endParaRPr lang="en-US" dirty="0"/>
@@ -5334,11 +5151,11 @@
           <a:lstStyle/>
           <a:p>
             <a:r>
-              <a:rPr lang="en-US" dirty="0" smtClean="0"/>
+              <a:rPr lang="en-US" dirty="0"/>
               <a:t>P</a:t>
             </a:r>
             <a:r>
-              <a:rPr lang="en-US" baseline="-25000" dirty="0" smtClean="0"/>
+              <a:rPr lang="en-US" baseline="-25000" dirty="0"/>
               <a:t>2</a:t>
             </a:r>
             <a:endParaRPr lang="en-US" dirty="0"/>
@@ -5368,11 +5185,11 @@
           <a:lstStyle/>
           <a:p>
             <a:r>
-              <a:rPr lang="en-US" dirty="0" smtClean="0"/>
+              <a:rPr lang="en-US" dirty="0"/>
               <a:t>P</a:t>
             </a:r>
             <a:r>
-              <a:rPr lang="en-US" baseline="-25000" dirty="0" smtClean="0"/>
+              <a:rPr lang="en-US" baseline="-25000" dirty="0"/>
               <a:t>3</a:t>
             </a:r>
             <a:endParaRPr lang="en-US" dirty="0"/>
@@ -5389,13 +5206,6 @@
   <p:clrMapOvr>
     <a:masterClrMapping/>
   </p:clrMapOvr>
-  <p:timing>
-    <p:tnLst>
-      <p:par>
-        <p:cTn id="1" dur="indefinite" restart="never" nodeType="tmRoot"/>
-      </p:par>
-    </p:tnLst>
-  </p:timing>
 </p:sld>
 </file>
 
@@ -5432,10 +5242,9 @@
           <a:lstStyle/>
           <a:p>
             <a:r>
-              <a:rPr lang="en-US" dirty="0" smtClean="0"/>
+              <a:rPr lang="en-US" dirty="0"/>
               <a:t>The curse of dimensionality</a:t>
             </a:r>
-            <a:endParaRPr lang="en-US" dirty="0"/>
           </a:p>
         </p:txBody>
       </p:sp>
@@ -5486,23 +5295,19 @@
           <a:lstStyle/>
           <a:p>
             <a:r>
-              <a:rPr lang="en-US" dirty="0" smtClean="0"/>
+              <a:rPr lang="en-US" dirty="0"/>
               <a:t>Figure 2.6, </a:t>
             </a:r>
             <a:r>
               <a:rPr lang="en-US" b="1" dirty="0"/>
-              <a:t>E</a:t>
-            </a:r>
-            <a:r>
-              <a:rPr lang="en-US" b="1" dirty="0" smtClean="0"/>
-              <a:t>lements</a:t>
-            </a:r>
-            <a:r>
-              <a:rPr lang="en-US" dirty="0" smtClean="0"/>
+              <a:t>Elements</a:t>
+            </a:r>
+            <a:r>
+              <a:rPr lang="en-US" dirty="0"/>
               <a:t> </a:t>
             </a:r>
             <a:r>
-              <a:rPr lang="en-US" smtClean="0"/>
+              <a:rPr lang="en-US"/>
               <a:t>of Statistical Learning</a:t>
             </a:r>
             <a:endParaRPr lang="en-US" dirty="0"/>
@@ -5519,13 +5324,6 @@
   <p:clrMapOvr>
     <a:masterClrMapping/>
   </p:clrMapOvr>
-  <p:timing>
-    <p:tnLst>
-      <p:par>
-        <p:cTn id="1" dur="indefinite" restart="never" nodeType="tmRoot"/>
-      </p:par>
-    </p:tnLst>
-  </p:timing>
 </p:sld>
 </file>
 
@@ -5562,10 +5360,9 @@
           <a:lstStyle/>
           <a:p>
             <a:r>
-              <a:rPr lang="en-US" dirty="0" smtClean="0"/>
+              <a:rPr lang="en-US" dirty="0"/>
               <a:t>Outline</a:t>
             </a:r>
-            <a:endParaRPr lang="en-US" dirty="0"/>
           </a:p>
         </p:txBody>
       </p:sp>
@@ -5585,69 +5382,60 @@
           <a:lstStyle/>
           <a:p>
             <a:r>
-              <a:rPr lang="en-US" dirty="0" smtClean="0"/>
+              <a:rPr lang="en-US" dirty="0"/>
               <a:t>Quick review from last time </a:t>
             </a:r>
           </a:p>
           <a:p>
             <a:r>
-              <a:rPr lang="en-US" dirty="0" smtClean="0"/>
-              <a:t>Finish </a:t>
-            </a:r>
-            <a:r>
-              <a:rPr lang="en-US" dirty="0"/>
-              <a:t>r</a:t>
-            </a:r>
-            <a:r>
-              <a:rPr lang="en-US" dirty="0" smtClean="0"/>
-              <a:t>esampling methods </a:t>
-            </a:r>
-            <a:endParaRPr lang="en-US" dirty="0"/>
+              <a:rPr lang="en-US" dirty="0"/>
+              <a:t>Finish resampling methods </a:t>
+            </a:r>
           </a:p>
           <a:p>
             <a:pPr lvl="1"/>
             <a:r>
-              <a:rPr lang="en-US" dirty="0" smtClean="0"/>
+              <a:rPr lang="en-US" dirty="0"/>
               <a:t>Cross-validation</a:t>
             </a:r>
           </a:p>
           <a:p>
             <a:r>
-              <a:rPr lang="en-US" dirty="0" smtClean="0"/>
+              <a:rPr lang="en-US" dirty="0"/>
               <a:t>Linear model selection / regularization </a:t>
             </a:r>
           </a:p>
           <a:p>
             <a:pPr lvl="1"/>
             <a:r>
-              <a:rPr lang="en-US" dirty="0" smtClean="0"/>
+              <a:rPr lang="en-US" dirty="0"/>
               <a:t>Subset selection </a:t>
             </a:r>
           </a:p>
           <a:p>
             <a:pPr lvl="1"/>
             <a:r>
-              <a:rPr lang="en-US" dirty="0" smtClean="0"/>
+              <a:rPr lang="en-US" dirty="0"/>
               <a:t>Ridge regression</a:t>
             </a:r>
           </a:p>
           <a:p>
             <a:pPr lvl="1"/>
             <a:r>
-              <a:rPr lang="en-US" dirty="0" smtClean="0"/>
+              <a:rPr lang="en-US" dirty="0"/>
               <a:t>LASSO regression </a:t>
             </a:r>
           </a:p>
           <a:p>
             <a:pPr lvl="1"/>
             <a:r>
-              <a:rPr lang="en-US" dirty="0" smtClean="0"/>
+              <a:rPr lang="en-US" dirty="0"/>
               <a:t>Python </a:t>
             </a:r>
           </a:p>
           <a:p>
             <a:r>
-              <a:rPr lang="en-US" dirty="0" smtClean="0"/>
+              <a:rPr lang="en-US" dirty="0"/>
               <a:t>Wrap up</a:t>
             </a:r>
           </a:p>
@@ -5663,13 +5451,6 @@
   <p:clrMapOvr>
     <a:masterClrMapping/>
   </p:clrMapOvr>
-  <p:timing>
-    <p:tnLst>
-      <p:par>
-        <p:cTn id="1" dur="indefinite" restart="never" nodeType="tmRoot"/>
-      </p:par>
-    </p:tnLst>
-  </p:timing>
 </p:sld>
 </file>
 
@@ -5706,10 +5487,9 @@
           <a:lstStyle/>
           <a:p>
             <a:r>
-              <a:rPr lang="en-US" dirty="0" smtClean="0"/>
+              <a:rPr lang="en-US" dirty="0"/>
               <a:t>Three approaches to building a smaller model (ISL, p 204)</a:t>
             </a:r>
-            <a:endParaRPr lang="en-US" dirty="0"/>
           </a:p>
         </p:txBody>
       </p:sp>
@@ -5729,31 +5509,31 @@
           <a:lstStyle/>
           <a:p>
             <a:r>
-              <a:rPr lang="en-US" dirty="0" smtClean="0"/>
+              <a:rPr lang="en-US" dirty="0"/>
               <a:t>Subset selection: </a:t>
             </a:r>
             <a:r>
-              <a:rPr lang="en-US" b="0" dirty="0" smtClean="0"/>
+              <a:rPr lang="en-US" b="0" dirty="0"/>
               <a:t>Systematically search different models created with subsets of all possible P values for an adequate model</a:t>
             </a:r>
           </a:p>
           <a:p>
             <a:r>
-              <a:rPr lang="en-US" dirty="0" smtClean="0"/>
+              <a:rPr lang="en-US" dirty="0"/>
               <a:t>Regularization (shrinkage): </a:t>
             </a:r>
             <a:r>
-              <a:rPr lang="en-US" b="0" dirty="0" smtClean="0"/>
+              <a:rPr lang="en-US" b="0" dirty="0"/>
               <a:t>Fit a model w/all P values, but use a different error penalty to force coefficients to be smaller </a:t>
             </a:r>
           </a:p>
           <a:p>
             <a:r>
-              <a:rPr lang="en-US" dirty="0" smtClean="0"/>
+              <a:rPr lang="en-US" dirty="0"/>
               <a:t>Dimensional reduction: </a:t>
             </a:r>
             <a:r>
-              <a:rPr lang="en-US" b="0" dirty="0" smtClean="0"/>
+              <a:rPr lang="en-US" b="0" dirty="0"/>
               <a:t>Fit a model with a reduced number of coarse parameters that represent subsets of groups of P’s</a:t>
             </a:r>
             <a:endParaRPr lang="en-US" dirty="0"/>
@@ -5770,13 +5550,6 @@
   <p:clrMapOvr>
     <a:masterClrMapping/>
   </p:clrMapOvr>
-  <p:timing>
-    <p:tnLst>
-      <p:par>
-        <p:cTn id="1" dur="indefinite" restart="never" nodeType="tmRoot"/>
-      </p:par>
-    </p:tnLst>
-  </p:timing>
 </p:sld>
 </file>
 
@@ -5813,15 +5586,14 @@
           <a:lstStyle/>
           <a:p>
             <a:r>
-              <a:rPr lang="en-US" dirty="0" smtClean="0"/>
+              <a:rPr lang="en-US" dirty="0"/>
               <a:t>Subset selection: algorithms and challenges</a:t>
             </a:r>
-            <a:endParaRPr lang="en-US" dirty="0"/>
-          </a:p>
-        </p:txBody>
-      </p:sp>
-      <mc:AlternateContent xmlns:mc="http://schemas.openxmlformats.org/markup-compatibility/2006">
-        <mc:Choice xmlns:a14="http://schemas.microsoft.com/office/drawing/2010/main" Requires="a14">
+          </a:p>
+        </p:txBody>
+      </p:sp>
+      <mc:AlternateContent xmlns:mc="http://schemas.openxmlformats.org/markup-compatibility/2006" xmlns:a14="http://schemas.microsoft.com/office/drawing/2010/main">
+        <mc:Choice Requires="a14">
           <p:sp>
             <p:nvSpPr>
               <p:cNvPr id="3" name="Text Placeholder 2"/>
@@ -5838,27 +5610,27 @@
               <a:lstStyle/>
               <a:p>
                 <a:r>
-                  <a:rPr lang="en-US" dirty="0" smtClean="0"/>
+                  <a:rPr lang="en-US" dirty="0"/>
                   <a:t>Last week we discussed forward/backward selection algorithms as a method to determine which of the variables (X</a:t>
                 </a:r>
                 <a:r>
-                  <a:rPr lang="en-US" baseline="-25000" dirty="0" smtClean="0"/>
+                  <a:rPr lang="en-US" baseline="-25000" dirty="0"/>
                   <a:t>i</a:t>
                 </a:r>
                 <a:r>
-                  <a:rPr lang="en-US" dirty="0" smtClean="0"/>
+                  <a:rPr lang="en-US" dirty="0"/>
                   <a:t>) are </a:t>
                 </a:r>
                 <a:r>
-                  <a:rPr lang="en-US" b="0" dirty="0" smtClean="0"/>
+                  <a:rPr lang="en-US" b="0" dirty="0"/>
                   <a:t>important</a:t>
                 </a:r>
                 <a:r>
-                  <a:rPr lang="en-US" dirty="0" smtClean="0"/>
+                  <a:rPr lang="en-US" dirty="0"/>
                   <a:t> in terms of describing the </a:t>
                 </a:r>
                 <a:r>
-                  <a:rPr lang="en-US" b="0" dirty="0" smtClean="0"/>
+                  <a:rPr lang="en-US" b="0" dirty="0"/>
                   <a:t>variance in Y </a:t>
                 </a:r>
                 <a:endParaRPr lang="en-US" dirty="0"/>
@@ -5866,51 +5638,39 @@
               <a:p>
                 <a:pPr lvl="1"/>
                 <a:r>
-                  <a:rPr lang="en-US" dirty="0" smtClean="0"/>
-                  <a:t>Best subset </a:t>
-                </a:r>
-                <a:r>
-                  <a:rPr lang="en-US" dirty="0" smtClean="0"/>
-                  <a:t>selection </a:t>
-                </a:r>
-                <a:r>
-                  <a:rPr lang="en-US" dirty="0" smtClean="0"/>
-                  <a:t>algorithms</a:t>
+                  <a:rPr lang="en-US" dirty="0"/>
+                  <a:t>Best subset selection algorithms</a:t>
                 </a:r>
               </a:p>
               <a:p>
                 <a:pPr lvl="2"/>
                 <a:r>
-                  <a:rPr lang="en-US" dirty="0" smtClean="0"/>
+                  <a:rPr lang="en-US" dirty="0"/>
                   <a:t>Brute force is brutal, 2</a:t>
                 </a:r>
                 <a:r>
-                  <a:rPr lang="en-US" i="1" baseline="30000" dirty="0" smtClean="0"/>
+                  <a:rPr lang="en-US" i="1" baseline="30000" dirty="0"/>
                   <a:t>p</a:t>
                 </a:r>
                 <a:r>
-                  <a:rPr lang="en-US" dirty="0" smtClean="0"/>
+                  <a:rPr lang="en-US" dirty="0"/>
                   <a:t> models to be computed</a:t>
                 </a:r>
               </a:p>
               <a:p>
                 <a:pPr lvl="2"/>
                 <a:r>
-                  <a:rPr lang="en-US" dirty="0" smtClean="0"/>
-                  <a:t>Big </a:t>
+                  <a:rPr lang="en-US" dirty="0"/>
+                  <a:t>Big picture takeaway:  for </a:t>
                 </a:r>
                 <a:r>
-                  <a:rPr lang="en-US" dirty="0" smtClean="0"/>
-                  <a:t>picture takeaway:  for </a:t>
-                </a:r>
-                <a:r>
-                  <a:rPr lang="en-US" b="0" i="1" dirty="0" smtClean="0">
+                  <a:rPr lang="en-US" b="0" i="1" dirty="0">
                     <a:latin typeface="times new roman" charset="0"/>
                   </a:rPr>
                   <a:t>p </a:t>
                 </a:r>
                 <a:r>
-                  <a:rPr lang="en-US" dirty="0" smtClean="0"/>
+                  <a:rPr lang="en-US" dirty="0"/>
                   <a:t>features, there are </a:t>
                 </a:r>
                 <a14:m>
@@ -5919,7 +5679,7 @@
                       <m:dPr>
                         <m:ctrlPr>
                           <a:rPr lang="mr-IN" i="1" smtClean="0">
-                            <a:latin typeface="Cambria Math" charset="0"/>
+                            <a:latin typeface="Cambria Math" panose="02040503050406030204" pitchFamily="18" charset="0"/>
                           </a:rPr>
                         </m:ctrlPr>
                       </m:dPr>
@@ -5928,7 +5688,7 @@
                           <m:fPr>
                             <m:ctrlPr>
                               <a:rPr lang="mr-IN" i="1" smtClean="0">
-                                <a:latin typeface="Cambria Math" charset="0"/>
+                                <a:latin typeface="Cambria Math" panose="02040503050406030204" pitchFamily="18" charset="0"/>
                               </a:rPr>
                             </m:ctrlPr>
                           </m:fPr>
@@ -5960,44 +5720,40 @@
                   </m:oMath>
                 </a14:m>
                 <a:r>
-                  <a:rPr lang="en-US" dirty="0" smtClean="0"/>
+                  <a:rPr lang="en-US" dirty="0"/>
                   <a:t>different models of size </a:t>
                 </a:r>
                 <a:r>
-                  <a:rPr lang="en-US" b="0" i="1" dirty="0" smtClean="0">
+                  <a:rPr lang="en-US" b="0" i="1" dirty="0">
                     <a:latin typeface="times new roman" charset="0"/>
                   </a:rPr>
                   <a:t>k</a:t>
                 </a:r>
                 <a:r>
-                  <a:rPr lang="en-US" dirty="0" smtClean="0"/>
+                  <a:rPr lang="en-US" dirty="0"/>
                   <a:t>.  This can be </a:t>
                 </a:r>
                 <a:r>
-                  <a:rPr lang="en-US" b="0" dirty="0" smtClean="0"/>
-                  <a:t>computationally </a:t>
-                </a:r>
-                <a:r>
-                  <a:rPr lang="en-US" b="0" dirty="0" smtClean="0"/>
-                  <a:t>intractable. </a:t>
+                  <a:rPr lang="en-US" b="0" dirty="0"/>
+                  <a:t>computationally intractable. </a:t>
                 </a:r>
               </a:p>
               <a:p>
                 <a:pPr lvl="1"/>
                 <a:r>
-                  <a:rPr lang="en-US" dirty="0" smtClean="0"/>
+                  <a:rPr lang="en-US" dirty="0"/>
                   <a:t>If we give up on “best” and go for “good”</a:t>
                 </a:r>
                 <a:r>
-                  <a:rPr lang="mr-IN" dirty="0" smtClean="0"/>
+                  <a:rPr lang="mr-IN" dirty="0"/>
                   <a:t>…</a:t>
                 </a:r>
-                <a:endParaRPr lang="en-US" dirty="0" smtClean="0"/>
+                <a:endParaRPr lang="en-US" dirty="0"/>
               </a:p>
             </p:txBody>
           </p:sp>
         </mc:Choice>
-        <mc:Fallback>
+        <mc:Fallback xmlns="">
           <p:sp>
             <p:nvSpPr>
               <p:cNvPr id="3" name="Text Placeholder 2"/>
@@ -6041,13 +5797,6 @@
   <p:clrMapOvr>
     <a:masterClrMapping/>
   </p:clrMapOvr>
-  <p:timing>
-    <p:tnLst>
-      <p:par>
-        <p:cTn id="1" dur="indefinite" restart="never" nodeType="tmRoot"/>
-      </p:par>
-    </p:tnLst>
-  </p:timing>
 </p:sld>
 </file>
 
@@ -6084,10 +5833,9 @@
           <a:lstStyle/>
           <a:p>
             <a:r>
-              <a:rPr lang="en-US" dirty="0" smtClean="0"/>
+              <a:rPr lang="en-US" dirty="0"/>
               <a:t>Subset selection: algorithms and challenges</a:t>
             </a:r>
-            <a:endParaRPr lang="en-US" dirty="0"/>
           </a:p>
         </p:txBody>
       </p:sp>
@@ -6107,7 +5855,7 @@
           <a:lstStyle/>
           <a:p>
             <a:r>
-              <a:rPr lang="en-US" dirty="0" smtClean="0"/>
+              <a:rPr lang="en-US" dirty="0"/>
               <a:t>Example forward stepwise selection</a:t>
             </a:r>
           </a:p>
@@ -6115,31 +5863,27 @@
             <a:endParaRPr lang="en-US" dirty="0"/>
           </a:p>
           <a:p>
-            <a:endParaRPr lang="en-US" dirty="0" smtClean="0"/>
-          </a:p>
-          <a:p>
             <a:endParaRPr lang="en-US" dirty="0"/>
           </a:p>
           <a:p>
-            <a:endParaRPr lang="en-US" dirty="0" smtClean="0"/>
-          </a:p>
-          <a:p>
             <a:endParaRPr lang="en-US" dirty="0"/>
           </a:p>
           <a:p>
-            <a:endParaRPr lang="en-US" dirty="0" smtClean="0"/>
-          </a:p>
-          <a:p>
             <a:endParaRPr lang="en-US" dirty="0"/>
           </a:p>
           <a:p>
-            <a:r>
-              <a:rPr lang="en-US" dirty="0" smtClean="0"/>
-              <a:t>When p=20, requires fitting only 211 models vs. brute force’s </a:t>
-            </a:r>
-            <a:r>
-              <a:rPr lang="en-US" dirty="0"/>
-              <a:t> 1, 048, 576 models</a:t>
+            <a:endParaRPr lang="en-US" dirty="0"/>
+          </a:p>
+          <a:p>
+            <a:endParaRPr lang="en-US" dirty="0"/>
+          </a:p>
+          <a:p>
+            <a:endParaRPr lang="en-US" dirty="0"/>
+          </a:p>
+          <a:p>
+            <a:r>
+              <a:rPr lang="en-US" dirty="0"/>
+              <a:t>When p=20, requires fitting only 211 models vs. brute force’s  1, 048, 576 models</a:t>
             </a:r>
           </a:p>
           <a:p>
@@ -6181,13 +5925,6 @@
   <p:clrMapOvr>
     <a:masterClrMapping/>
   </p:clrMapOvr>
-  <p:timing>
-    <p:tnLst>
-      <p:par>
-        <p:cTn id="1" dur="indefinite" restart="never" nodeType="tmRoot"/>
-      </p:par>
-    </p:tnLst>
-  </p:timing>
 </p:sld>
 </file>
 
@@ -6224,10 +5961,9 @@
           <a:lstStyle/>
           <a:p>
             <a:r>
-              <a:rPr lang="en-US" dirty="0" smtClean="0"/>
+              <a:rPr lang="en-US" dirty="0"/>
               <a:t>Subset selection: algorithms and challenges</a:t>
             </a:r>
-            <a:endParaRPr lang="en-US" dirty="0"/>
           </a:p>
         </p:txBody>
       </p:sp>
@@ -6248,15 +5984,7 @@
           <a:p>
             <a:r>
               <a:rPr lang="en-US" dirty="0"/>
-              <a:t>Example </a:t>
-            </a:r>
-            <a:r>
-              <a:rPr lang="en-US" dirty="0" smtClean="0"/>
-              <a:t>backward stepwise </a:t>
-            </a:r>
-            <a:r>
-              <a:rPr lang="en-US" dirty="0"/>
-              <a:t>selection</a:t>
+              <a:t>Example backward stepwise selection</a:t>
             </a:r>
           </a:p>
           <a:p>
@@ -6282,10 +6010,9 @@
           </a:p>
           <a:p>
             <a:r>
-              <a:rPr lang="en-US" dirty="0" smtClean="0"/>
+              <a:rPr lang="en-US" dirty="0"/>
               <a:t>Requires n &gt; p (forward has no such requirement, why?)</a:t>
             </a:r>
-            <a:endParaRPr lang="en-US" dirty="0"/>
           </a:p>
           <a:p>
             <a:endParaRPr lang="en-US" dirty="0"/>
@@ -6338,7 +6065,7 @@
           <a:lstStyle/>
           <a:p>
             <a:r>
-              <a:rPr lang="en-US" dirty="0" smtClean="0">
+              <a:rPr lang="en-US" dirty="0">
                 <a:latin typeface="Helvetica" charset="0"/>
               </a:rPr>
               <a:t>Number of models for brute force: 2^p</a:t>
@@ -6346,7 +6073,7 @@
           </a:p>
           <a:p>
             <a:r>
-              <a:rPr lang="en-US" dirty="0" smtClean="0">
+              <a:rPr lang="en-US" dirty="0">
                 <a:latin typeface="Helvetica" charset="0"/>
               </a:rPr>
               <a:t>Number of models for both algorithms:</a:t>
@@ -6355,31 +6082,19 @@
               <a:rPr lang="mr-IN" dirty="0">
                 <a:latin typeface="Helvetica" charset="0"/>
               </a:rPr>
-              <a:t> </a:t>
-            </a:r>
-            <a:r>
-              <a:rPr lang="mr-IN" dirty="0" smtClean="0">
-                <a:latin typeface="Helvetica" charset="0"/>
-              </a:rPr>
-              <a:t>1+p(</a:t>
-            </a:r>
-            <a:r>
-              <a:rPr lang="mr-IN" dirty="0" err="1" smtClean="0">
+              <a:t> 1+p(</a:t>
+            </a:r>
+            <a:r>
+              <a:rPr lang="mr-IN" dirty="0" err="1">
                 <a:latin typeface="Helvetica" charset="0"/>
               </a:rPr>
               <a:t>p</a:t>
             </a:r>
             <a:r>
-              <a:rPr lang="mr-IN" dirty="0" smtClean="0">
-                <a:latin typeface="Helvetica" charset="0"/>
-              </a:rPr>
-              <a:t> </a:t>
-            </a:r>
-            <a:r>
               <a:rPr lang="mr-IN" dirty="0">
                 <a:latin typeface="Helvetica" charset="0"/>
               </a:rPr>
-              <a:t>+1)/ 2</a:t>
+              <a:t> +1)/ 2</a:t>
             </a:r>
             <a:endParaRPr lang="mr-IN" dirty="0">
               <a:effectLst/>
@@ -6398,13 +6113,6 @@
   <p:clrMapOvr>
     <a:masterClrMapping/>
   </p:clrMapOvr>
-  <p:timing>
-    <p:tnLst>
-      <p:par>
-        <p:cTn id="1" dur="indefinite" restart="never" nodeType="tmRoot"/>
-      </p:par>
-    </p:tnLst>
-  </p:timing>
 </p:sld>
 </file>
 
@@ -6441,10 +6149,9 @@
           <a:lstStyle/>
           <a:p>
             <a:r>
-              <a:rPr lang="en-US" dirty="0" smtClean="0"/>
+              <a:rPr lang="en-US" dirty="0"/>
               <a:t>Comparing alternative models </a:t>
             </a:r>
-            <a:endParaRPr lang="en-US" dirty="0"/>
           </a:p>
         </p:txBody>
       </p:sp>
@@ -6464,64 +6171,60 @@
           <a:lstStyle/>
           <a:p>
             <a:r>
-              <a:rPr lang="en-US" dirty="0" smtClean="0"/>
+              <a:rPr lang="en-US" dirty="0"/>
               <a:t>Key concept: </a:t>
             </a:r>
             <a:r>
-              <a:rPr lang="en-US" b="0" dirty="0" smtClean="0"/>
+              <a:rPr lang="en-US" b="0" dirty="0"/>
               <a:t>The training error (</a:t>
             </a:r>
             <a:r>
-              <a:rPr lang="en-US" dirty="0" smtClean="0"/>
+              <a:rPr lang="en-US" dirty="0"/>
               <a:t>RSS</a:t>
             </a:r>
             <a:r>
-              <a:rPr lang="en-US" b="0" dirty="0" smtClean="0"/>
+              <a:rPr lang="en-US" b="0" dirty="0"/>
               <a:t>) will always decrease with increased number of parameters, how to evaluate different models with different number of parameters</a:t>
             </a:r>
           </a:p>
           <a:p>
             <a:r>
-              <a:rPr lang="en-US" dirty="0" smtClean="0"/>
+              <a:rPr lang="en-US" dirty="0"/>
               <a:t>We should therefore choose the best model considering the </a:t>
             </a:r>
             <a:r>
-              <a:rPr lang="en-US" b="0" dirty="0" smtClean="0"/>
+              <a:rPr lang="en-US" b="0" dirty="0"/>
               <a:t>testing error</a:t>
             </a:r>
             <a:r>
-              <a:rPr lang="en-US" dirty="0" smtClean="0"/>
+              <a:rPr lang="en-US" dirty="0"/>
               <a:t>.  Two choices for this:</a:t>
             </a:r>
           </a:p>
           <a:p>
             <a:pPr lvl="1"/>
             <a:r>
-              <a:rPr lang="en-US" dirty="0" smtClean="0"/>
+              <a:rPr lang="en-US" dirty="0"/>
               <a:t>Use theoretical estimates of the test error. ISL offers four suggestions: </a:t>
             </a:r>
             <a:r>
-              <a:rPr lang="en-US" dirty="0" err="1" smtClean="0"/>
+              <a:rPr lang="en-US" dirty="0" err="1"/>
               <a:t>Cp</a:t>
             </a:r>
             <a:r>
-              <a:rPr lang="en-US" dirty="0" smtClean="0"/>
+              <a:rPr lang="en-US" dirty="0"/>
               <a:t>, AIC, BIC, adjusted R</a:t>
             </a:r>
             <a:r>
-              <a:rPr lang="en-US" baseline="30000" dirty="0" smtClean="0"/>
-              <a:t>2</a:t>
-            </a:r>
-            <a:r>
               <a:rPr lang="en-US" baseline="30000" dirty="0"/>
-              <a:t> </a:t>
-            </a:r>
-            <a:endParaRPr lang="en-US" dirty="0" smtClean="0"/>
+              <a:t>2 </a:t>
+            </a:r>
+            <a:endParaRPr lang="en-US" dirty="0"/>
           </a:p>
           <a:p>
             <a:pPr lvl="1"/>
             <a:r>
-              <a:rPr lang="en-US" dirty="0" smtClean="0"/>
+              <a:rPr lang="en-US" dirty="0"/>
               <a:t>Use bootstrapping or cross-validation to evaluate the test error directly </a:t>
             </a:r>
           </a:p>
@@ -6540,13 +6243,6 @@
   <p:clrMapOvr>
     <a:masterClrMapping/>
   </p:clrMapOvr>
-  <p:timing>
-    <p:tnLst>
-      <p:par>
-        <p:cTn id="1" dur="indefinite" restart="never" nodeType="tmRoot"/>
-      </p:par>
-    </p:tnLst>
-  </p:timing>
 </p:sld>
 </file>
 
@@ -6607,15 +6303,14 @@
           <a:lstStyle/>
           <a:p>
             <a:r>
-              <a:rPr lang="en-US" dirty="0" smtClean="0"/>
+              <a:rPr lang="en-US" dirty="0"/>
               <a:t>Theoretical models to estimate test error </a:t>
             </a:r>
-            <a:endParaRPr lang="en-US" dirty="0"/>
-          </a:p>
-        </p:txBody>
-      </p:sp>
-      <mc:AlternateContent xmlns:mc="http://schemas.openxmlformats.org/markup-compatibility/2006">
-        <mc:Choice xmlns:a14="http://schemas.microsoft.com/office/drawing/2010/main" Requires="a14">
+          </a:p>
+        </p:txBody>
+      </p:sp>
+      <mc:AlternateContent xmlns:mc="http://schemas.openxmlformats.org/markup-compatibility/2006" xmlns:a14="http://schemas.microsoft.com/office/drawing/2010/main">
+        <mc:Choice Requires="a14">
           <p:sp>
             <p:nvSpPr>
               <p:cNvPr id="3" name="Text Placeholder 2"/>
@@ -6632,27 +6327,27 @@
               <a:lstStyle/>
               <a:p>
                 <a:r>
-                  <a:rPr lang="en-US" dirty="0" smtClean="0"/>
+                  <a:rPr lang="en-US" dirty="0"/>
                   <a:t>The models use the training RSS, number of training points (</a:t>
                 </a:r>
                 <a:r>
-                  <a:rPr lang="en-US" i="1" dirty="0" smtClean="0">
+                  <a:rPr lang="en-US" i="1" dirty="0">
                     <a:latin typeface="times new roman" charset="0"/>
                   </a:rPr>
                   <a:t>n</a:t>
                 </a:r>
                 <a:r>
-                  <a:rPr lang="en-US" dirty="0" smtClean="0"/>
+                  <a:rPr lang="en-US" dirty="0"/>
                   <a:t>), number of fit parameters (</a:t>
                 </a:r>
                 <a:r>
-                  <a:rPr lang="en-US" i="1" dirty="0" smtClean="0">
+                  <a:rPr lang="en-US" i="1" dirty="0">
                     <a:latin typeface="times new roman" charset="0"/>
                   </a:rPr>
                   <a:t>d</a:t>
                 </a:r>
                 <a:r>
-                  <a:rPr lang="en-US" dirty="0" smtClean="0"/>
+                  <a:rPr lang="en-US" dirty="0"/>
                   <a:t>) and estimated variance of response Y (</a:t>
                 </a:r>
                 <a14:m>
@@ -6662,7 +6357,7 @@
                         <m:chr m:val="̂"/>
                         <m:ctrlPr>
                           <a:rPr lang="en-US" b="0" i="1" dirty="0" smtClean="0">
-                            <a:latin typeface="Cambria Math" charset="0"/>
+                            <a:latin typeface="Cambria Math" panose="02040503050406030204" pitchFamily="18" charset="0"/>
                           </a:rPr>
                         </m:ctrlPr>
                       </m:accPr>
@@ -6671,7 +6366,7 @@
                           <m:sSupPr>
                             <m:ctrlPr>
                               <a:rPr lang="en-US" b="0" i="1" dirty="0" smtClean="0">
-                                <a:latin typeface="Cambria Math" charset="0"/>
+                                <a:latin typeface="Cambria Math" panose="02040503050406030204" pitchFamily="18" charset="0"/>
                               </a:rPr>
                             </m:ctrlPr>
                           </m:sSupPr>
@@ -6699,7 +6394,7 @@
                   </m:oMath>
                 </a14:m>
                 <a:r>
-                  <a:rPr lang="en-US" dirty="0" smtClean="0"/>
+                  <a:rPr lang="en-US" dirty="0"/>
                   <a:t>)</a:t>
                 </a:r>
               </a:p>
@@ -6710,26 +6405,18 @@
                   </a:spcAft>
                 </a:pPr>
                 <a:r>
-                  <a:rPr lang="en-US" dirty="0" err="1" smtClean="0"/>
+                  <a:rPr lang="en-US" dirty="0" err="1"/>
                   <a:t>Cp</a:t>
                 </a:r>
                 <a:r>
-                  <a:rPr lang="en-US" dirty="0" smtClean="0"/>
-                  <a:t>: Baseline, adds </a:t>
+                  <a:rPr lang="en-US" dirty="0"/>
+                  <a:t>: Baseline, adds penalty component for more fit </a:t>
                 </a:r>
                 <a:r>
-                  <a:rPr lang="en-US" dirty="0" smtClean="0"/>
-                  <a:t>penalty component </a:t>
-                </a:r>
-                <a:r>
-                  <a:rPr lang="en-US" dirty="0" smtClean="0"/>
-                  <a:t>for more fit </a:t>
-                </a:r>
-                <a:r>
-                  <a:rPr lang="en-US" dirty="0" err="1" smtClean="0"/>
+                  <a:rPr lang="en-US" dirty="0" err="1"/>
                   <a:t>params</a:t>
                 </a:r>
-                <a:endParaRPr lang="en-US" dirty="0" smtClean="0"/>
+                <a:endParaRPr lang="en-US" dirty="0"/>
               </a:p>
               <a:p>
                 <a:pPr>
@@ -6738,15 +6425,15 @@
                   </a:spcAft>
                 </a:pPr>
                 <a:r>
-                  <a:rPr lang="en-US" dirty="0" smtClean="0"/>
+                  <a:rPr lang="en-US" dirty="0"/>
                   <a:t>AIC: </a:t>
                 </a:r>
                 <a:r>
-                  <a:rPr lang="en-US" dirty="0" err="1" smtClean="0"/>
+                  <a:rPr lang="en-US" dirty="0" err="1"/>
                   <a:t>Akaike</a:t>
                 </a:r>
                 <a:r>
-                  <a:rPr lang="en-US" dirty="0" smtClean="0"/>
+                  <a:rPr lang="en-US" dirty="0"/>
                   <a:t> information criterion; used for max likelihood methods: </a:t>
                 </a:r>
               </a:p>
@@ -6757,7 +6444,7 @@
                   </a:spcAft>
                 </a:pPr>
                 <a:r>
-                  <a:rPr lang="en-US" dirty="0" smtClean="0"/>
+                  <a:rPr lang="en-US" dirty="0"/>
                   <a:t>BIC: Bayesian information criterion</a:t>
                 </a:r>
               </a:p>
@@ -6768,23 +6455,22 @@
                   </a:spcAft>
                 </a:pPr>
                 <a:r>
-                  <a:rPr lang="en-US" dirty="0" smtClean="0"/>
+                  <a:rPr lang="en-US" dirty="0"/>
                   <a:t>Adjusted R</a:t>
                 </a:r>
                 <a:r>
-                  <a:rPr lang="en-US" baseline="30000" dirty="0" smtClean="0"/>
+                  <a:rPr lang="en-US" baseline="30000" dirty="0"/>
                   <a:t>2</a:t>
                 </a:r>
                 <a:r>
-                  <a:rPr lang="en-US" dirty="0" smtClean="0"/>
+                  <a:rPr lang="en-US" dirty="0"/>
                   <a:t>:</a:t>
                 </a:r>
-                <a:endParaRPr lang="en-US" dirty="0"/>
               </a:p>
             </p:txBody>
           </p:sp>
         </mc:Choice>
-        <mc:Fallback>
+        <mc:Fallback xmlns="">
           <p:sp>
             <p:nvSpPr>
               <p:cNvPr id="3" name="Text Placeholder 2"/>
@@ -6899,13 +6585,6 @@
   <p:clrMapOvr>
     <a:masterClrMapping/>
   </p:clrMapOvr>
-  <p:timing>
-    <p:tnLst>
-      <p:par>
-        <p:cTn id="1" dur="indefinite" restart="never" nodeType="tmRoot"/>
-      </p:par>
-    </p:tnLst>
-  </p:timing>
 </p:sld>
 </file>
 
@@ -6942,10 +6621,9 @@
           <a:lstStyle/>
           <a:p>
             <a:r>
-              <a:rPr lang="en-US" dirty="0" smtClean="0"/>
+              <a:rPr lang="en-US" dirty="0"/>
               <a:t>Comparison of  test error estimates</a:t>
             </a:r>
-            <a:endParaRPr lang="en-US" dirty="0"/>
           </a:p>
         </p:txBody>
       </p:sp>
@@ -6965,27 +6643,26 @@
           <a:lstStyle/>
           <a:p>
             <a:r>
-              <a:rPr lang="en-US" sz="2200" dirty="0" smtClean="0"/>
+              <a:rPr lang="en-US" sz="2200" dirty="0"/>
               <a:t>This is a specific example from one of the ISL data sets! </a:t>
             </a:r>
           </a:p>
           <a:p>
             <a:r>
-              <a:rPr lang="en-US" sz="2200" dirty="0" smtClean="0"/>
+              <a:rPr lang="en-US" sz="2200" dirty="0"/>
               <a:t>In your own model subset exercise it is likely that you would have </a:t>
             </a:r>
             <a:r>
-              <a:rPr lang="en-US" sz="2200" b="0" dirty="0" smtClean="0"/>
+              <a:rPr lang="en-US" sz="2200" b="0" dirty="0"/>
               <a:t>multiple models with same number of predictors! </a:t>
             </a:r>
-            <a:endParaRPr lang="en-US" sz="2200" dirty="0" smtClean="0"/>
-          </a:p>
-          <a:p>
-            <a:r>
-              <a:rPr lang="en-US" sz="2200" dirty="0" smtClean="0"/>
+            <a:endParaRPr lang="en-US" sz="2200" dirty="0"/>
+          </a:p>
+          <a:p>
+            <a:r>
+              <a:rPr lang="en-US" sz="2200" dirty="0"/>
               <a:t>Best practice is to monitor behavior of multiple test error estimates </a:t>
             </a:r>
-            <a:endParaRPr lang="en-US" sz="2200" dirty="0"/>
           </a:p>
         </p:txBody>
       </p:sp>
@@ -7023,13 +6700,6 @@
   <p:clrMapOvr>
     <a:masterClrMapping/>
   </p:clrMapOvr>
-  <p:timing>
-    <p:tnLst>
-      <p:par>
-        <p:cTn id="1" dur="indefinite" restart="never" nodeType="tmRoot"/>
-      </p:par>
-    </p:tnLst>
-  </p:timing>
 </p:sld>
 </file>
 
@@ -7066,11 +6736,11 @@
           <a:lstStyle/>
           <a:p>
             <a:r>
-              <a:rPr lang="en-US" dirty="0" smtClean="0"/>
+              <a:rPr lang="en-US" dirty="0"/>
               <a:t>Resampling and clarifying a bit of terminology</a:t>
             </a:r>
             <a:r>
-              <a:rPr lang="mr-IN" dirty="0" smtClean="0"/>
+              <a:rPr lang="mr-IN" dirty="0"/>
               <a:t>…</a:t>
             </a:r>
             <a:endParaRPr lang="en-US" dirty="0"/>
@@ -7098,74 +6768,70 @@
           <a:lstStyle/>
           <a:p>
             <a:r>
-              <a:rPr lang="en-US" dirty="0" smtClean="0"/>
+              <a:rPr lang="en-US" dirty="0"/>
               <a:t>The use of one large set of data combined with resampling yields the use of “training and validation” error estimates (in most statistical learning approaches) </a:t>
             </a:r>
           </a:p>
           <a:p>
             <a:r>
               <a:rPr lang="en-US" dirty="0"/>
-              <a:t>Problem: In cross-validation or bootstrap, the learning algorithm “sees” all the data </a:t>
-            </a:r>
-            <a:r>
-              <a:rPr lang="en-US" dirty="0" smtClean="0"/>
-              <a:t>eventually</a:t>
-            </a:r>
-          </a:p>
-          <a:p>
-            <a:r>
-              <a:rPr lang="en-US" dirty="0" smtClean="0"/>
+              <a:t>Problem: In cross-validation or bootstrap, the learning algorithm “sees” all the data eventually</a:t>
+            </a:r>
+          </a:p>
+          <a:p>
+            <a:r>
+              <a:rPr lang="en-US" dirty="0"/>
               <a:t>If possible, we often withhold a 3</a:t>
             </a:r>
             <a:r>
-              <a:rPr lang="en-US" baseline="30000" dirty="0" smtClean="0"/>
+              <a:rPr lang="en-US" baseline="30000" dirty="0"/>
               <a:t>rd</a:t>
             </a:r>
             <a:r>
-              <a:rPr lang="en-US" dirty="0" smtClean="0"/>
+              <a:rPr lang="en-US" dirty="0"/>
               <a:t> data set “</a:t>
             </a:r>
             <a:r>
-              <a:rPr lang="en-US" u="sng" dirty="0" smtClean="0"/>
+              <a:rPr lang="en-US" u="sng" dirty="0"/>
               <a:t>the test set</a:t>
             </a:r>
             <a:r>
-              <a:rPr lang="en-US" dirty="0" smtClean="0"/>
+              <a:rPr lang="en-US" dirty="0"/>
               <a:t>” that the model is totally blind to: </a:t>
             </a:r>
             <a:r>
-              <a:rPr lang="en-US" b="0" dirty="0" smtClean="0"/>
+              <a:rPr lang="en-US" b="0" dirty="0"/>
               <a:t>testing error data is withheld until the final model is selected</a:t>
             </a:r>
           </a:p>
           <a:p>
             <a:pPr lvl="1"/>
             <a:r>
-              <a:rPr lang="en-US" dirty="0" smtClean="0"/>
+              <a:rPr lang="en-US" dirty="0"/>
               <a:t>Training data vs</a:t>
             </a:r>
             <a:r>
-              <a:rPr lang="mr-IN" dirty="0" smtClean="0"/>
+              <a:rPr lang="mr-IN" dirty="0"/>
               <a:t>…</a:t>
             </a:r>
-            <a:endParaRPr lang="en-US" dirty="0" smtClean="0"/>
+            <a:endParaRPr lang="en-US" dirty="0"/>
           </a:p>
           <a:p>
             <a:pPr lvl="1"/>
             <a:r>
-              <a:rPr lang="en-US" dirty="0" smtClean="0"/>
+              <a:rPr lang="en-US" dirty="0"/>
               <a:t>Validation data vs</a:t>
             </a:r>
             <a:r>
-              <a:rPr lang="mr-IN" dirty="0" smtClean="0"/>
+              <a:rPr lang="mr-IN" dirty="0"/>
               <a:t>…</a:t>
             </a:r>
-            <a:endParaRPr lang="en-US" dirty="0" smtClean="0"/>
+            <a:endParaRPr lang="en-US" dirty="0"/>
           </a:p>
           <a:p>
             <a:pPr lvl="1"/>
             <a:r>
-              <a:rPr lang="en-US" dirty="0" smtClean="0"/>
+              <a:rPr lang="en-US" dirty="0"/>
               <a:t>Testing data</a:t>
             </a:r>
           </a:p>
@@ -7181,13 +6847,6 @@
   <p:clrMapOvr>
     <a:masterClrMapping/>
   </p:clrMapOvr>
-  <p:timing>
-    <p:tnLst>
-      <p:par>
-        <p:cTn id="1" dur="indefinite" restart="never" nodeType="tmRoot"/>
-      </p:par>
-    </p:tnLst>
-  </p:timing>
 </p:sld>
 </file>
 
@@ -7224,10 +6883,9 @@
           <a:lstStyle/>
           <a:p>
             <a:r>
-              <a:rPr lang="en-US" dirty="0" smtClean="0"/>
+              <a:rPr lang="en-US" dirty="0"/>
               <a:t>Resampling and testing error estimates</a:t>
             </a:r>
-            <a:endParaRPr lang="en-US" dirty="0"/>
           </a:p>
         </p:txBody>
       </p:sp>
@@ -7249,30 +6907,26 @@
               <a:lstStyle/>
               <a:p>
                 <a:r>
-                  <a:rPr lang="en-US" dirty="0" smtClean="0"/>
+                  <a:rPr lang="en-US" dirty="0"/>
                   <a:t>If the number of candidate models you have to run is “small” (</a:t>
                 </a:r>
                 <a:r>
-                  <a:rPr lang="en-US" i="1" dirty="0" smtClean="0"/>
+                  <a:rPr lang="en-US" i="1" dirty="0"/>
                   <a:t>compared to your total science workflow time</a:t>
                 </a:r>
                 <a:r>
-                  <a:rPr lang="en-US" dirty="0" smtClean="0"/>
+                  <a:rPr lang="en-US" dirty="0"/>
                   <a:t>), then you should use bootstrap or cross-validation </a:t>
                 </a:r>
               </a:p>
               <a:p>
                 <a:r>
-                  <a:rPr lang="en-US" dirty="0" smtClean="0"/>
+                  <a:rPr lang="en-US" dirty="0"/>
                   <a:t>Especially true in the absence of </a:t>
                 </a:r>
                 <a:r>
-                  <a:rPr lang="en-US" u="sng" dirty="0" smtClean="0"/>
-                  <a:t>high quality </a:t>
-                </a:r>
-                <a:r>
                   <a:rPr lang="en-US" u="sng" dirty="0"/>
-                  <a:t>estimated variance of response Y (</a:t>
+                  <a:t>high quality estimated variance of response Y (</a:t>
                 </a:r>
                 <a14:m>
                   <m:oMath xmlns:m="http://schemas.openxmlformats.org/officeDocument/2006/math">
@@ -7281,7 +6935,7 @@
                         <m:chr m:val="̂"/>
                         <m:ctrlPr>
                           <a:rPr lang="en-US" b="0" i="1" u="sng" dirty="0">
-                            <a:latin typeface="Cambria Math" charset="0"/>
+                            <a:latin typeface="Cambria Math" panose="02040503050406030204" pitchFamily="18" charset="0"/>
                           </a:rPr>
                         </m:ctrlPr>
                       </m:accPr>
@@ -7290,7 +6944,7 @@
                           <m:sSupPr>
                             <m:ctrlPr>
                               <a:rPr lang="en-US" b="0" i="1" u="sng" dirty="0">
-                                <a:latin typeface="Cambria Math" charset="0"/>
+                                <a:latin typeface="Cambria Math" panose="02040503050406030204" pitchFamily="18" charset="0"/>
                               </a:rPr>
                             </m:ctrlPr>
                           </m:sSupPr>
@@ -7321,11 +6975,10 @@
                   <a:rPr lang="en-US" u="sng" dirty="0"/>
                   <a:t>)</a:t>
                 </a:r>
-                <a:endParaRPr lang="en-US" u="sng" dirty="0" smtClean="0"/>
               </a:p>
               <a:p>
                 <a:r>
-                  <a:rPr lang="en-US" dirty="0" smtClean="0"/>
+                  <a:rPr lang="en-US" dirty="0"/>
                   <a:t>Modern computers (even your laptop) can train huge numbers of models on a short amount of time</a:t>
                 </a:r>
               </a:p>
@@ -7376,13 +7029,6 @@
   <p:clrMapOvr>
     <a:masterClrMapping/>
   </p:clrMapOvr>
-  <p:timing>
-    <p:tnLst>
-      <p:par>
-        <p:cTn id="1" dur="indefinite" restart="never" nodeType="tmRoot"/>
-      </p:par>
-    </p:tnLst>
-  </p:timing>
 </p:sld>
 </file>
 
@@ -7420,14 +7066,13 @@
           </a:bodyPr>
           <a:lstStyle/>
           <a:p>
-            <a:endParaRPr lang="en-US" dirty="0" smtClean="0"/>
-          </a:p>
-          <a:p>
-            <a:r>
-              <a:rPr lang="en-US" dirty="0" smtClean="0"/>
+            <a:endParaRPr lang="en-US" dirty="0"/>
+          </a:p>
+          <a:p>
+            <a:r>
+              <a:rPr lang="en-US" dirty="0"/>
               <a:t>Regularization: big picture concepts</a:t>
             </a:r>
-            <a:endParaRPr lang="en-US" dirty="0"/>
           </a:p>
         </p:txBody>
       </p:sp>
@@ -7452,29 +7097,28 @@
           <a:lstStyle/>
           <a:p>
             <a:r>
-              <a:rPr lang="en-US" dirty="0" smtClean="0"/>
+              <a:rPr lang="en-US" dirty="0"/>
               <a:t>Instead of subset selection, another option is to fit a model with all possible (P) parameters and add a penalty to the RSS term to </a:t>
             </a:r>
             <a:r>
-              <a:rPr lang="en-US" b="0" dirty="0" smtClean="0"/>
+              <a:rPr lang="en-US" b="0" dirty="0"/>
               <a:t>shrink</a:t>
             </a:r>
             <a:r>
-              <a:rPr lang="en-US" dirty="0" smtClean="0"/>
+              <a:rPr lang="en-US" dirty="0"/>
               <a:t> them</a:t>
             </a:r>
+          </a:p>
+          <a:p>
             <a:endParaRPr lang="en-US" dirty="0"/>
           </a:p>
           <a:p>
-            <a:endParaRPr lang="en-US" dirty="0" smtClean="0"/>
-          </a:p>
-          <a:p>
-            <a:r>
-              <a:rPr lang="en-US" dirty="0" smtClean="0"/>
+            <a:r>
+              <a:rPr lang="en-US" dirty="0"/>
               <a:t>Why do we want to do this?  [</a:t>
             </a:r>
             <a:r>
-              <a:rPr lang="en-US" u="sng" dirty="0" smtClean="0">
+              <a:rPr lang="en-US" u="sng" dirty="0">
                 <a:solidFill>
                   <a:srgbClr val="FF0000"/>
                 </a:solidFill>
@@ -7482,52 +7126,52 @@
               <a:t>THIS IS IMPORTANT</a:t>
             </a:r>
             <a:r>
-              <a:rPr lang="en-US" dirty="0" smtClean="0"/>
+              <a:rPr lang="en-US" dirty="0"/>
               <a:t>]</a:t>
             </a:r>
           </a:p>
           <a:p>
             <a:pPr lvl="1"/>
             <a:r>
-              <a:rPr lang="en-US" dirty="0" smtClean="0"/>
+              <a:rPr lang="en-US" dirty="0"/>
               <a:t>Recall that models with more parameters will better estimate the </a:t>
             </a:r>
             <a:r>
-              <a:rPr lang="en-US" u="sng" dirty="0" smtClean="0"/>
+              <a:rPr lang="en-US" u="sng" dirty="0"/>
               <a:t>training</a:t>
             </a:r>
             <a:r>
-              <a:rPr lang="en-US" dirty="0" smtClean="0"/>
+              <a:rPr lang="en-US" dirty="0"/>
               <a:t> set, reducing the </a:t>
             </a:r>
             <a:r>
-              <a:rPr lang="en-US" u="sng" dirty="0" smtClean="0"/>
+              <a:rPr lang="en-US" u="sng" dirty="0"/>
               <a:t>training</a:t>
             </a:r>
             <a:r>
-              <a:rPr lang="en-US" dirty="0" smtClean="0"/>
+              <a:rPr lang="en-US" dirty="0"/>
               <a:t> error </a:t>
             </a:r>
           </a:p>
           <a:p>
             <a:pPr lvl="1"/>
             <a:r>
-              <a:rPr lang="en-US" dirty="0" smtClean="0"/>
+              <a:rPr lang="en-US" dirty="0"/>
               <a:t>However, adding more parameters increases the testing error (</a:t>
             </a:r>
             <a:r>
-              <a:rPr lang="en-US" b="0" dirty="0" smtClean="0"/>
+              <a:rPr lang="en-US" b="0" dirty="0"/>
               <a:t>the variance of response Y is increased via the bias-variance tradeoff</a:t>
             </a:r>
             <a:r>
-              <a:rPr lang="en-US" dirty="0" smtClean="0"/>
+              <a:rPr lang="en-US" dirty="0"/>
               <a:t>)</a:t>
             </a:r>
           </a:p>
           <a:p>
             <a:pPr lvl="1"/>
             <a:r>
-              <a:rPr lang="en-US" dirty="0" smtClean="0"/>
+              <a:rPr lang="en-US" dirty="0"/>
               <a:t>Reducing the magnitude of the coefficients, therefore is a plausible route to reducing test set error </a:t>
             </a:r>
           </a:p>
@@ -7547,13 +7191,6 @@
   <p:clrMapOvr>
     <a:masterClrMapping/>
   </p:clrMapOvr>
-  <p:timing>
-    <p:tnLst>
-      <p:par>
-        <p:cTn id="1" dur="indefinite" restart="never" nodeType="tmRoot"/>
-      </p:par>
-    </p:tnLst>
-  </p:timing>
 </p:sld>
 </file>
 
@@ -7590,10 +7227,9 @@
           <a:lstStyle/>
           <a:p>
             <a:r>
-              <a:rPr lang="en-US" dirty="0" smtClean="0"/>
+              <a:rPr lang="en-US" dirty="0"/>
               <a:t>Topics last time </a:t>
             </a:r>
-            <a:endParaRPr lang="en-US" dirty="0"/>
           </a:p>
         </p:txBody>
       </p:sp>
@@ -7613,29 +7249,28 @@
           <a:lstStyle/>
           <a:p>
             <a:r>
-              <a:rPr lang="en-US" dirty="0" smtClean="0"/>
+              <a:rPr lang="en-US" dirty="0"/>
               <a:t>Error in regression models</a:t>
             </a:r>
           </a:p>
           <a:p>
             <a:r>
-              <a:rPr lang="en-US" dirty="0" smtClean="0"/>
+              <a:rPr lang="en-US" dirty="0"/>
               <a:t>Multiple regression</a:t>
             </a:r>
           </a:p>
           <a:p>
             <a:pPr lvl="1"/>
             <a:r>
-              <a:rPr lang="en-US" dirty="0" smtClean="0"/>
+              <a:rPr lang="en-US" dirty="0"/>
               <a:t>Python example</a:t>
             </a:r>
           </a:p>
           <a:p>
             <a:r>
-              <a:rPr lang="en-US" dirty="0" smtClean="0"/>
+              <a:rPr lang="en-US" dirty="0"/>
               <a:t>Bootstrap and cross validation</a:t>
             </a:r>
-            <a:endParaRPr lang="en-US" dirty="0"/>
           </a:p>
         </p:txBody>
       </p:sp>
@@ -7667,7 +7302,7 @@
           <a:lstStyle/>
           <a:p>
             <a:r>
-              <a:rPr lang="en-US" u="sng" dirty="0" smtClean="0"/>
+              <a:rPr lang="en-US" u="sng" dirty="0"/>
               <a:t>Big picture concepts: </a:t>
             </a:r>
           </a:p>
@@ -7677,7 +7312,7 @@
               <a:buChar char="•"/>
             </a:pPr>
             <a:r>
-              <a:rPr lang="en-US" dirty="0" smtClean="0"/>
+              <a:rPr lang="en-US" dirty="0"/>
               <a:t>The training error (e.g., RSS) will always be lower than the validation set or test set error </a:t>
             </a:r>
           </a:p>
@@ -7687,7 +7322,7 @@
               <a:buChar char="•"/>
             </a:pPr>
             <a:r>
-              <a:rPr lang="en-US" dirty="0" smtClean="0"/>
+              <a:rPr lang="en-US" dirty="0"/>
               <a:t>Increasing the number of parameters (given P &lt; N), always decreases the training error</a:t>
             </a:r>
           </a:p>
@@ -7697,10 +7332,9 @@
               <a:buChar char="•"/>
             </a:pPr>
             <a:r>
-              <a:rPr lang="en-US" dirty="0" smtClean="0"/>
+              <a:rPr lang="en-US" dirty="0"/>
               <a:t>The bias/variance tradeoff emerges when we have to make decisions about how much data to withhold for validation </a:t>
             </a:r>
-            <a:endParaRPr lang="en-US" dirty="0"/>
           </a:p>
         </p:txBody>
       </p:sp>
@@ -7714,13 +7348,6 @@
   <p:clrMapOvr>
     <a:masterClrMapping/>
   </p:clrMapOvr>
-  <p:timing>
-    <p:tnLst>
-      <p:par>
-        <p:cTn id="1" dur="indefinite" restart="never" nodeType="tmRoot"/>
-      </p:par>
-    </p:tnLst>
-  </p:timing>
 </p:sld>
 </file>
 
@@ -7757,10 +7384,9 @@
           <a:lstStyle/>
           <a:p>
             <a:r>
-              <a:rPr lang="en-US" dirty="0" smtClean="0"/>
+              <a:rPr lang="en-US" dirty="0"/>
               <a:t>Ridge regression </a:t>
             </a:r>
-            <a:endParaRPr lang="en-US" dirty="0"/>
           </a:p>
         </p:txBody>
       </p:sp>
@@ -7780,15 +7406,15 @@
           <a:lstStyle/>
           <a:p>
             <a:r>
-              <a:rPr lang="en-US" dirty="0" smtClean="0"/>
+              <a:rPr lang="en-US" dirty="0"/>
               <a:t>Ridge replaces the RSS term:                                           with a new minimizer that includes a so-called </a:t>
             </a:r>
             <a:r>
-              <a:rPr lang="en-US" b="0" dirty="0" smtClean="0"/>
+              <a:rPr lang="en-US" b="0" dirty="0"/>
               <a:t>shrinkage penalty</a:t>
             </a:r>
             <a:r>
-              <a:rPr lang="en-US" dirty="0" smtClean="0"/>
+              <a:rPr lang="en-US" dirty="0"/>
               <a:t>: </a:t>
             </a:r>
           </a:p>
@@ -7796,25 +7422,15 @@
             <a:endParaRPr lang="en-US" dirty="0"/>
           </a:p>
           <a:p>
-            <a:endParaRPr lang="en-US" dirty="0" smtClean="0"/>
-          </a:p>
-          <a:p>
             <a:endParaRPr lang="en-US" dirty="0"/>
           </a:p>
           <a:p>
-            <a:r>
-              <a:rPr lang="en-US" dirty="0" smtClean="0"/>
+            <a:endParaRPr lang="en-US" dirty="0"/>
+          </a:p>
+          <a:p>
+            <a:r>
+              <a:rPr lang="en-US" dirty="0"/>
               <a:t>The adjustable parameter </a:t>
-            </a:r>
-            <a:r>
-              <a:rPr lang="en-US" dirty="0" smtClean="0">
-                <a:latin typeface="symbol" charset="2"/>
-              </a:rPr>
-              <a:t>l</a:t>
-            </a:r>
-            <a:r>
-              <a:rPr lang="en-US" dirty="0" smtClean="0"/>
-              <a:t>, trades the baseline RSS with a penalty for nonzero coefficients.  As </a:t>
             </a:r>
             <a:r>
               <a:rPr lang="en-US" dirty="0">
@@ -7823,10 +7439,19 @@
               <a:t>l</a:t>
             </a:r>
             <a:r>
-              <a:rPr lang="en-US" dirty="0" smtClean="0"/>
+              <a:rPr lang="en-US" dirty="0"/>
+              <a:t>, trades the baseline RSS with a penalty for nonzero coefficients.  As </a:t>
+            </a:r>
+            <a:r>
+              <a:rPr lang="en-US" dirty="0">
+                <a:latin typeface="symbol" charset="2"/>
+              </a:rPr>
+              <a:t>l</a:t>
+            </a:r>
+            <a:r>
+              <a:rPr lang="en-US" dirty="0"/>
               <a:t> increases to infinity the minimized error drives all of the coefficients to zero </a:t>
             </a:r>
-            <a:endParaRPr lang="en-US" dirty="0"/>
           </a:p>
         </p:txBody>
       </p:sp>
@@ -7888,13 +7513,6 @@
   <p:clrMapOvr>
     <a:masterClrMapping/>
   </p:clrMapOvr>
-  <p:timing>
-    <p:tnLst>
-      <p:par>
-        <p:cTn id="1" dur="indefinite" restart="never" nodeType="tmRoot"/>
-      </p:par>
-    </p:tnLst>
-  </p:timing>
 </p:sld>
 </file>
 
@@ -7931,10 +7549,9 @@
           <a:lstStyle/>
           <a:p>
             <a:r>
-              <a:rPr lang="en-US" dirty="0" smtClean="0"/>
+              <a:rPr lang="en-US" dirty="0"/>
               <a:t>Ridge in practice</a:t>
             </a:r>
-            <a:endParaRPr lang="en-US" dirty="0"/>
           </a:p>
         </p:txBody>
       </p:sp>
@@ -7963,28 +7580,20 @@
               <a:buAutoNum type="arabicPeriod"/>
             </a:pPr>
             <a:r>
-              <a:rPr lang="en-US" dirty="0" smtClean="0"/>
+              <a:rPr lang="en-US" dirty="0"/>
               <a:t>Unlike RSS minimizers, which are </a:t>
             </a:r>
             <a:r>
-              <a:rPr lang="en-US" b="0" dirty="0" smtClean="0"/>
+              <a:rPr lang="en-US" b="0" dirty="0"/>
               <a:t>scale </a:t>
             </a:r>
             <a:r>
-              <a:rPr lang="en-US" b="0" dirty="0" err="1" smtClean="0"/>
+              <a:rPr lang="en-US" b="0" dirty="0" err="1"/>
               <a:t>equivariant</a:t>
             </a:r>
             <a:r>
-              <a:rPr lang="en-US" dirty="0" smtClean="0"/>
-              <a:t>, the </a:t>
-            </a:r>
-            <a:r>
-              <a:rPr lang="en-US" dirty="0" smtClean="0"/>
-              <a:t>predictor data </a:t>
-            </a:r>
-            <a:r>
-              <a:rPr lang="en-US" dirty="0" smtClean="0"/>
-              <a:t>must be normalized in regularization methods:</a:t>
+              <a:rPr lang="en-US" dirty="0"/>
+              <a:t>, the predictor data must be normalized in regularization methods:</a:t>
             </a:r>
           </a:p>
           <a:p>
@@ -8000,27 +7609,27 @@
               <a:buAutoNum type="arabicPeriod"/>
             </a:pPr>
             <a:r>
-              <a:rPr lang="en-US" dirty="0" smtClean="0"/>
+              <a:rPr lang="en-US" dirty="0"/>
               <a:t>Fit a series of ridge regression models across a wide range of </a:t>
             </a:r>
             <a:r>
-              <a:rPr lang="en-US" dirty="0" smtClean="0">
+              <a:rPr lang="en-US" dirty="0">
                 <a:latin typeface="symbol" charset="2"/>
               </a:rPr>
               <a:t>l</a:t>
             </a:r>
             <a:r>
-              <a:rPr lang="en-US" dirty="0" smtClean="0"/>
+              <a:rPr lang="en-US" dirty="0"/>
               <a:t> and track the coefficient values and test set error (or estimate) as </a:t>
             </a:r>
             <a:r>
-              <a:rPr lang="en-US" dirty="0" smtClean="0">
+              <a:rPr lang="en-US" dirty="0">
                 <a:latin typeface="symbol" charset="2"/>
               </a:rPr>
               <a:t>l</a:t>
             </a:r>
             <a:r>
-              <a:rPr lang="en-US" dirty="0" smtClean="0"/>
+              <a:rPr lang="en-US" dirty="0"/>
               <a:t> is changed</a:t>
             </a:r>
           </a:p>
@@ -8030,25 +7639,24 @@
               <a:buAutoNum type="arabicPeriod"/>
             </a:pPr>
             <a:r>
-              <a:rPr lang="en-US" dirty="0" smtClean="0"/>
+              <a:rPr lang="en-US" dirty="0"/>
               <a:t>Determine the model that produces the smallest test error set </a:t>
             </a:r>
           </a:p>
           <a:p>
             <a:pPr marL="857250" lvl="1" indent="-457200"/>
             <a:r>
-              <a:rPr lang="en-US" dirty="0" smtClean="0"/>
+              <a:rPr lang="en-US" dirty="0"/>
               <a:t>Alternatively determine the model w/smallest </a:t>
             </a:r>
             <a:r>
-              <a:rPr lang="en-US" b="0" dirty="0" smtClean="0"/>
+              <a:rPr lang="en-US" b="0" dirty="0"/>
               <a:t>validation</a:t>
             </a:r>
             <a:r>
-              <a:rPr lang="en-US" dirty="0" smtClean="0"/>
+              <a:rPr lang="en-US" dirty="0"/>
               <a:t> error and then estimate the true test error w/virgin data that was not used in the training </a:t>
             </a:r>
-            <a:endParaRPr lang="en-US" dirty="0"/>
           </a:p>
         </p:txBody>
       </p:sp>
@@ -8086,13 +7694,6 @@
   <p:clrMapOvr>
     <a:masterClrMapping/>
   </p:clrMapOvr>
-  <p:timing>
-    <p:tnLst>
-      <p:par>
-        <p:cTn id="1" dur="indefinite" restart="never" nodeType="tmRoot"/>
-      </p:par>
-    </p:tnLst>
-  </p:timing>
 </p:sld>
 </file>
 
@@ -8129,10 +7730,9 @@
           <a:lstStyle/>
           <a:p>
             <a:r>
-              <a:rPr lang="en-US" dirty="0" smtClean="0"/>
+              <a:rPr lang="en-US" dirty="0"/>
               <a:t>Expected response in ridge regression</a:t>
             </a:r>
-            <a:endParaRPr lang="en-US" dirty="0"/>
           </a:p>
         </p:txBody>
       </p:sp>
@@ -8231,10 +7831,9 @@
           <a:lstStyle/>
           <a:p>
             <a:r>
-              <a:rPr lang="en-US" dirty="0" smtClean="0"/>
+              <a:rPr lang="en-US" dirty="0"/>
               <a:t>= vector of least squares coefficient estimates</a:t>
             </a:r>
-            <a:endParaRPr lang="en-US" dirty="0"/>
           </a:p>
         </p:txBody>
       </p:sp>
@@ -8285,26 +7884,25 @@
           <a:lstStyle/>
           <a:p>
             <a:r>
-              <a:rPr lang="en-US" dirty="0" smtClean="0"/>
+              <a:rPr lang="en-US" dirty="0"/>
               <a:t>l</a:t>
             </a:r>
             <a:r>
-              <a:rPr lang="en-US" baseline="-25000" dirty="0" smtClean="0"/>
+              <a:rPr lang="en-US" baseline="-25000" dirty="0"/>
               <a:t>2</a:t>
             </a:r>
             <a:r>
-              <a:rPr lang="en-US" dirty="0" smtClean="0"/>
+              <a:rPr lang="en-US" dirty="0"/>
               <a:t> norm (distance of </a:t>
             </a:r>
             <a:r>
-              <a:rPr lang="en-US" i="1" dirty="0" smtClean="0"/>
+              <a:rPr lang="en-US" i="1" dirty="0"/>
               <a:t>β </a:t>
             </a:r>
             <a:r>
-              <a:rPr lang="en-US" dirty="0" smtClean="0"/>
+              <a:rPr lang="en-US" dirty="0"/>
               <a:t>from 0)</a:t>
             </a:r>
-            <a:endParaRPr lang="en-US" dirty="0"/>
           </a:p>
         </p:txBody>
       </p:sp>
@@ -8331,11 +7929,11 @@
           <a:lstStyle/>
           <a:p>
             <a:r>
-              <a:rPr lang="en-US" dirty="0" smtClean="0"/>
+              <a:rPr lang="en-US" dirty="0"/>
               <a:t>= amount coefficients have been driven to 0 (smaller = </a:t>
             </a:r>
             <a:r>
-              <a:rPr lang="en-US" smtClean="0"/>
+              <a:rPr lang="en-US"/>
               <a:t>more regularization)</a:t>
             </a:r>
             <a:endParaRPr lang="en-US" dirty="0"/>
@@ -8466,10 +8064,9 @@
           <a:lstStyle/>
           <a:p>
             <a:r>
-              <a:rPr lang="en-US" dirty="0" smtClean="0"/>
+              <a:rPr lang="en-US" dirty="0"/>
               <a:t>Expected response in ridge regression</a:t>
             </a:r>
-            <a:endParaRPr lang="en-US" dirty="0"/>
           </a:p>
         </p:txBody>
       </p:sp>
@@ -8507,13 +8104,6 @@
   <p:clrMapOvr>
     <a:masterClrMapping/>
   </p:clrMapOvr>
-  <p:timing>
-    <p:tnLst>
-      <p:par>
-        <p:cTn id="1" dur="indefinite" restart="never" nodeType="tmRoot"/>
-      </p:par>
-    </p:tnLst>
-  </p:timing>
 </p:sld>
 </file>
 
@@ -8550,10 +8140,9 @@
           <a:lstStyle/>
           <a:p>
             <a:r>
-              <a:rPr lang="en-US" dirty="0" smtClean="0"/>
+              <a:rPr lang="en-US" dirty="0"/>
               <a:t>Ridge in practice</a:t>
             </a:r>
-            <a:endParaRPr lang="en-US" dirty="0"/>
           </a:p>
         </p:txBody>
       </p:sp>
@@ -8582,7 +8171,7 @@
               <a:buAutoNum type="arabicPeriod"/>
             </a:pPr>
             <a:r>
-              <a:rPr lang="en-US" dirty="0" smtClean="0"/>
+              <a:rPr lang="en-US" dirty="0"/>
               <a:t>When 𝛌 = 0, Ridge = linear regression</a:t>
             </a:r>
           </a:p>
@@ -8592,7 +8181,7 @@
               <a:buAutoNum type="arabicPeriod"/>
             </a:pPr>
             <a:r>
-              <a:rPr lang="en-US" dirty="0" smtClean="0"/>
+              <a:rPr lang="en-US" dirty="0"/>
               <a:t>Variance is high, but there is no bias</a:t>
             </a:r>
           </a:p>
@@ -8602,7 +8191,7 @@
               <a:buAutoNum type="arabicPeriod"/>
             </a:pPr>
             <a:r>
-              <a:rPr lang="en-US" dirty="0" smtClean="0"/>
+              <a:rPr lang="en-US" dirty="0"/>
               <a:t>As 𝛌 increases, the flexibility of the regression decreases</a:t>
             </a:r>
           </a:p>
@@ -8612,7 +8201,7 @@
               <a:buAutoNum type="arabicPeriod"/>
             </a:pPr>
             <a:r>
-              <a:rPr lang="en-US" dirty="0" smtClean="0"/>
+              <a:rPr lang="en-US" dirty="0"/>
               <a:t>Leads to decreased variance of prediction</a:t>
             </a:r>
           </a:p>
@@ -8622,7 +8211,7 @@
               <a:buAutoNum type="arabicPeriod"/>
             </a:pPr>
             <a:r>
-              <a:rPr lang="en-US" dirty="0" smtClean="0"/>
+              <a:rPr lang="en-US" dirty="0"/>
               <a:t>Increased bias</a:t>
             </a:r>
           </a:p>
@@ -8631,14 +8220,14 @@
               <a:buFont typeface="+mj-lt"/>
               <a:buAutoNum type="arabicPeriod"/>
             </a:pPr>
-            <a:endParaRPr lang="en-US" dirty="0" smtClean="0"/>
+            <a:endParaRPr lang="en-US" dirty="0"/>
           </a:p>
           <a:p>
             <a:pPr marL="0" indent="0">
               <a:buNone/>
             </a:pPr>
             <a:r>
-              <a:rPr lang="en-US" sz="1800" dirty="0" smtClean="0"/>
+              <a:rPr lang="en-US" sz="1800" dirty="0"/>
               <a:t>The </a:t>
             </a:r>
             <a:r>
@@ -8679,7 +8268,7 @@
             <a:pPr marL="0" indent="0">
               <a:buNone/>
             </a:pPr>
-            <a:endParaRPr lang="en-US" sz="1800" dirty="0" smtClean="0"/>
+            <a:endParaRPr lang="en-US" sz="1800" dirty="0"/>
           </a:p>
           <a:p>
             <a:pPr marL="857250" lvl="1" indent="-457200">
@@ -8737,10 +8326,9 @@
           <a:lstStyle/>
           <a:p>
             <a:r>
-              <a:rPr lang="en-US" smtClean="0"/>
+              <a:rPr lang="en-US"/>
               <a:t>MSE</a:t>
             </a:r>
-            <a:endParaRPr lang="en-US"/>
           </a:p>
         </p:txBody>
       </p:sp>
@@ -8817,13 +8405,6 @@
   <p:clrMapOvr>
     <a:masterClrMapping/>
   </p:clrMapOvr>
-  <p:timing>
-    <p:tnLst>
-      <p:par>
-        <p:cTn id="1" dur="indefinite" restart="never" nodeType="tmRoot"/>
-      </p:par>
-    </p:tnLst>
-  </p:timing>
 </p:sld>
 </file>
 
@@ -8860,10 +8441,9 @@
           <a:lstStyle/>
           <a:p>
             <a:r>
-              <a:rPr lang="en-US" dirty="0" smtClean="0"/>
+              <a:rPr lang="en-US" dirty="0"/>
               <a:t>Ridge in practice</a:t>
             </a:r>
-            <a:endParaRPr lang="en-US" dirty="0"/>
           </a:p>
         </p:txBody>
       </p:sp>
@@ -8892,7 +8472,7 @@
               <a:buAutoNum type="arabicPeriod"/>
             </a:pPr>
             <a:r>
-              <a:rPr lang="en-US" dirty="0" smtClean="0"/>
+              <a:rPr lang="en-US" dirty="0"/>
               <a:t>Ridge is more computational feasible than forward and reverse best subset</a:t>
             </a:r>
           </a:p>
@@ -8902,7 +8482,7 @@
               <a:buAutoNum type="arabicPeriod"/>
             </a:pPr>
             <a:r>
-              <a:rPr lang="en-US" dirty="0" smtClean="0"/>
+              <a:rPr lang="en-US" dirty="0"/>
               <a:t>Least squares linear regression can’t find a solution when n &lt; p, Ridge can</a:t>
             </a:r>
           </a:p>
@@ -8912,7 +8492,7 @@
               <a:buAutoNum type="arabicPeriod"/>
             </a:pPr>
             <a:r>
-              <a:rPr lang="en-US" dirty="0" smtClean="0"/>
+              <a:rPr lang="en-US" dirty="0"/>
               <a:t>Ridge works best when least squares estimates have high variance</a:t>
             </a:r>
           </a:p>
@@ -8921,7 +8501,7 @@
               <a:buFont typeface="+mj-lt"/>
               <a:buAutoNum type="arabicPeriod"/>
             </a:pPr>
-            <a:endParaRPr lang="en-US" dirty="0" smtClean="0"/>
+            <a:endParaRPr lang="en-US" dirty="0"/>
           </a:p>
           <a:p>
             <a:pPr marL="857250" lvl="1" indent="-457200">
@@ -8942,13 +8522,6 @@
   <p:clrMapOvr>
     <a:masterClrMapping/>
   </p:clrMapOvr>
-  <p:timing>
-    <p:tnLst>
-      <p:par>
-        <p:cTn id="1" dur="indefinite" restart="never" nodeType="tmRoot"/>
-      </p:par>
-    </p:tnLst>
-  </p:timing>
 </p:sld>
 </file>
 
@@ -8985,10 +8558,9 @@
           <a:lstStyle/>
           <a:p>
             <a:r>
-              <a:rPr lang="en-US" dirty="0" smtClean="0"/>
+              <a:rPr lang="en-US" dirty="0"/>
               <a:t>LASSO regression </a:t>
             </a:r>
-            <a:endParaRPr lang="en-US" dirty="0"/>
           </a:p>
         </p:txBody>
       </p:sp>
@@ -9008,44 +8580,42 @@
           <a:lstStyle/>
           <a:p>
             <a:r>
-              <a:rPr lang="en-US" dirty="0" smtClean="0"/>
+              <a:rPr lang="en-US" dirty="0"/>
               <a:t>Ridge regression does not set any of the coefficients exactly to zero but can shrink all of them </a:t>
             </a:r>
-            <a:endParaRPr lang="en-US" dirty="0" smtClean="0"/>
           </a:p>
           <a:p>
             <a:pPr lvl="1"/>
             <a:r>
-              <a:rPr lang="en-US" dirty="0" smtClean="0"/>
+              <a:rPr lang="en-US" dirty="0"/>
               <a:t>Final model still includes all </a:t>
             </a:r>
             <a:r>
-              <a:rPr lang="en-US" i="1" dirty="0" smtClean="0"/>
+              <a:rPr lang="en-US" i="1" dirty="0"/>
               <a:t>p</a:t>
             </a:r>
             <a:r>
-              <a:rPr lang="en-US" dirty="0" smtClean="0"/>
+              <a:rPr lang="en-US" dirty="0"/>
               <a:t> predictors</a:t>
             </a:r>
-            <a:endParaRPr lang="en-US" dirty="0" smtClean="0"/>
-          </a:p>
-          <a:p>
-            <a:r>
-              <a:rPr lang="en-US" dirty="0" smtClean="0"/>
+          </a:p>
+          <a:p>
+            <a:r>
+              <a:rPr lang="en-US" dirty="0"/>
               <a:t>The LASSO regression was developed, inspired by ridge, to provide the </a:t>
             </a:r>
             <a:r>
-              <a:rPr lang="en-US" b="0" dirty="0" smtClean="0"/>
+              <a:rPr lang="en-US" b="0" dirty="0"/>
               <a:t>possibility</a:t>
             </a:r>
             <a:r>
-              <a:rPr lang="en-US" dirty="0" smtClean="0"/>
+              <a:rPr lang="en-US" dirty="0"/>
               <a:t> that some of the coefficients can take a value of zero </a:t>
             </a:r>
           </a:p>
           <a:p>
             <a:r>
-              <a:rPr lang="en-US" dirty="0" smtClean="0"/>
+              <a:rPr lang="en-US" dirty="0"/>
               <a:t>Like ridge, the LASSO operator is minimized as a function of an adjustable </a:t>
             </a:r>
             <a:r>
@@ -9055,10 +8625,9 @@
               <a:t>l </a:t>
             </a:r>
             <a:r>
-              <a:rPr lang="en-US" dirty="0" smtClean="0"/>
+              <a:rPr lang="en-US" dirty="0"/>
               <a:t>parameter  </a:t>
             </a:r>
-            <a:endParaRPr lang="en-US" dirty="0"/>
           </a:p>
         </p:txBody>
       </p:sp>
@@ -9096,13 +8665,6 @@
   <p:clrMapOvr>
     <a:masterClrMapping/>
   </p:clrMapOvr>
-  <p:timing>
-    <p:tnLst>
-      <p:par>
-        <p:cTn id="1" dur="indefinite" restart="never" nodeType="tmRoot"/>
-      </p:par>
-    </p:tnLst>
-  </p:timing>
 </p:sld>
 </file>
 
@@ -9139,10 +8701,9 @@
           <a:lstStyle/>
           <a:p>
             <a:r>
-              <a:rPr lang="en-US" dirty="0" smtClean="0"/>
+              <a:rPr lang="en-US" dirty="0"/>
               <a:t>An extra bonus in LASSO: subset selection</a:t>
             </a:r>
-            <a:endParaRPr lang="en-US" dirty="0"/>
           </a:p>
         </p:txBody>
       </p:sp>
@@ -9162,34 +8723,33 @@
           <a:lstStyle/>
           <a:p>
             <a:r>
-              <a:rPr lang="en-US" sz="2000" dirty="0" smtClean="0"/>
+              <a:rPr lang="en-US" sz="2000" dirty="0"/>
               <a:t>The key difference is the penalty due to nonzero coefficients. Ridge it is squared, in LASSO it is not.  You can also formulate both as </a:t>
             </a:r>
             <a:r>
-              <a:rPr lang="en-US" sz="2000" b="0" dirty="0" smtClean="0"/>
+              <a:rPr lang="en-US" sz="2000" b="0" dirty="0"/>
               <a:t>constrained </a:t>
             </a:r>
             <a:r>
-              <a:rPr lang="en-US" sz="2000" dirty="0" smtClean="0"/>
+              <a:rPr lang="en-US" sz="2000" dirty="0"/>
               <a:t>minimization problems.  </a:t>
             </a:r>
           </a:p>
           <a:p>
             <a:r>
-              <a:rPr lang="en-US" sz="2000" dirty="0" smtClean="0"/>
+              <a:rPr lang="en-US" sz="2000" dirty="0"/>
               <a:t>A mathematical result of LASSO (6.8), is the possibility that some of the </a:t>
             </a:r>
             <a:r>
-              <a:rPr lang="en-US" sz="2000" dirty="0" smtClean="0">
+              <a:rPr lang="en-US" sz="2000" dirty="0">
                 <a:latin typeface="symbol" charset="2"/>
               </a:rPr>
               <a:t>b</a:t>
             </a:r>
             <a:r>
-              <a:rPr lang="en-US" sz="2000" dirty="0" smtClean="0"/>
+              <a:rPr lang="en-US" sz="2000" dirty="0"/>
               <a:t> values will be zero at the minimum error</a:t>
             </a:r>
-            <a:endParaRPr lang="en-US" sz="2000" dirty="0"/>
           </a:p>
         </p:txBody>
       </p:sp>
@@ -9227,13 +8787,6 @@
   <p:clrMapOvr>
     <a:masterClrMapping/>
   </p:clrMapOvr>
-  <p:timing>
-    <p:tnLst>
-      <p:par>
-        <p:cTn id="1" dur="indefinite" restart="never" nodeType="tmRoot"/>
-      </p:par>
-    </p:tnLst>
-  </p:timing>
 </p:sld>
 </file>
 
@@ -9270,10 +8823,9 @@
           <a:lstStyle/>
           <a:p>
             <a:r>
-              <a:rPr lang="en-US" dirty="0" smtClean="0"/>
+              <a:rPr lang="en-US" dirty="0"/>
               <a:t>Why can LASSO coefficients become zero?</a:t>
             </a:r>
-            <a:endParaRPr lang="en-US" dirty="0"/>
           </a:p>
         </p:txBody>
       </p:sp>
@@ -9324,10 +8876,9 @@
           <a:lstStyle/>
           <a:p>
             <a:r>
-              <a:rPr lang="en-US" b="1" dirty="0" smtClean="0"/>
+              <a:rPr lang="en-US" b="1" dirty="0"/>
               <a:t>LASSO					Ridge</a:t>
             </a:r>
-            <a:endParaRPr lang="en-US" b="1" dirty="0"/>
           </a:p>
         </p:txBody>
       </p:sp>
@@ -9354,14 +8905,13 @@
           <a:lstStyle/>
           <a:p>
             <a:r>
-              <a:rPr lang="en-US" b="1" dirty="0" smtClean="0"/>
+              <a:rPr lang="en-US" b="1" dirty="0"/>
               <a:t>Red</a:t>
             </a:r>
             <a:r>
-              <a:rPr lang="en-US" dirty="0" smtClean="0"/>
+              <a:rPr lang="en-US" dirty="0"/>
               <a:t> =  RSS</a:t>
             </a:r>
-            <a:endParaRPr lang="en-US" dirty="0"/>
           </a:p>
         </p:txBody>
       </p:sp>
@@ -9388,14 +8938,13 @@
           <a:lstStyle/>
           <a:p>
             <a:r>
-              <a:rPr lang="en-US" b="1" dirty="0" smtClean="0"/>
+              <a:rPr lang="en-US" b="1" dirty="0"/>
               <a:t>Blue</a:t>
             </a:r>
             <a:r>
-              <a:rPr lang="en-US" dirty="0" smtClean="0"/>
+              <a:rPr lang="en-US" dirty="0"/>
               <a:t> = constraint zone</a:t>
             </a:r>
-            <a:endParaRPr lang="en-US" dirty="0"/>
           </a:p>
         </p:txBody>
       </p:sp>
@@ -9409,13 +8958,6 @@
   <p:clrMapOvr>
     <a:masterClrMapping/>
   </p:clrMapOvr>
-  <p:timing>
-    <p:tnLst>
-      <p:par>
-        <p:cTn id="1" dur="indefinite" restart="never" nodeType="tmRoot"/>
-      </p:par>
-    </p:tnLst>
-  </p:timing>
 </p:sld>
 </file>
 
@@ -9452,10 +8994,9 @@
           <a:lstStyle/>
           <a:p>
             <a:r>
-              <a:rPr lang="en-US" dirty="0" smtClean="0"/>
+              <a:rPr lang="en-US" dirty="0"/>
               <a:t>Python practice </a:t>
             </a:r>
-            <a:endParaRPr lang="en-US" dirty="0"/>
           </a:p>
         </p:txBody>
       </p:sp>
@@ -9475,28 +9016,27 @@
           <a:lstStyle/>
           <a:p>
             <a:r>
-              <a:rPr lang="en-US" dirty="0" smtClean="0"/>
+              <a:rPr lang="en-US" dirty="0"/>
               <a:t>We will use a data set from UCI Irvine ML database related to insulation and energy efficiency </a:t>
             </a:r>
           </a:p>
           <a:p>
             <a:r>
-              <a:rPr lang="en-US" dirty="0" smtClean="0"/>
+              <a:rPr lang="en-US" dirty="0"/>
               <a:t>There are 8 predictors (X1-8) and 2 responses (Y1-Y2) </a:t>
             </a:r>
           </a:p>
           <a:p>
             <a:r>
-              <a:rPr lang="en-US" dirty="0" smtClean="0"/>
+              <a:rPr lang="en-US" dirty="0"/>
               <a:t>I have a notebook setup for ML regression, ridge and lasso.  Some missing pieces and suggestions. </a:t>
             </a:r>
           </a:p>
           <a:p>
             <a:r>
-              <a:rPr lang="en-US" dirty="0" smtClean="0"/>
+              <a:rPr lang="en-US" dirty="0"/>
               <a:t>Find a friend and dig in! </a:t>
             </a:r>
-            <a:endParaRPr lang="en-US" dirty="0"/>
           </a:p>
         </p:txBody>
       </p:sp>
@@ -9510,13 +9050,6 @@
   <p:clrMapOvr>
     <a:masterClrMapping/>
   </p:clrMapOvr>
-  <p:timing>
-    <p:tnLst>
-      <p:par>
-        <p:cTn id="1" dur="indefinite" restart="never" nodeType="tmRoot"/>
-      </p:par>
-    </p:tnLst>
-  </p:timing>
 </p:sld>
 </file>
 
@@ -9553,10 +9086,9 @@
           <a:lstStyle/>
           <a:p>
             <a:r>
-              <a:rPr lang="en-US" dirty="0" smtClean="0"/>
+              <a:rPr lang="en-US" dirty="0"/>
               <a:t>Resampling methods (CH5, ISL)  </a:t>
             </a:r>
-            <a:endParaRPr lang="en-US" dirty="0"/>
           </a:p>
         </p:txBody>
       </p:sp>
@@ -9576,98 +9108,53 @@
           <a:lstStyle/>
           <a:p>
             <a:r>
-              <a:rPr lang="en-US" dirty="0" smtClean="0"/>
+              <a:rPr lang="en-US" dirty="0"/>
               <a:t>Resampling concept </a:t>
             </a:r>
           </a:p>
           <a:p>
             <a:pPr lvl="1"/>
             <a:r>
-              <a:rPr lang="en-US" dirty="0" smtClean="0"/>
-              <a:t>Doing more with your </a:t>
-            </a:r>
-            <a:r>
-              <a:rPr lang="en-US" dirty="0" smtClean="0"/>
-              <a:t>data</a:t>
+              <a:rPr lang="en-US" dirty="0"/>
+              <a:t>Doing more with your data</a:t>
             </a:r>
           </a:p>
           <a:p>
             <a:pPr lvl="1"/>
             <a:r>
               <a:rPr lang="en-US" dirty="0"/>
-              <a:t>R</a:t>
-            </a:r>
-            <a:r>
-              <a:rPr lang="en-US" dirty="0" smtClean="0"/>
-              <a:t>epeatedly </a:t>
-            </a:r>
-            <a:r>
-              <a:rPr lang="en-US" dirty="0"/>
-              <a:t>drawing samples from a training set and refitting a </a:t>
-            </a:r>
-            <a:r>
-              <a:rPr lang="en-US" dirty="0" smtClean="0"/>
-              <a:t>model for </a:t>
-            </a:r>
-            <a:r>
-              <a:rPr lang="en-US" dirty="0"/>
-              <a:t>each </a:t>
-            </a:r>
-            <a:r>
-              <a:rPr lang="en-US" dirty="0" smtClean="0"/>
-              <a:t>sample</a:t>
+              <a:t>Repeatedly drawing samples from a training set and refitting a model for each sample</a:t>
             </a:r>
           </a:p>
           <a:p>
             <a:pPr lvl="1"/>
             <a:r>
               <a:rPr lang="en-US" dirty="0"/>
-              <a:t>O</a:t>
-            </a:r>
-            <a:r>
-              <a:rPr lang="en-US" dirty="0" smtClean="0"/>
-              <a:t>btain </a:t>
-            </a:r>
-            <a:r>
-              <a:rPr lang="en-US" dirty="0"/>
-              <a:t>additional information </a:t>
-            </a:r>
-            <a:r>
-              <a:rPr lang="en-US" dirty="0" smtClean="0"/>
-              <a:t>about the </a:t>
-            </a:r>
-            <a:r>
-              <a:rPr lang="en-US" dirty="0"/>
-              <a:t>fitted </a:t>
-            </a:r>
-            <a:r>
-              <a:rPr lang="en-US" dirty="0" smtClean="0"/>
-              <a:t>model</a:t>
+              <a:t>Obtain additional information about the fitted model</a:t>
             </a:r>
           </a:p>
           <a:p>
             <a:pPr lvl="1"/>
             <a:r>
-              <a:rPr lang="en-US" dirty="0" smtClean="0"/>
+              <a:rPr lang="en-US" dirty="0"/>
               <a:t>Trade computational expense for data</a:t>
             </a:r>
-            <a:endParaRPr lang="en-US" dirty="0"/>
-          </a:p>
-          <a:p>
-            <a:r>
-              <a:rPr lang="en-US" dirty="0" smtClean="0"/>
+          </a:p>
+          <a:p>
+            <a:r>
+              <a:rPr lang="en-US" dirty="0"/>
               <a:t>A big warning: </a:t>
             </a:r>
             <a:r>
-              <a:rPr lang="en-US" b="0" dirty="0" smtClean="0"/>
+              <a:rPr lang="en-US" b="0" dirty="0"/>
               <a:t>as introduced today, the resampling schemes are not to be used to generate independent predictions (</a:t>
             </a:r>
             <a:r>
-              <a:rPr lang="en-US" dirty="0" smtClean="0"/>
+              <a:rPr lang="en-US" dirty="0"/>
               <a:t>of Y</a:t>
             </a:r>
             <a:r>
-              <a:rPr lang="en-US" b="0" dirty="0" smtClean="0"/>
+              <a:rPr lang="en-US" b="0" dirty="0"/>
               <a:t>) for averaging later.  </a:t>
             </a:r>
           </a:p>
@@ -9683,13 +9170,6 @@
   <p:clrMapOvr>
     <a:masterClrMapping/>
   </p:clrMapOvr>
-  <p:timing>
-    <p:tnLst>
-      <p:par>
-        <p:cTn id="1" dur="indefinite" restart="never" nodeType="tmRoot"/>
-      </p:par>
-    </p:tnLst>
-  </p:timing>
 </p:sld>
 </file>
 
@@ -9726,10 +9206,9 @@
           <a:lstStyle/>
           <a:p>
             <a:r>
-              <a:rPr lang="en-US" dirty="0" smtClean="0"/>
+              <a:rPr lang="en-US" dirty="0"/>
               <a:t>Wrap up</a:t>
             </a:r>
-            <a:endParaRPr lang="en-US" dirty="0"/>
           </a:p>
         </p:txBody>
       </p:sp>
@@ -9765,66 +9244,66 @@
           </a:p>
           <a:p>
             <a:r>
-              <a:rPr lang="en-US" dirty="0" smtClean="0"/>
+              <a:rPr lang="en-US" dirty="0"/>
               <a:t>Must understand different methods for dealing with large P models! </a:t>
             </a:r>
           </a:p>
           <a:p>
             <a:pPr lvl="1"/>
             <a:r>
-              <a:rPr lang="en-US" dirty="0" smtClean="0"/>
+              <a:rPr lang="en-US" dirty="0"/>
               <a:t>Subset selection and regularization (shrinkage) </a:t>
             </a:r>
           </a:p>
           <a:p>
             <a:pPr lvl="1"/>
             <a:r>
-              <a:rPr lang="en-US" dirty="0" smtClean="0"/>
+              <a:rPr lang="en-US" dirty="0"/>
               <a:t>Also can use </a:t>
             </a:r>
             <a:r>
-              <a:rPr lang="en-US" b="0" dirty="0" smtClean="0"/>
+              <a:rPr lang="en-US" b="0" dirty="0"/>
               <a:t>dimensionality reduction</a:t>
             </a:r>
             <a:r>
-              <a:rPr lang="en-US" dirty="0" smtClean="0"/>
+              <a:rPr lang="en-US" dirty="0"/>
               <a:t> (see end of CH6, ISL)</a:t>
             </a:r>
           </a:p>
           <a:p>
             <a:pPr lvl="1"/>
             <a:r>
-              <a:rPr lang="en-US" dirty="0" smtClean="0"/>
+              <a:rPr lang="en-US" dirty="0"/>
               <a:t>These same concepts apply to many types of nonlinear models</a:t>
             </a:r>
           </a:p>
           <a:p>
             <a:r>
-              <a:rPr lang="en-US" dirty="0" smtClean="0"/>
+              <a:rPr lang="en-US" dirty="0"/>
               <a:t>What we didn’t cover in this module of the class:</a:t>
             </a:r>
           </a:p>
           <a:p>
             <a:pPr lvl="1"/>
             <a:r>
-              <a:rPr lang="en-US" dirty="0" smtClean="0"/>
+              <a:rPr lang="en-US" dirty="0"/>
               <a:t>Dimensionality reduction methods (CH6)</a:t>
             </a:r>
           </a:p>
           <a:p>
             <a:pPr lvl="1"/>
             <a:r>
-              <a:rPr lang="en-US" dirty="0" smtClean="0"/>
+              <a:rPr lang="en-US" dirty="0"/>
               <a:t>Nonlinear regression w/polynomials and splines (CH7)</a:t>
             </a:r>
           </a:p>
           <a:p>
             <a:r>
-              <a:rPr lang="en-US" smtClean="0"/>
+              <a:rPr lang="en-US"/>
               <a:t>Tuesday: </a:t>
             </a:r>
             <a:r>
-              <a:rPr lang="en-US" dirty="0" smtClean="0"/>
+              <a:rPr lang="en-US" dirty="0"/>
               <a:t>CH8 , tree methods </a:t>
             </a:r>
           </a:p>
@@ -9840,13 +9319,6 @@
   <p:clrMapOvr>
     <a:masterClrMapping/>
   </p:clrMapOvr>
-  <p:timing>
-    <p:tnLst>
-      <p:par>
-        <p:cTn id="1" dur="indefinite" restart="never" nodeType="tmRoot"/>
-      </p:par>
-    </p:tnLst>
-  </p:timing>
 </p:sld>
 </file>
 
@@ -9883,10 +9355,9 @@
           <a:lstStyle/>
           <a:p>
             <a:r>
-              <a:rPr lang="en-US" dirty="0" smtClean="0"/>
+              <a:rPr lang="en-US" dirty="0"/>
               <a:t>Test-train split, hold-out set, validation-set</a:t>
             </a:r>
-            <a:endParaRPr lang="en-US" dirty="0"/>
           </a:p>
         </p:txBody>
       </p:sp>
@@ -9906,44 +9377,40 @@
           <a:lstStyle/>
           <a:p>
             <a:r>
-              <a:rPr lang="en-US" dirty="0" smtClean="0"/>
+              <a:rPr lang="en-US" dirty="0"/>
               <a:t>Suppose you have </a:t>
             </a:r>
             <a:r>
-              <a:rPr lang="en-US" u="sng" dirty="0" smtClean="0"/>
+              <a:rPr lang="en-US" u="sng" dirty="0"/>
               <a:t>one</a:t>
             </a:r>
             <a:r>
-              <a:rPr lang="en-US" dirty="0" smtClean="0"/>
+              <a:rPr lang="en-US" dirty="0"/>
               <a:t> set of data and you have to decide how to break it into pieces for </a:t>
             </a:r>
             <a:r>
-              <a:rPr lang="en-US" b="0" dirty="0" smtClean="0"/>
+              <a:rPr lang="en-US" b="0" dirty="0"/>
               <a:t>training</a:t>
             </a:r>
             <a:r>
-              <a:rPr lang="en-US" dirty="0" smtClean="0"/>
+              <a:rPr lang="en-US" dirty="0"/>
               <a:t> and </a:t>
             </a:r>
             <a:r>
-              <a:rPr lang="en-US" b="0" dirty="0" smtClean="0"/>
+              <a:rPr lang="en-US" b="0" dirty="0"/>
               <a:t>validation </a:t>
             </a:r>
           </a:p>
           <a:p>
             <a:r>
-              <a:rPr lang="en-US" dirty="0" smtClean="0"/>
+              <a:rPr lang="en-US" dirty="0"/>
               <a:t>Simplest approach is the “validation set” , just break it into two pieces </a:t>
             </a:r>
           </a:p>
           <a:p>
             <a:r>
-              <a:rPr lang="en-US" dirty="0" smtClean="0"/>
-              <a:t>Example (Fig 5.2) looking at </a:t>
-            </a:r>
-            <a:r>
-              <a:rPr lang="en-US" dirty="0" smtClean="0"/>
-              <a:t>variation</a:t>
+              <a:rPr lang="en-US" dirty="0"/>
+              <a:t>Example (Fig 5.2) looking at variation</a:t>
             </a:r>
           </a:p>
         </p:txBody>
@@ -9997,46 +9464,44 @@
           <a:lstStyle/>
           <a:p>
             <a:r>
-              <a:rPr lang="en-US" dirty="0" smtClean="0"/>
+              <a:rPr lang="en-US" dirty="0"/>
               <a:t>Left: </a:t>
             </a:r>
             <a:r>
-              <a:rPr lang="en-US" u="sng" dirty="0" smtClean="0"/>
+              <a:rPr lang="en-US" u="sng" dirty="0"/>
               <a:t>training </a:t>
             </a:r>
             <a:r>
-              <a:rPr lang="en-US" dirty="0" smtClean="0"/>
+              <a:rPr lang="en-US" dirty="0"/>
               <a:t>MSE vs n for one data set</a:t>
             </a:r>
+          </a:p>
+          <a:p>
+            <a:r>
+              <a:rPr lang="en-US" dirty="0"/>
+              <a:t>Right: </a:t>
+            </a:r>
+            <a:r>
+              <a:rPr lang="en-US" u="sng" dirty="0"/>
+              <a:t>training </a:t>
+            </a:r>
+            <a:r>
+              <a:rPr lang="en-US" dirty="0"/>
+              <a:t>MSE vs n for 10 validation sets</a:t>
+            </a:r>
+          </a:p>
+          <a:p>
             <a:endParaRPr lang="en-US" dirty="0"/>
           </a:p>
           <a:p>
             <a:r>
-              <a:rPr lang="en-US" dirty="0" smtClean="0"/>
-              <a:t>Right: </a:t>
-            </a:r>
-            <a:r>
-              <a:rPr lang="en-US" u="sng" dirty="0" smtClean="0"/>
-              <a:t>training </a:t>
-            </a:r>
-            <a:r>
-              <a:rPr lang="en-US" dirty="0" smtClean="0"/>
-              <a:t>MSE vs n for 10 validation sets</a:t>
-            </a:r>
-          </a:p>
-          <a:p>
-            <a:endParaRPr lang="en-US" dirty="0"/>
-          </a:p>
-          <a:p>
-            <a:r>
-              <a:rPr lang="en-US" b="1" dirty="0" smtClean="0"/>
+              <a:rPr lang="en-US" b="1" dirty="0"/>
               <a:t>Riddle me this</a:t>
             </a:r>
             <a:r>
-              <a:rPr lang="en-US" dirty="0" smtClean="0"/>
+              <a:rPr lang="en-US" dirty="0"/>
               <a:t>, how many ways are there to choose two 500 data sets from 1000?</a:t>
             </a:r>
-            <a:endParaRPr lang="en-US" dirty="0"/>
           </a:p>
         </p:txBody>
       </p:sp>
@@ -10050,13 +9515,6 @@
   <p:clrMapOvr>
     <a:masterClrMapping/>
   </p:clrMapOvr>
-  <p:timing>
-    <p:tnLst>
-      <p:par>
-        <p:cTn id="1" dur="indefinite" restart="never" nodeType="tmRoot"/>
-      </p:par>
-    </p:tnLst>
-  </p:timing>
 </p:sld>
 </file>
 
@@ -10093,10 +9551,9 @@
           <a:lstStyle/>
           <a:p>
             <a:r>
-              <a:rPr lang="en-US" dirty="0" smtClean="0"/>
+              <a:rPr lang="en-US" dirty="0"/>
               <a:t>Cross Validation (k-fold)</a:t>
             </a:r>
-            <a:endParaRPr lang="en-US" dirty="0"/>
           </a:p>
         </p:txBody>
       </p:sp>
@@ -10174,30 +9631,29 @@
           <a:lstStyle/>
           <a:p>
             <a:r>
-              <a:rPr lang="en-US" dirty="0" smtClean="0"/>
+              <a:rPr lang="en-US" dirty="0"/>
               <a:t>Left: </a:t>
             </a:r>
             <a:r>
-              <a:rPr lang="en-US" u="sng" dirty="0" smtClean="0"/>
+              <a:rPr lang="en-US" u="sng" dirty="0"/>
               <a:t>training </a:t>
             </a:r>
             <a:r>
-              <a:rPr lang="en-US" dirty="0" smtClean="0"/>
+              <a:rPr lang="en-US" dirty="0"/>
               <a:t>MSE vs n for one data set</a:t>
             </a:r>
-            <a:endParaRPr lang="en-US" dirty="0"/>
-          </a:p>
-          <a:p>
-            <a:r>
-              <a:rPr lang="en-US" dirty="0" smtClean="0"/>
+          </a:p>
+          <a:p>
+            <a:r>
+              <a:rPr lang="en-US" dirty="0"/>
               <a:t>Right: </a:t>
             </a:r>
             <a:r>
-              <a:rPr lang="en-US" u="sng" dirty="0" smtClean="0"/>
+              <a:rPr lang="en-US" u="sng" dirty="0"/>
               <a:t>training </a:t>
             </a:r>
             <a:r>
-              <a:rPr lang="en-US" dirty="0" smtClean="0"/>
+              <a:rPr lang="en-US" dirty="0"/>
               <a:t>MSE vs n for 10 validation sets</a:t>
             </a:r>
           </a:p>
@@ -10216,13 +9672,6 @@
   <p:clrMapOvr>
     <a:masterClrMapping/>
   </p:clrMapOvr>
-  <p:timing>
-    <p:tnLst>
-      <p:par>
-        <p:cTn id="1" dur="indefinite" restart="never" nodeType="tmRoot"/>
-      </p:par>
-    </p:tnLst>
-  </p:timing>
 </p:sld>
 </file>
 
@@ -10259,10 +9708,9 @@
           <a:lstStyle/>
           <a:p>
             <a:r>
-              <a:rPr lang="en-US" dirty="0" smtClean="0"/>
+              <a:rPr lang="en-US" dirty="0"/>
               <a:t>Cross Validation (k-fold) </a:t>
             </a:r>
-            <a:endParaRPr lang="en-US" dirty="0"/>
           </a:p>
         </p:txBody>
       </p:sp>
@@ -10282,24 +9730,23 @@
           <a:lstStyle/>
           <a:p>
             <a:r>
-              <a:rPr lang="en-US" dirty="0" smtClean="0"/>
+              <a:rPr lang="en-US" dirty="0"/>
               <a:t>Since you only use a portion of your data in the training, the ”validation set” approach will tend to </a:t>
             </a:r>
             <a:r>
-              <a:rPr lang="en-US" b="0" dirty="0" smtClean="0"/>
+              <a:rPr lang="en-US" b="0" dirty="0"/>
               <a:t>overestimate</a:t>
             </a:r>
             <a:r>
-              <a:rPr lang="en-US" dirty="0" smtClean="0"/>
+              <a:rPr lang="en-US" dirty="0"/>
               <a:t> your error! </a:t>
             </a:r>
           </a:p>
           <a:p>
             <a:r>
-              <a:rPr lang="en-US" dirty="0" smtClean="0"/>
+              <a:rPr lang="en-US" dirty="0"/>
               <a:t>Leave One Out Cross Validation approach</a:t>
             </a:r>
-            <a:endParaRPr lang="en-US" dirty="0"/>
           </a:p>
         </p:txBody>
       </p:sp>
@@ -10385,13 +9832,6 @@
   <p:clrMapOvr>
     <a:masterClrMapping/>
   </p:clrMapOvr>
-  <p:timing>
-    <p:tnLst>
-      <p:par>
-        <p:cTn id="1" dur="indefinite" restart="never" nodeType="tmRoot"/>
-      </p:par>
-    </p:tnLst>
-  </p:timing>
 </p:sld>
 </file>
 
@@ -10428,10 +9868,9 @@
           <a:lstStyle/>
           <a:p>
             <a:r>
-              <a:rPr lang="en-US" dirty="0" smtClean="0"/>
+              <a:rPr lang="en-US" dirty="0"/>
               <a:t>Cross Validation (k-fold) </a:t>
             </a:r>
-            <a:endParaRPr lang="en-US" dirty="0"/>
           </a:p>
         </p:txBody>
       </p:sp>
@@ -10451,39 +9890,39 @@
           <a:lstStyle/>
           <a:p>
             <a:r>
-              <a:rPr lang="en-US" dirty="0" smtClean="0"/>
+              <a:rPr lang="en-US" dirty="0"/>
               <a:t>LOOCV is way more accurate (Fig 5.4), but more computationally expensive!  </a:t>
             </a:r>
           </a:p>
           <a:p>
             <a:r>
-              <a:rPr lang="en-US" dirty="0" smtClean="0"/>
+              <a:rPr lang="en-US" dirty="0"/>
               <a:t>An alternate is to break the data into larger pieces than n and n-1 </a:t>
             </a:r>
           </a:p>
           <a:p>
             <a:r>
-              <a:rPr lang="en-US" dirty="0" smtClean="0"/>
+              <a:rPr lang="en-US" dirty="0"/>
               <a:t>We break it into “k” folds of data, e.g. 5-fold. The 1</a:t>
             </a:r>
             <a:r>
-              <a:rPr lang="en-US" baseline="30000" dirty="0" smtClean="0"/>
+              <a:rPr lang="en-US" baseline="30000" dirty="0"/>
               <a:t>st</a:t>
             </a:r>
             <a:r>
-              <a:rPr lang="en-US" dirty="0" smtClean="0"/>
+              <a:rPr lang="en-US" dirty="0"/>
               <a:t> set is saved for </a:t>
             </a:r>
             <a:r>
-              <a:rPr lang="en-US" b="0" dirty="0" smtClean="0"/>
+              <a:rPr lang="en-US" b="0" dirty="0"/>
               <a:t>validation</a:t>
             </a:r>
             <a:r>
-              <a:rPr lang="en-US" dirty="0" smtClean="0"/>
+              <a:rPr lang="en-US" dirty="0"/>
               <a:t>, remaining k-1 sets are used for </a:t>
             </a:r>
             <a:r>
-              <a:rPr lang="en-US" b="0" dirty="0" smtClean="0"/>
+              <a:rPr lang="en-US" b="0" dirty="0"/>
               <a:t>training</a:t>
             </a:r>
           </a:p>
@@ -10586,13 +10025,6 @@
   <p:clrMapOvr>
     <a:masterClrMapping/>
   </p:clrMapOvr>
-  <p:timing>
-    <p:tnLst>
-      <p:par>
-        <p:cTn id="1" dur="indefinite" restart="never" nodeType="tmRoot"/>
-      </p:par>
-    </p:tnLst>
-  </p:timing>
 </p:sld>
 </file>
 
@@ -10629,10 +10061,9 @@
           <a:lstStyle/>
           <a:p>
             <a:r>
-              <a:rPr lang="en-US" dirty="0" smtClean="0"/>
+              <a:rPr lang="en-US" dirty="0"/>
               <a:t>Bias/variance tradeoff: use 5 or 10 folds</a:t>
             </a:r>
-            <a:endParaRPr lang="en-US" dirty="0"/>
           </a:p>
         </p:txBody>
       </p:sp>
@@ -10652,7 +10083,7 @@
           <a:lstStyle/>
           <a:p>
             <a:r>
-              <a:rPr lang="en-US" dirty="0" smtClean="0"/>
+              <a:rPr lang="en-US" dirty="0"/>
               <a:t>Bias</a:t>
             </a:r>
           </a:p>
@@ -10670,11 +10101,11 @@
               <a:rPr lang="en-US" b="0" dirty="0"/>
               <a:t>).</a:t>
             </a:r>
-            <a:endParaRPr lang="en-US" dirty="0" smtClean="0"/>
-          </a:p>
-          <a:p>
-            <a:r>
-              <a:rPr lang="en-US" dirty="0" smtClean="0"/>
+            <a:endParaRPr lang="en-US" dirty="0"/>
+          </a:p>
+          <a:p>
+            <a:r>
+              <a:rPr lang="en-US" dirty="0"/>
               <a:t>Variance</a:t>
             </a:r>
           </a:p>
@@ -10684,22 +10115,21 @@
               <a:rPr lang="en-US" b="0" dirty="0"/>
               <a:t>an error from sensitivity to small fluctuations in the training set. High variance can cause an algorithm to model the random noise in the training data, rather than the intended outputs (overfitting).</a:t>
             </a:r>
-            <a:endParaRPr lang="en-US" dirty="0" smtClean="0"/>
-          </a:p>
-          <a:p>
-            <a:r>
-              <a:rPr lang="en-US" dirty="0" smtClean="0"/>
+            <a:endParaRPr lang="en-US" dirty="0"/>
+          </a:p>
+          <a:p>
+            <a:r>
+              <a:rPr lang="en-US" dirty="0"/>
               <a:t>Bias variance tradeoff relates the simplification of a model to avoid overfitting to the complexity of a model to avoid </a:t>
             </a:r>
             <a:r>
-              <a:rPr lang="en-US" dirty="0" err="1" smtClean="0"/>
+              <a:rPr lang="en-US" dirty="0" err="1"/>
               <a:t>underfitting</a:t>
             </a:r>
             <a:r>
-              <a:rPr lang="en-US" dirty="0" smtClean="0"/>
+              <a:rPr lang="en-US" dirty="0"/>
               <a:t>.</a:t>
             </a:r>
-            <a:endParaRPr lang="en-US" dirty="0"/>
           </a:p>
         </p:txBody>
       </p:sp>
@@ -10713,13 +10143,6 @@
   <p:clrMapOvr>
     <a:masterClrMapping/>
   </p:clrMapOvr>
-  <p:timing>
-    <p:tnLst>
-      <p:par>
-        <p:cTn id="1" dur="indefinite" restart="never" nodeType="tmRoot"/>
-      </p:par>
-    </p:tnLst>
-  </p:timing>
 </p:sld>
 </file>
 

</xml_diff>

<commit_message>
Added DSMCER HW4 to syllabus and flipped classroom material.
</commit_message>
<xml_diff>
--- a/Wi19_content/DSMCER/L8_SubsetRegularization.pptx
+++ b/Wi19_content/DSMCER/L8_SubsetRegularization.pptx
@@ -251,7 +251,7 @@
           <a:p>
             <a:fld id="{BBEA69A4-43A8-4442-8088-0B845332DB30}" type="datetimeFigureOut">
               <a:rPr lang="en-US" smtClean="0"/>
-              <a:t>2/13/2019</a:t>
+              <a:t>2/14/2019</a:t>
             </a:fld>
             <a:endParaRPr lang="en-US"/>
           </a:p>
@@ -3737,7 +3737,7 @@
 </file>
 
 <file path=ppt/slides/slide10.xml><?xml version="1.0" encoding="utf-8"?>
-<p:sld xmlns:a="http://schemas.openxmlformats.org/drawingml/2006/main" xmlns:r="http://schemas.openxmlformats.org/officeDocument/2006/relationships" xmlns:p="http://schemas.openxmlformats.org/presentationml/2006/main">
+<p:sld xmlns:a="http://schemas.openxmlformats.org/drawingml/2006/main" xmlns:r="http://schemas.openxmlformats.org/officeDocument/2006/relationships" xmlns:p="http://schemas.openxmlformats.org/presentationml/2006/main" show="0">
   <p:cSld>
     <p:spTree>
       <p:nvGrpSpPr>
@@ -3879,7 +3879,7 @@
 </file>
 
 <file path=ppt/slides/slide11.xml><?xml version="1.0" encoding="utf-8"?>
-<p:sld xmlns:a="http://schemas.openxmlformats.org/drawingml/2006/main" xmlns:r="http://schemas.openxmlformats.org/officeDocument/2006/relationships" xmlns:p="http://schemas.openxmlformats.org/presentationml/2006/main">
+<p:sld xmlns:a="http://schemas.openxmlformats.org/drawingml/2006/main" xmlns:r="http://schemas.openxmlformats.org/officeDocument/2006/relationships" xmlns:p="http://schemas.openxmlformats.org/presentationml/2006/main" show="0">
   <p:cSld>
     <p:spTree>
       <p:nvGrpSpPr>
@@ -3994,7 +3994,7 @@
 </file>
 
 <file path=ppt/slides/slide12.xml><?xml version="1.0" encoding="utf-8"?>
-<p:sld xmlns:a="http://schemas.openxmlformats.org/drawingml/2006/main" xmlns:r="http://schemas.openxmlformats.org/officeDocument/2006/relationships" xmlns:p="http://schemas.openxmlformats.org/presentationml/2006/main">
+<p:sld xmlns:a="http://schemas.openxmlformats.org/drawingml/2006/main" xmlns:r="http://schemas.openxmlformats.org/officeDocument/2006/relationships" xmlns:p="http://schemas.openxmlformats.org/presentationml/2006/main" show="0">
   <p:cSld>
     <p:spTree>
       <p:nvGrpSpPr>
@@ -4282,7 +4282,7 @@
 </file>
 
 <file path=ppt/slides/slide13.xml><?xml version="1.0" encoding="utf-8"?>
-<p:sld xmlns:a="http://schemas.openxmlformats.org/drawingml/2006/main" xmlns:r="http://schemas.openxmlformats.org/officeDocument/2006/relationships" xmlns:p="http://schemas.openxmlformats.org/presentationml/2006/main">
+<p:sld xmlns:a="http://schemas.openxmlformats.org/drawingml/2006/main" xmlns:r="http://schemas.openxmlformats.org/officeDocument/2006/relationships" xmlns:p="http://schemas.openxmlformats.org/presentationml/2006/main" show="0">
   <p:cSld>
     <p:spTree>
       <p:nvGrpSpPr>
@@ -4377,7 +4377,7 @@
 </file>
 
 <file path=ppt/slides/slide14.xml><?xml version="1.0" encoding="utf-8"?>
-<p:sld xmlns:a="http://schemas.openxmlformats.org/drawingml/2006/main" xmlns:r="http://schemas.openxmlformats.org/officeDocument/2006/relationships" xmlns:p="http://schemas.openxmlformats.org/presentationml/2006/main">
+<p:sld xmlns:a="http://schemas.openxmlformats.org/drawingml/2006/main" xmlns:r="http://schemas.openxmlformats.org/officeDocument/2006/relationships" xmlns:p="http://schemas.openxmlformats.org/presentationml/2006/main" show="0">
   <p:cSld>
     <p:spTree>
       <p:nvGrpSpPr>
@@ -4485,7 +4485,7 @@
 </file>
 
 <file path=ppt/slides/slide15.xml><?xml version="1.0" encoding="utf-8"?>
-<p:sld xmlns:a="http://schemas.openxmlformats.org/drawingml/2006/main" xmlns:r="http://schemas.openxmlformats.org/officeDocument/2006/relationships" xmlns:p="http://schemas.openxmlformats.org/presentationml/2006/main">
+<p:sld xmlns:a="http://schemas.openxmlformats.org/drawingml/2006/main" xmlns:r="http://schemas.openxmlformats.org/officeDocument/2006/relationships" xmlns:p="http://schemas.openxmlformats.org/presentationml/2006/main" show="0">
   <p:cSld>
     <p:spTree>
       <p:nvGrpSpPr>
@@ -4624,7 +4624,7 @@
 </file>
 
 <file path=ppt/slides/slide16.xml><?xml version="1.0" encoding="utf-8"?>
-<p:sld xmlns:a="http://schemas.openxmlformats.org/drawingml/2006/main" xmlns:r="http://schemas.openxmlformats.org/officeDocument/2006/relationships" xmlns:p="http://schemas.openxmlformats.org/presentationml/2006/main">
+<p:sld xmlns:a="http://schemas.openxmlformats.org/drawingml/2006/main" xmlns:r="http://schemas.openxmlformats.org/officeDocument/2006/relationships" xmlns:p="http://schemas.openxmlformats.org/presentationml/2006/main" show="0">
   <p:cSld>
     <p:spTree>
       <p:nvGrpSpPr>
@@ -5382,27 +5382,12 @@
           <a:lstStyle/>
           <a:p>
             <a:r>
-              <a:rPr lang="en-US" dirty="0"/>
-              <a:t>Quick review from last time </a:t>
-            </a:r>
-          </a:p>
-          <a:p>
-            <a:r>
-              <a:rPr lang="en-US" dirty="0"/>
-              <a:t>Finish resampling methods </a:t>
-            </a:r>
-          </a:p>
-          <a:p>
-            <a:pPr lvl="1"/>
-            <a:r>
-              <a:rPr lang="en-US" dirty="0"/>
-              <a:t>Cross-validation</a:t>
-            </a:r>
-          </a:p>
-          <a:p>
-            <a:r>
-              <a:rPr lang="en-US" dirty="0"/>
-              <a:t>Linear model selection / regularization </a:t>
+              <a:rPr lang="en-US"/>
+              <a:t>Linear </a:t>
+            </a:r>
+            <a:r>
+              <a:rPr lang="en-US" dirty="0"/>
+              <a:t>model selection / regularization </a:t>
             </a:r>
           </a:p>
           <a:p>
@@ -5554,7 +5539,7 @@
 </file>
 
 <file path=ppt/slides/slide21.xml><?xml version="1.0" encoding="utf-8"?>
-<p:sld xmlns:a="http://schemas.openxmlformats.org/drawingml/2006/main" xmlns:r="http://schemas.openxmlformats.org/officeDocument/2006/relationships" xmlns:p="http://schemas.openxmlformats.org/presentationml/2006/main">
+<p:sld xmlns:a="http://schemas.openxmlformats.org/drawingml/2006/main" xmlns:r="http://schemas.openxmlformats.org/officeDocument/2006/relationships" xmlns:p="http://schemas.openxmlformats.org/presentationml/2006/main" show="0">
   <p:cSld>
     <p:spTree>
       <p:nvGrpSpPr>
@@ -5801,7 +5786,7 @@
 </file>
 
 <file path=ppt/slides/slide22.xml><?xml version="1.0" encoding="utf-8"?>
-<p:sld xmlns:a="http://schemas.openxmlformats.org/drawingml/2006/main" xmlns:r="http://schemas.openxmlformats.org/officeDocument/2006/relationships" xmlns:p="http://schemas.openxmlformats.org/presentationml/2006/main">
+<p:sld xmlns:a="http://schemas.openxmlformats.org/drawingml/2006/main" xmlns:r="http://schemas.openxmlformats.org/officeDocument/2006/relationships" xmlns:p="http://schemas.openxmlformats.org/presentationml/2006/main" show="0">
   <p:cSld>
     <p:spTree>
       <p:nvGrpSpPr>
@@ -5929,7 +5914,7 @@
 </file>
 
 <file path=ppt/slides/slide23.xml><?xml version="1.0" encoding="utf-8"?>
-<p:sld xmlns:a="http://schemas.openxmlformats.org/drawingml/2006/main" xmlns:r="http://schemas.openxmlformats.org/officeDocument/2006/relationships" xmlns:p="http://schemas.openxmlformats.org/presentationml/2006/main">
+<p:sld xmlns:a="http://schemas.openxmlformats.org/drawingml/2006/main" xmlns:r="http://schemas.openxmlformats.org/officeDocument/2006/relationships" xmlns:p="http://schemas.openxmlformats.org/presentationml/2006/main" show="0">
   <p:cSld>
     <p:spTree>
       <p:nvGrpSpPr>
@@ -6117,7 +6102,7 @@
 </file>
 
 <file path=ppt/slides/slide24.xml><?xml version="1.0" encoding="utf-8"?>
-<p:sld xmlns:a="http://schemas.openxmlformats.org/drawingml/2006/main" xmlns:r="http://schemas.openxmlformats.org/officeDocument/2006/relationships" xmlns:p="http://schemas.openxmlformats.org/presentationml/2006/main">
+<p:sld xmlns:a="http://schemas.openxmlformats.org/drawingml/2006/main" xmlns:r="http://schemas.openxmlformats.org/officeDocument/2006/relationships" xmlns:p="http://schemas.openxmlformats.org/presentationml/2006/main" show="0">
   <p:cSld>
     <p:spTree>
       <p:nvGrpSpPr>
@@ -6247,7 +6232,7 @@
 </file>
 
 <file path=ppt/slides/slide25.xml><?xml version="1.0" encoding="utf-8"?>
-<p:sld xmlns:a="http://schemas.openxmlformats.org/drawingml/2006/main" xmlns:r="http://schemas.openxmlformats.org/officeDocument/2006/relationships" xmlns:p="http://schemas.openxmlformats.org/presentationml/2006/main">
+<p:sld xmlns:a="http://schemas.openxmlformats.org/drawingml/2006/main" xmlns:r="http://schemas.openxmlformats.org/officeDocument/2006/relationships" xmlns:p="http://schemas.openxmlformats.org/presentationml/2006/main" show="0">
   <p:cSld>
     <p:spTree>
       <p:nvGrpSpPr>
@@ -6589,7 +6574,7 @@
 </file>
 
 <file path=ppt/slides/slide26.xml><?xml version="1.0" encoding="utf-8"?>
-<p:sld xmlns:a="http://schemas.openxmlformats.org/drawingml/2006/main" xmlns:r="http://schemas.openxmlformats.org/officeDocument/2006/relationships" xmlns:p="http://schemas.openxmlformats.org/presentationml/2006/main">
+<p:sld xmlns:a="http://schemas.openxmlformats.org/drawingml/2006/main" xmlns:r="http://schemas.openxmlformats.org/officeDocument/2006/relationships" xmlns:p="http://schemas.openxmlformats.org/presentationml/2006/main" show="0">
   <p:cSld>
     <p:spTree>
       <p:nvGrpSpPr>
@@ -6704,7 +6689,7 @@
 </file>
 
 <file path=ppt/slides/slide27.xml><?xml version="1.0" encoding="utf-8"?>
-<p:sld xmlns:a="http://schemas.openxmlformats.org/drawingml/2006/main" xmlns:r="http://schemas.openxmlformats.org/officeDocument/2006/relationships" xmlns:p="http://schemas.openxmlformats.org/presentationml/2006/main">
+<p:sld xmlns:a="http://schemas.openxmlformats.org/drawingml/2006/main" xmlns:r="http://schemas.openxmlformats.org/officeDocument/2006/relationships" xmlns:p="http://schemas.openxmlformats.org/presentationml/2006/main" show="0">
   <p:cSld>
     <p:spTree>
       <p:nvGrpSpPr>
@@ -6851,7 +6836,7 @@
 </file>
 
 <file path=ppt/slides/slide28.xml><?xml version="1.0" encoding="utf-8"?>
-<p:sld xmlns:a="http://schemas.openxmlformats.org/drawingml/2006/main" xmlns:r="http://schemas.openxmlformats.org/officeDocument/2006/relationships" xmlns:p="http://schemas.openxmlformats.org/presentationml/2006/main">
+<p:sld xmlns:a="http://schemas.openxmlformats.org/drawingml/2006/main" xmlns:r="http://schemas.openxmlformats.org/officeDocument/2006/relationships" xmlns:p="http://schemas.openxmlformats.org/presentationml/2006/main" show="0">
   <p:cSld>
     <p:spTree>
       <p:nvGrpSpPr>
@@ -7195,7 +7180,7 @@
 </file>
 
 <file path=ppt/slides/slide3.xml><?xml version="1.0" encoding="utf-8"?>
-<p:sld xmlns:a="http://schemas.openxmlformats.org/drawingml/2006/main" xmlns:r="http://schemas.openxmlformats.org/officeDocument/2006/relationships" xmlns:p="http://schemas.openxmlformats.org/presentationml/2006/main">
+<p:sld xmlns:a="http://schemas.openxmlformats.org/drawingml/2006/main" xmlns:r="http://schemas.openxmlformats.org/officeDocument/2006/relationships" xmlns:p="http://schemas.openxmlformats.org/presentationml/2006/main" show="0">
   <p:cSld>
     <p:spTree>
       <p:nvGrpSpPr>
@@ -8409,7 +8394,7 @@
 </file>
 
 <file path=ppt/slides/slide35.xml><?xml version="1.0" encoding="utf-8"?>
-<p:sld xmlns:a="http://schemas.openxmlformats.org/drawingml/2006/main" xmlns:r="http://schemas.openxmlformats.org/officeDocument/2006/relationships" xmlns:p="http://schemas.openxmlformats.org/presentationml/2006/main">
+<p:sld xmlns:a="http://schemas.openxmlformats.org/drawingml/2006/main" xmlns:r="http://schemas.openxmlformats.org/officeDocument/2006/relationships" xmlns:p="http://schemas.openxmlformats.org/presentationml/2006/main" show="0">
   <p:cSld>
     <p:spTree>
       <p:nvGrpSpPr>
@@ -9054,7 +9039,7 @@
 </file>
 
 <file path=ppt/slides/slide4.xml><?xml version="1.0" encoding="utf-8"?>
-<p:sld xmlns:a="http://schemas.openxmlformats.org/drawingml/2006/main" xmlns:r="http://schemas.openxmlformats.org/officeDocument/2006/relationships" xmlns:p="http://schemas.openxmlformats.org/presentationml/2006/main">
+<p:sld xmlns:a="http://schemas.openxmlformats.org/drawingml/2006/main" xmlns:r="http://schemas.openxmlformats.org/officeDocument/2006/relationships" xmlns:p="http://schemas.openxmlformats.org/presentationml/2006/main" show="0">
   <p:cSld>
     <p:spTree>
       <p:nvGrpSpPr>
@@ -9174,7 +9159,7 @@
 </file>
 
 <file path=ppt/slides/slide40.xml><?xml version="1.0" encoding="utf-8"?>
-<p:sld xmlns:a="http://schemas.openxmlformats.org/drawingml/2006/main" xmlns:r="http://schemas.openxmlformats.org/officeDocument/2006/relationships" xmlns:p="http://schemas.openxmlformats.org/presentationml/2006/main">
+<p:sld xmlns:a="http://schemas.openxmlformats.org/drawingml/2006/main" xmlns:r="http://schemas.openxmlformats.org/officeDocument/2006/relationships" xmlns:p="http://schemas.openxmlformats.org/presentationml/2006/main" show="0">
   <p:cSld>
     <p:spTree>
       <p:nvGrpSpPr>
@@ -9323,7 +9308,7 @@
 </file>
 
 <file path=ppt/slides/slide5.xml><?xml version="1.0" encoding="utf-8"?>
-<p:sld xmlns:a="http://schemas.openxmlformats.org/drawingml/2006/main" xmlns:r="http://schemas.openxmlformats.org/officeDocument/2006/relationships" xmlns:p="http://schemas.openxmlformats.org/presentationml/2006/main">
+<p:sld xmlns:a="http://schemas.openxmlformats.org/drawingml/2006/main" xmlns:r="http://schemas.openxmlformats.org/officeDocument/2006/relationships" xmlns:p="http://schemas.openxmlformats.org/presentationml/2006/main" show="0">
   <p:cSld>
     <p:spTree>
       <p:nvGrpSpPr>
@@ -9519,7 +9504,7 @@
 </file>
 
 <file path=ppt/slides/slide6.xml><?xml version="1.0" encoding="utf-8"?>
-<p:sld xmlns:a="http://schemas.openxmlformats.org/drawingml/2006/main" xmlns:r="http://schemas.openxmlformats.org/officeDocument/2006/relationships" xmlns:p="http://schemas.openxmlformats.org/presentationml/2006/main">
+<p:sld xmlns:a="http://schemas.openxmlformats.org/drawingml/2006/main" xmlns:r="http://schemas.openxmlformats.org/officeDocument/2006/relationships" xmlns:p="http://schemas.openxmlformats.org/presentationml/2006/main" show="0">
   <p:cSld>
     <p:spTree>
       <p:nvGrpSpPr>
@@ -9676,7 +9661,7 @@
 </file>
 
 <file path=ppt/slides/slide7.xml><?xml version="1.0" encoding="utf-8"?>
-<p:sld xmlns:a="http://schemas.openxmlformats.org/drawingml/2006/main" xmlns:r="http://schemas.openxmlformats.org/officeDocument/2006/relationships" xmlns:p="http://schemas.openxmlformats.org/presentationml/2006/main">
+<p:sld xmlns:a="http://schemas.openxmlformats.org/drawingml/2006/main" xmlns:r="http://schemas.openxmlformats.org/officeDocument/2006/relationships" xmlns:p="http://schemas.openxmlformats.org/presentationml/2006/main" show="0">
   <p:cSld>
     <p:spTree>
       <p:nvGrpSpPr>
@@ -9836,7 +9821,7 @@
 </file>
 
 <file path=ppt/slides/slide8.xml><?xml version="1.0" encoding="utf-8"?>
-<p:sld xmlns:a="http://schemas.openxmlformats.org/drawingml/2006/main" xmlns:r="http://schemas.openxmlformats.org/officeDocument/2006/relationships" xmlns:p="http://schemas.openxmlformats.org/presentationml/2006/main">
+<p:sld xmlns:a="http://schemas.openxmlformats.org/drawingml/2006/main" xmlns:r="http://schemas.openxmlformats.org/officeDocument/2006/relationships" xmlns:p="http://schemas.openxmlformats.org/presentationml/2006/main" show="0">
   <p:cSld>
     <p:spTree>
       <p:nvGrpSpPr>
@@ -10029,7 +10014,7 @@
 </file>
 
 <file path=ppt/slides/slide9.xml><?xml version="1.0" encoding="utf-8"?>
-<p:sld xmlns:a="http://schemas.openxmlformats.org/drawingml/2006/main" xmlns:r="http://schemas.openxmlformats.org/officeDocument/2006/relationships" xmlns:p="http://schemas.openxmlformats.org/presentationml/2006/main">
+<p:sld xmlns:a="http://schemas.openxmlformats.org/drawingml/2006/main" xmlns:r="http://schemas.openxmlformats.org/officeDocument/2006/relationships" xmlns:p="http://schemas.openxmlformats.org/presentationml/2006/main" show="0">
   <p:cSld>
     <p:spTree>
       <p:nvGrpSpPr>

</xml_diff>

<commit_message>
Updated regularization materials for today.
</commit_message>
<xml_diff>
--- a/Wi19_content/DSMCER/L8_SubsetRegularization.pptx
+++ b/Wi19_content/DSMCER/L8_SubsetRegularization.pptx
@@ -30,13 +30,13 @@
     <p:sldId id="417" r:id="rId21"/>
     <p:sldId id="418" r:id="rId22"/>
     <p:sldId id="411" r:id="rId23"/>
-    <p:sldId id="431" r:id="rId24"/>
-    <p:sldId id="432" r:id="rId25"/>
-    <p:sldId id="419" r:id="rId26"/>
-    <p:sldId id="420" r:id="rId27"/>
-    <p:sldId id="421" r:id="rId28"/>
-    <p:sldId id="422" r:id="rId29"/>
-    <p:sldId id="423" r:id="rId30"/>
+    <p:sldId id="419" r:id="rId24"/>
+    <p:sldId id="420" r:id="rId25"/>
+    <p:sldId id="421" r:id="rId26"/>
+    <p:sldId id="422" r:id="rId27"/>
+    <p:sldId id="423" r:id="rId28"/>
+    <p:sldId id="431" r:id="rId29"/>
+    <p:sldId id="432" r:id="rId30"/>
     <p:sldId id="412" r:id="rId31"/>
     <p:sldId id="413" r:id="rId32"/>
     <p:sldId id="424" r:id="rId33"/>
@@ -251,7 +251,7 @@
           <a:p>
             <a:fld id="{BBEA69A4-43A8-4442-8088-0B845332DB30}" type="datetimeFigureOut">
               <a:rPr lang="en-US" smtClean="0"/>
-              <a:t>2/14/2019</a:t>
+              <a:t>2/28/2019</a:t>
             </a:fld>
             <a:endParaRPr lang="en-US"/>
           </a:p>
@@ -3675,8 +3675,8 @@
         </p:nvSpPr>
         <p:spPr>
           <a:xfrm>
-            <a:off x="671757" y="4588566"/>
-            <a:ext cx="4792824" cy="1200329"/>
+            <a:off x="718252" y="4588566"/>
+            <a:ext cx="4792824" cy="369332"/>
           </a:xfrm>
           <a:prstGeom prst="rect">
             <a:avLst/>
@@ -3689,35 +3689,9 @@
           </a:bodyPr>
           <a:lstStyle/>
           <a:p>
-            <a:pPr marL="342900" indent="-342900">
-              <a:buAutoNum type="arabicParenR"/>
-            </a:pPr>
             <a:r>
               <a:rPr lang="en-US"/>
-              <a:t>k-fold cross validation</a:t>
-            </a:r>
-            <a:endParaRPr lang="en-US" dirty="0"/>
-          </a:p>
-          <a:p>
-            <a:pPr marL="342900" indent="-342900">
-              <a:buAutoNum type="arabicParenR"/>
-            </a:pPr>
-            <a:r>
-              <a:rPr lang="en-US" dirty="0"/>
-              <a:t>model selection and regularization </a:t>
-            </a:r>
-          </a:p>
-          <a:p>
-            <a:endParaRPr lang="en-US" dirty="0"/>
-          </a:p>
-          <a:p>
-            <a:r>
-              <a:rPr lang="en-US" dirty="0"/>
-              <a:t>Feb 20</a:t>
-            </a:r>
-            <a:r>
-              <a:rPr lang="en-US"/>
-              <a:t>, 2019</a:t>
+              <a:t>Feb 28, 2019</a:t>
             </a:r>
             <a:endParaRPr lang="en-US" dirty="0"/>
           </a:p>
@@ -5819,322 +5793,6 @@
           <a:p>
             <a:r>
               <a:rPr lang="en-US" dirty="0"/>
-              <a:t>Subset selection: algorithms and challenges</a:t>
-            </a:r>
-          </a:p>
-        </p:txBody>
-      </p:sp>
-      <p:sp>
-        <p:nvSpPr>
-          <p:cNvPr id="4" name="Text Placeholder 3"/>
-          <p:cNvSpPr>
-            <a:spLocks noGrp="1"/>
-          </p:cNvSpPr>
-          <p:nvPr>
-            <p:ph type="body" sz="quarter" idx="11"/>
-          </p:nvPr>
-        </p:nvSpPr>
-        <p:spPr/>
-        <p:txBody>
-          <a:bodyPr/>
-          <a:lstStyle/>
-          <a:p>
-            <a:r>
-              <a:rPr lang="en-US" dirty="0"/>
-              <a:t>Example forward stepwise selection</a:t>
-            </a:r>
-          </a:p>
-          <a:p>
-            <a:endParaRPr lang="en-US" dirty="0"/>
-          </a:p>
-          <a:p>
-            <a:endParaRPr lang="en-US" dirty="0"/>
-          </a:p>
-          <a:p>
-            <a:endParaRPr lang="en-US" dirty="0"/>
-          </a:p>
-          <a:p>
-            <a:endParaRPr lang="en-US" dirty="0"/>
-          </a:p>
-          <a:p>
-            <a:endParaRPr lang="en-US" dirty="0"/>
-          </a:p>
-          <a:p>
-            <a:endParaRPr lang="en-US" dirty="0"/>
-          </a:p>
-          <a:p>
-            <a:endParaRPr lang="en-US" dirty="0"/>
-          </a:p>
-          <a:p>
-            <a:r>
-              <a:rPr lang="en-US" dirty="0"/>
-              <a:t>When p=20, requires fitting only 211 models vs. brute force’s  1, 048, 576 models</a:t>
-            </a:r>
-          </a:p>
-          <a:p>
-            <a:endParaRPr lang="en-US" dirty="0"/>
-          </a:p>
-        </p:txBody>
-      </p:sp>
-      <p:pic>
-        <p:nvPicPr>
-          <p:cNvPr id="5" name="Picture 4"/>
-          <p:cNvPicPr>
-            <a:picLocks noChangeAspect="1"/>
-          </p:cNvPicPr>
-          <p:nvPr/>
-        </p:nvPicPr>
-        <p:blipFill>
-          <a:blip r:embed="rId2"/>
-          <a:stretch>
-            <a:fillRect/>
-          </a:stretch>
-        </p:blipFill>
-        <p:spPr>
-          <a:xfrm>
-            <a:off x="1290310" y="2106173"/>
-            <a:ext cx="6934200" cy="3276600"/>
-          </a:xfrm>
-          <a:prstGeom prst="rect">
-            <a:avLst/>
-          </a:prstGeom>
-        </p:spPr>
-      </p:pic>
-    </p:spTree>
-    <p:extLst>
-      <p:ext uri="{BB962C8B-B14F-4D97-AF65-F5344CB8AC3E}">
-        <p14:creationId xmlns:p14="http://schemas.microsoft.com/office/powerpoint/2010/main" val="1743484513"/>
-      </p:ext>
-    </p:extLst>
-  </p:cSld>
-  <p:clrMapOvr>
-    <a:masterClrMapping/>
-  </p:clrMapOvr>
-</p:sld>
-</file>
-
-<file path=ppt/slides/slide23.xml><?xml version="1.0" encoding="utf-8"?>
-<p:sld xmlns:a="http://schemas.openxmlformats.org/drawingml/2006/main" xmlns:r="http://schemas.openxmlformats.org/officeDocument/2006/relationships" xmlns:p="http://schemas.openxmlformats.org/presentationml/2006/main" show="0">
-  <p:cSld>
-    <p:spTree>
-      <p:nvGrpSpPr>
-        <p:cNvPr id="1" name=""/>
-        <p:cNvGrpSpPr/>
-        <p:nvPr/>
-      </p:nvGrpSpPr>
-      <p:grpSpPr>
-        <a:xfrm>
-          <a:off x="0" y="0"/>
-          <a:ext cx="0" cy="0"/>
-          <a:chOff x="0" y="0"/>
-          <a:chExt cx="0" cy="0"/>
-        </a:xfrm>
-      </p:grpSpPr>
-      <p:sp>
-        <p:nvSpPr>
-          <p:cNvPr id="2" name="Text Placeholder 1"/>
-          <p:cNvSpPr>
-            <a:spLocks noGrp="1"/>
-          </p:cNvSpPr>
-          <p:nvPr>
-            <p:ph type="body" sz="quarter" idx="10"/>
-          </p:nvPr>
-        </p:nvSpPr>
-        <p:spPr/>
-        <p:txBody>
-          <a:bodyPr/>
-          <a:lstStyle/>
-          <a:p>
-            <a:r>
-              <a:rPr lang="en-US" dirty="0"/>
-              <a:t>Subset selection: algorithms and challenges</a:t>
-            </a:r>
-          </a:p>
-        </p:txBody>
-      </p:sp>
-      <p:sp>
-        <p:nvSpPr>
-          <p:cNvPr id="4" name="Text Placeholder 3"/>
-          <p:cNvSpPr>
-            <a:spLocks noGrp="1"/>
-          </p:cNvSpPr>
-          <p:nvPr>
-            <p:ph type="body" sz="quarter" idx="11"/>
-          </p:nvPr>
-        </p:nvSpPr>
-        <p:spPr/>
-        <p:txBody>
-          <a:bodyPr/>
-          <a:lstStyle/>
-          <a:p>
-            <a:r>
-              <a:rPr lang="en-US" dirty="0"/>
-              <a:t>Example backward stepwise selection</a:t>
-            </a:r>
-          </a:p>
-          <a:p>
-            <a:endParaRPr lang="en-US" dirty="0"/>
-          </a:p>
-          <a:p>
-            <a:endParaRPr lang="en-US" dirty="0"/>
-          </a:p>
-          <a:p>
-            <a:endParaRPr lang="en-US" dirty="0"/>
-          </a:p>
-          <a:p>
-            <a:endParaRPr lang="en-US" dirty="0"/>
-          </a:p>
-          <a:p>
-            <a:endParaRPr lang="en-US" dirty="0"/>
-          </a:p>
-          <a:p>
-            <a:endParaRPr lang="en-US" dirty="0"/>
-          </a:p>
-          <a:p>
-            <a:endParaRPr lang="en-US" dirty="0"/>
-          </a:p>
-          <a:p>
-            <a:r>
-              <a:rPr lang="en-US" dirty="0"/>
-              <a:t>Requires n &gt; p (forward has no such requirement, why?)</a:t>
-            </a:r>
-          </a:p>
-          <a:p>
-            <a:endParaRPr lang="en-US" dirty="0"/>
-          </a:p>
-        </p:txBody>
-      </p:sp>
-      <p:pic>
-        <p:nvPicPr>
-          <p:cNvPr id="5" name="Picture 4"/>
-          <p:cNvPicPr>
-            <a:picLocks noChangeAspect="1"/>
-          </p:cNvPicPr>
-          <p:nvPr/>
-        </p:nvPicPr>
-        <p:blipFill>
-          <a:blip r:embed="rId2"/>
-          <a:stretch>
-            <a:fillRect/>
-          </a:stretch>
-        </p:blipFill>
-        <p:spPr>
-          <a:xfrm>
-            <a:off x="1233160" y="2125223"/>
-            <a:ext cx="7048500" cy="3238500"/>
-          </a:xfrm>
-          <a:prstGeom prst="rect">
-            <a:avLst/>
-          </a:prstGeom>
-        </p:spPr>
-      </p:pic>
-      <p:sp>
-        <p:nvSpPr>
-          <p:cNvPr id="6" name="Rectangle 5"/>
-          <p:cNvSpPr/>
-          <p:nvPr/>
-        </p:nvSpPr>
-        <p:spPr>
-          <a:xfrm>
-            <a:off x="1233160" y="5956054"/>
-            <a:ext cx="5607625" cy="646331"/>
-          </a:xfrm>
-          <a:prstGeom prst="rect">
-            <a:avLst/>
-          </a:prstGeom>
-        </p:spPr>
-        <p:txBody>
-          <a:bodyPr wrap="none">
-            <a:spAutoFit/>
-          </a:bodyPr>
-          <a:lstStyle/>
-          <a:p>
-            <a:r>
-              <a:rPr lang="en-US" dirty="0">
-                <a:latin typeface="Helvetica" charset="0"/>
-              </a:rPr>
-              <a:t>Number of models for brute force: 2^p</a:t>
-            </a:r>
-          </a:p>
-          <a:p>
-            <a:r>
-              <a:rPr lang="en-US" dirty="0">
-                <a:latin typeface="Helvetica" charset="0"/>
-              </a:rPr>
-              <a:t>Number of models for both algorithms:</a:t>
-            </a:r>
-            <a:r>
-              <a:rPr lang="mr-IN" dirty="0">
-                <a:latin typeface="Helvetica" charset="0"/>
-              </a:rPr>
-              <a:t> 1+p(</a:t>
-            </a:r>
-            <a:r>
-              <a:rPr lang="mr-IN" dirty="0" err="1">
-                <a:latin typeface="Helvetica" charset="0"/>
-              </a:rPr>
-              <a:t>p</a:t>
-            </a:r>
-            <a:r>
-              <a:rPr lang="mr-IN" dirty="0">
-                <a:latin typeface="Helvetica" charset="0"/>
-              </a:rPr>
-              <a:t> +1)/ 2</a:t>
-            </a:r>
-            <a:endParaRPr lang="mr-IN" dirty="0">
-              <a:effectLst/>
-              <a:latin typeface="Helvetica" charset="0"/>
-            </a:endParaRPr>
-          </a:p>
-        </p:txBody>
-      </p:sp>
-    </p:spTree>
-    <p:extLst>
-      <p:ext uri="{BB962C8B-B14F-4D97-AF65-F5344CB8AC3E}">
-        <p14:creationId xmlns:p14="http://schemas.microsoft.com/office/powerpoint/2010/main" val="329846676"/>
-      </p:ext>
-    </p:extLst>
-  </p:cSld>
-  <p:clrMapOvr>
-    <a:masterClrMapping/>
-  </p:clrMapOvr>
-</p:sld>
-</file>
-
-<file path=ppt/slides/slide24.xml><?xml version="1.0" encoding="utf-8"?>
-<p:sld xmlns:a="http://schemas.openxmlformats.org/drawingml/2006/main" xmlns:r="http://schemas.openxmlformats.org/officeDocument/2006/relationships" xmlns:p="http://schemas.openxmlformats.org/presentationml/2006/main" show="0">
-  <p:cSld>
-    <p:spTree>
-      <p:nvGrpSpPr>
-        <p:cNvPr id="1" name=""/>
-        <p:cNvGrpSpPr/>
-        <p:nvPr/>
-      </p:nvGrpSpPr>
-      <p:grpSpPr>
-        <a:xfrm>
-          <a:off x="0" y="0"/>
-          <a:ext cx="0" cy="0"/>
-          <a:chOff x="0" y="0"/>
-          <a:chExt cx="0" cy="0"/>
-        </a:xfrm>
-      </p:grpSpPr>
-      <p:sp>
-        <p:nvSpPr>
-          <p:cNvPr id="2" name="Text Placeholder 1"/>
-          <p:cNvSpPr>
-            <a:spLocks noGrp="1"/>
-          </p:cNvSpPr>
-          <p:nvPr>
-            <p:ph type="body" sz="quarter" idx="10"/>
-          </p:nvPr>
-        </p:nvSpPr>
-        <p:spPr/>
-        <p:txBody>
-          <a:bodyPr/>
-          <a:lstStyle/>
-          <a:p>
-            <a:r>
-              <a:rPr lang="en-US" dirty="0"/>
               <a:t>Comparing alternative models </a:t>
             </a:r>
           </a:p>
@@ -6231,7 +5889,7 @@
 </p:sld>
 </file>
 
-<file path=ppt/slides/slide25.xml><?xml version="1.0" encoding="utf-8"?>
+<file path=ppt/slides/slide23.xml><?xml version="1.0" encoding="utf-8"?>
 <p:sld xmlns:a="http://schemas.openxmlformats.org/drawingml/2006/main" xmlns:r="http://schemas.openxmlformats.org/officeDocument/2006/relationships" xmlns:p="http://schemas.openxmlformats.org/presentationml/2006/main" show="0">
   <p:cSld>
     <p:spTree>
@@ -6573,7 +6231,7 @@
 </p:sld>
 </file>
 
-<file path=ppt/slides/slide26.xml><?xml version="1.0" encoding="utf-8"?>
+<file path=ppt/slides/slide24.xml><?xml version="1.0" encoding="utf-8"?>
 <p:sld xmlns:a="http://schemas.openxmlformats.org/drawingml/2006/main" xmlns:r="http://schemas.openxmlformats.org/officeDocument/2006/relationships" xmlns:p="http://schemas.openxmlformats.org/presentationml/2006/main" show="0">
   <p:cSld>
     <p:spTree>
@@ -6688,7 +6346,7 @@
 </p:sld>
 </file>
 
-<file path=ppt/slides/slide27.xml><?xml version="1.0" encoding="utf-8"?>
+<file path=ppt/slides/slide25.xml><?xml version="1.0" encoding="utf-8"?>
 <p:sld xmlns:a="http://schemas.openxmlformats.org/drawingml/2006/main" xmlns:r="http://schemas.openxmlformats.org/officeDocument/2006/relationships" xmlns:p="http://schemas.openxmlformats.org/presentationml/2006/main" show="0">
   <p:cSld>
     <p:spTree>
@@ -6835,7 +6493,7 @@
 </p:sld>
 </file>
 
-<file path=ppt/slides/slide28.xml><?xml version="1.0" encoding="utf-8"?>
+<file path=ppt/slides/slide26.xml><?xml version="1.0" encoding="utf-8"?>
 <p:sld xmlns:a="http://schemas.openxmlformats.org/drawingml/2006/main" xmlns:r="http://schemas.openxmlformats.org/officeDocument/2006/relationships" xmlns:p="http://schemas.openxmlformats.org/presentationml/2006/main" show="0">
   <p:cSld>
     <p:spTree>
@@ -7017,6 +6675,322 @@
 </p:sld>
 </file>
 
+<file path=ppt/slides/slide27.xml><?xml version="1.0" encoding="utf-8"?>
+<p:sld xmlns:a="http://schemas.openxmlformats.org/drawingml/2006/main" xmlns:r="http://schemas.openxmlformats.org/officeDocument/2006/relationships" xmlns:p="http://schemas.openxmlformats.org/presentationml/2006/main">
+  <p:cSld>
+    <p:spTree>
+      <p:nvGrpSpPr>
+        <p:cNvPr id="1" name=""/>
+        <p:cNvGrpSpPr/>
+        <p:nvPr/>
+      </p:nvGrpSpPr>
+      <p:grpSpPr>
+        <a:xfrm>
+          <a:off x="0" y="0"/>
+          <a:ext cx="0" cy="0"/>
+          <a:chOff x="0" y="0"/>
+          <a:chExt cx="0" cy="0"/>
+        </a:xfrm>
+      </p:grpSpPr>
+      <p:sp>
+        <p:nvSpPr>
+          <p:cNvPr id="2" name="Text Placeholder 1"/>
+          <p:cNvSpPr>
+            <a:spLocks noGrp="1"/>
+          </p:cNvSpPr>
+          <p:nvPr>
+            <p:ph type="body" sz="quarter" idx="10"/>
+          </p:nvPr>
+        </p:nvSpPr>
+        <p:spPr/>
+        <p:txBody>
+          <a:bodyPr/>
+          <a:lstStyle/>
+          <a:p>
+            <a:r>
+              <a:rPr lang="en-US" dirty="0"/>
+              <a:t>Subset selection: algorithms and challenges</a:t>
+            </a:r>
+          </a:p>
+        </p:txBody>
+      </p:sp>
+      <p:sp>
+        <p:nvSpPr>
+          <p:cNvPr id="4" name="Text Placeholder 3"/>
+          <p:cNvSpPr>
+            <a:spLocks noGrp="1"/>
+          </p:cNvSpPr>
+          <p:nvPr>
+            <p:ph type="body" sz="quarter" idx="11"/>
+          </p:nvPr>
+        </p:nvSpPr>
+        <p:spPr/>
+        <p:txBody>
+          <a:bodyPr/>
+          <a:lstStyle/>
+          <a:p>
+            <a:r>
+              <a:rPr lang="en-US" dirty="0"/>
+              <a:t>Example forward stepwise selection</a:t>
+            </a:r>
+          </a:p>
+          <a:p>
+            <a:endParaRPr lang="en-US" dirty="0"/>
+          </a:p>
+          <a:p>
+            <a:endParaRPr lang="en-US" dirty="0"/>
+          </a:p>
+          <a:p>
+            <a:endParaRPr lang="en-US" dirty="0"/>
+          </a:p>
+          <a:p>
+            <a:endParaRPr lang="en-US" dirty="0"/>
+          </a:p>
+          <a:p>
+            <a:endParaRPr lang="en-US" dirty="0"/>
+          </a:p>
+          <a:p>
+            <a:endParaRPr lang="en-US" dirty="0"/>
+          </a:p>
+          <a:p>
+            <a:endParaRPr lang="en-US" dirty="0"/>
+          </a:p>
+          <a:p>
+            <a:r>
+              <a:rPr lang="en-US" dirty="0"/>
+              <a:t>When p=20, requires fitting only 211 models vs. brute force’s  1, 048, 576 models</a:t>
+            </a:r>
+          </a:p>
+          <a:p>
+            <a:endParaRPr lang="en-US" dirty="0"/>
+          </a:p>
+        </p:txBody>
+      </p:sp>
+      <p:pic>
+        <p:nvPicPr>
+          <p:cNvPr id="5" name="Picture 4"/>
+          <p:cNvPicPr>
+            <a:picLocks noChangeAspect="1"/>
+          </p:cNvPicPr>
+          <p:nvPr/>
+        </p:nvPicPr>
+        <p:blipFill>
+          <a:blip r:embed="rId2"/>
+          <a:stretch>
+            <a:fillRect/>
+          </a:stretch>
+        </p:blipFill>
+        <p:spPr>
+          <a:xfrm>
+            <a:off x="1290310" y="2106173"/>
+            <a:ext cx="6934200" cy="3276600"/>
+          </a:xfrm>
+          <a:prstGeom prst="rect">
+            <a:avLst/>
+          </a:prstGeom>
+        </p:spPr>
+      </p:pic>
+    </p:spTree>
+    <p:extLst>
+      <p:ext uri="{BB962C8B-B14F-4D97-AF65-F5344CB8AC3E}">
+        <p14:creationId xmlns:p14="http://schemas.microsoft.com/office/powerpoint/2010/main" val="1743484513"/>
+      </p:ext>
+    </p:extLst>
+  </p:cSld>
+  <p:clrMapOvr>
+    <a:masterClrMapping/>
+  </p:clrMapOvr>
+</p:sld>
+</file>
+
+<file path=ppt/slides/slide28.xml><?xml version="1.0" encoding="utf-8"?>
+<p:sld xmlns:a="http://schemas.openxmlformats.org/drawingml/2006/main" xmlns:r="http://schemas.openxmlformats.org/officeDocument/2006/relationships" xmlns:p="http://schemas.openxmlformats.org/presentationml/2006/main">
+  <p:cSld>
+    <p:spTree>
+      <p:nvGrpSpPr>
+        <p:cNvPr id="1" name=""/>
+        <p:cNvGrpSpPr/>
+        <p:nvPr/>
+      </p:nvGrpSpPr>
+      <p:grpSpPr>
+        <a:xfrm>
+          <a:off x="0" y="0"/>
+          <a:ext cx="0" cy="0"/>
+          <a:chOff x="0" y="0"/>
+          <a:chExt cx="0" cy="0"/>
+        </a:xfrm>
+      </p:grpSpPr>
+      <p:sp>
+        <p:nvSpPr>
+          <p:cNvPr id="2" name="Text Placeholder 1"/>
+          <p:cNvSpPr>
+            <a:spLocks noGrp="1"/>
+          </p:cNvSpPr>
+          <p:nvPr>
+            <p:ph type="body" sz="quarter" idx="10"/>
+          </p:nvPr>
+        </p:nvSpPr>
+        <p:spPr/>
+        <p:txBody>
+          <a:bodyPr/>
+          <a:lstStyle/>
+          <a:p>
+            <a:r>
+              <a:rPr lang="en-US" dirty="0"/>
+              <a:t>Subset selection: algorithms and challenges</a:t>
+            </a:r>
+          </a:p>
+        </p:txBody>
+      </p:sp>
+      <p:sp>
+        <p:nvSpPr>
+          <p:cNvPr id="4" name="Text Placeholder 3"/>
+          <p:cNvSpPr>
+            <a:spLocks noGrp="1"/>
+          </p:cNvSpPr>
+          <p:nvPr>
+            <p:ph type="body" sz="quarter" idx="11"/>
+          </p:nvPr>
+        </p:nvSpPr>
+        <p:spPr/>
+        <p:txBody>
+          <a:bodyPr/>
+          <a:lstStyle/>
+          <a:p>
+            <a:r>
+              <a:rPr lang="en-US" dirty="0"/>
+              <a:t>Example backward stepwise selection</a:t>
+            </a:r>
+          </a:p>
+          <a:p>
+            <a:endParaRPr lang="en-US" dirty="0"/>
+          </a:p>
+          <a:p>
+            <a:endParaRPr lang="en-US" dirty="0"/>
+          </a:p>
+          <a:p>
+            <a:endParaRPr lang="en-US" dirty="0"/>
+          </a:p>
+          <a:p>
+            <a:endParaRPr lang="en-US" dirty="0"/>
+          </a:p>
+          <a:p>
+            <a:endParaRPr lang="en-US" dirty="0"/>
+          </a:p>
+          <a:p>
+            <a:endParaRPr lang="en-US" dirty="0"/>
+          </a:p>
+          <a:p>
+            <a:endParaRPr lang="en-US" dirty="0"/>
+          </a:p>
+          <a:p>
+            <a:r>
+              <a:rPr lang="en-US" dirty="0"/>
+              <a:t>Requires n &gt; p (forward has no such requirement, why?)</a:t>
+            </a:r>
+          </a:p>
+          <a:p>
+            <a:endParaRPr lang="en-US" dirty="0"/>
+          </a:p>
+        </p:txBody>
+      </p:sp>
+      <p:pic>
+        <p:nvPicPr>
+          <p:cNvPr id="5" name="Picture 4"/>
+          <p:cNvPicPr>
+            <a:picLocks noChangeAspect="1"/>
+          </p:cNvPicPr>
+          <p:nvPr/>
+        </p:nvPicPr>
+        <p:blipFill>
+          <a:blip r:embed="rId2"/>
+          <a:stretch>
+            <a:fillRect/>
+          </a:stretch>
+        </p:blipFill>
+        <p:spPr>
+          <a:xfrm>
+            <a:off x="1233160" y="2125223"/>
+            <a:ext cx="7048500" cy="3238500"/>
+          </a:xfrm>
+          <a:prstGeom prst="rect">
+            <a:avLst/>
+          </a:prstGeom>
+        </p:spPr>
+      </p:pic>
+      <p:sp>
+        <p:nvSpPr>
+          <p:cNvPr id="6" name="Rectangle 5"/>
+          <p:cNvSpPr/>
+          <p:nvPr/>
+        </p:nvSpPr>
+        <p:spPr>
+          <a:xfrm>
+            <a:off x="1233160" y="5956054"/>
+            <a:ext cx="5607625" cy="646331"/>
+          </a:xfrm>
+          <a:prstGeom prst="rect">
+            <a:avLst/>
+          </a:prstGeom>
+        </p:spPr>
+        <p:txBody>
+          <a:bodyPr wrap="none">
+            <a:spAutoFit/>
+          </a:bodyPr>
+          <a:lstStyle/>
+          <a:p>
+            <a:r>
+              <a:rPr lang="en-US" dirty="0">
+                <a:latin typeface="Helvetica" charset="0"/>
+              </a:rPr>
+              <a:t>Number of models for brute force: 2^p</a:t>
+            </a:r>
+          </a:p>
+          <a:p>
+            <a:r>
+              <a:rPr lang="en-US" dirty="0">
+                <a:latin typeface="Helvetica" charset="0"/>
+              </a:rPr>
+              <a:t>Number of models for both algorithms:</a:t>
+            </a:r>
+            <a:r>
+              <a:rPr lang="mr-IN" dirty="0">
+                <a:latin typeface="Helvetica" charset="0"/>
+              </a:rPr>
+              <a:t> 1+p(</a:t>
+            </a:r>
+            <a:r>
+              <a:rPr lang="mr-IN" dirty="0" err="1">
+                <a:latin typeface="Helvetica" charset="0"/>
+              </a:rPr>
+              <a:t>p</a:t>
+            </a:r>
+            <a:r>
+              <a:rPr lang="mr-IN" dirty="0">
+                <a:latin typeface="Helvetica" charset="0"/>
+              </a:rPr>
+              <a:t> +1)/ 2</a:t>
+            </a:r>
+            <a:endParaRPr lang="mr-IN" dirty="0">
+              <a:effectLst/>
+              <a:latin typeface="Helvetica" charset="0"/>
+            </a:endParaRPr>
+          </a:p>
+        </p:txBody>
+      </p:sp>
+    </p:spTree>
+    <p:extLst>
+      <p:ext uri="{BB962C8B-B14F-4D97-AF65-F5344CB8AC3E}">
+        <p14:creationId xmlns:p14="http://schemas.microsoft.com/office/powerpoint/2010/main" val="329846676"/>
+      </p:ext>
+    </p:extLst>
+  </p:cSld>
+  <p:clrMapOvr>
+    <a:masterClrMapping/>
+  </p:clrMapOvr>
+</p:sld>
+</file>
+
 <file path=ppt/slides/slide29.xml><?xml version="1.0" encoding="utf-8"?>
 <p:sld xmlns:a="http://schemas.openxmlformats.org/drawingml/2006/main" xmlns:r="http://schemas.openxmlformats.org/officeDocument/2006/relationships" xmlns:p="http://schemas.openxmlformats.org/presentationml/2006/main">
   <p:cSld>
@@ -7392,51 +7366,13 @@
           <a:p>
             <a:r>
               <a:rPr lang="en-US" dirty="0"/>
-              <a:t>Ridge replaces the RSS term:                                           with a new minimizer that includes a so-called </a:t>
-            </a:r>
-            <a:r>
-              <a:rPr lang="en-US" b="0" dirty="0"/>
-              <a:t>shrinkage penalty</a:t>
-            </a:r>
-            <a:r>
-              <a:rPr lang="en-US" dirty="0"/>
-              <a:t>: </a:t>
-            </a:r>
-          </a:p>
-          <a:p>
+              <a:t>Ridge replaces the RSS </a:t>
+            </a:r>
+            <a:r>
+              <a:rPr lang="en-US"/>
+              <a:t>term:</a:t>
+            </a:r>
             <a:endParaRPr lang="en-US" dirty="0"/>
-          </a:p>
-          <a:p>
-            <a:endParaRPr lang="en-US" dirty="0"/>
-          </a:p>
-          <a:p>
-            <a:endParaRPr lang="en-US" dirty="0"/>
-          </a:p>
-          <a:p>
-            <a:r>
-              <a:rPr lang="en-US" dirty="0"/>
-              <a:t>The adjustable parameter </a:t>
-            </a:r>
-            <a:r>
-              <a:rPr lang="en-US" dirty="0">
-                <a:latin typeface="symbol" charset="2"/>
-              </a:rPr>
-              <a:t>l</a:t>
-            </a:r>
-            <a:r>
-              <a:rPr lang="en-US" dirty="0"/>
-              <a:t>, trades the baseline RSS with a penalty for nonzero coefficients.  As </a:t>
-            </a:r>
-            <a:r>
-              <a:rPr lang="en-US" dirty="0">
-                <a:latin typeface="symbol" charset="2"/>
-              </a:rPr>
-              <a:t>l</a:t>
-            </a:r>
-            <a:r>
-              <a:rPr lang="en-US" dirty="0"/>
-              <a:t> increases to infinity the minimized error drives all of the coefficients to zero </a:t>
-            </a:r>
           </a:p>
         </p:txBody>
       </p:sp>
@@ -7488,6 +7424,409 @@
           </a:prstGeom>
         </p:spPr>
       </p:pic>
+      <p:sp>
+        <p:nvSpPr>
+          <p:cNvPr id="7" name="Text Placeholder 2">
+            <a:extLst>
+              <a:ext uri="{FF2B5EF4-FFF2-40B4-BE49-F238E27FC236}">
+                <a16:creationId xmlns:a16="http://schemas.microsoft.com/office/drawing/2014/main" id="{FFAB65B8-89B1-4AFE-995B-7B35B1E3EC39}"/>
+              </a:ext>
+            </a:extLst>
+          </p:cNvPr>
+          <p:cNvSpPr txBox="1">
+            <a:spLocks/>
+          </p:cNvSpPr>
+          <p:nvPr/>
+        </p:nvSpPr>
+        <p:spPr>
+          <a:xfrm>
+            <a:off x="659305" y="1736724"/>
+            <a:ext cx="8196210" cy="1242049"/>
+          </a:xfrm>
+          <a:prstGeom prst="rect">
+            <a:avLst/>
+          </a:prstGeom>
+        </p:spPr>
+        <p:txBody>
+          <a:bodyPr/>
+          <a:lstStyle>
+            <a:lvl1pPr marL="342900" indent="-342900" algn="l" defTabSz="457200" rtl="0" eaLnBrk="1" latinLnBrk="0" hangingPunct="1">
+              <a:spcBef>
+                <a:spcPct val="20000"/>
+              </a:spcBef>
+              <a:buFont typeface="Lucida Grande"/>
+              <a:buChar char="&gt;"/>
+              <a:defRPr sz="2400" b="1" i="0" kern="1200" baseline="0">
+                <a:solidFill>
+                  <a:srgbClr val="4B2E83"/>
+                </a:solidFill>
+                <a:latin typeface="Open Sans"/>
+                <a:ea typeface="+mn-ea"/>
+                <a:cs typeface="Open Sans"/>
+              </a:defRPr>
+            </a:lvl1pPr>
+            <a:lvl2pPr marL="742950" indent="-285750" algn="l" defTabSz="457200" rtl="0" eaLnBrk="1" latinLnBrk="0" hangingPunct="1">
+              <a:spcBef>
+                <a:spcPct val="20000"/>
+              </a:spcBef>
+              <a:buFont typeface="Arial"/>
+              <a:buChar char="–"/>
+              <a:defRPr sz="2000" b="1" i="0" kern="1200" baseline="0">
+                <a:solidFill>
+                  <a:srgbClr val="4B2E83"/>
+                </a:solidFill>
+                <a:latin typeface="Open Sans"/>
+                <a:ea typeface="+mn-ea"/>
+                <a:cs typeface="Open Sans"/>
+              </a:defRPr>
+            </a:lvl2pPr>
+            <a:lvl3pPr marL="1143000" indent="-228600" algn="l" defTabSz="457200" rtl="0" eaLnBrk="1" latinLnBrk="0" hangingPunct="1">
+              <a:spcBef>
+                <a:spcPct val="20000"/>
+              </a:spcBef>
+              <a:buSzPct val="100000"/>
+              <a:buFont typeface="Lucida Grande"/>
+              <a:buChar char="&gt;"/>
+              <a:defRPr sz="1800" b="1" i="0" kern="1200" baseline="0">
+                <a:solidFill>
+                  <a:srgbClr val="4B2E83"/>
+                </a:solidFill>
+                <a:latin typeface="Open Sans"/>
+                <a:ea typeface="+mn-ea"/>
+                <a:cs typeface="Open Sans"/>
+              </a:defRPr>
+            </a:lvl3pPr>
+            <a:lvl4pPr marL="1600200" indent="-228600" algn="l" defTabSz="457200" rtl="0" eaLnBrk="1" latinLnBrk="0" hangingPunct="1">
+              <a:spcBef>
+                <a:spcPct val="20000"/>
+              </a:spcBef>
+              <a:buFont typeface="Arial"/>
+              <a:buChar char="–"/>
+              <a:defRPr sz="1600" b="1" i="0" kern="1200" baseline="0">
+                <a:solidFill>
+                  <a:srgbClr val="4B2E83"/>
+                </a:solidFill>
+                <a:latin typeface="Open Sans"/>
+                <a:ea typeface="+mn-ea"/>
+                <a:cs typeface="Open Sans"/>
+              </a:defRPr>
+            </a:lvl4pPr>
+            <a:lvl5pPr marL="2057400" indent="-228600" algn="l" defTabSz="457200" rtl="0" eaLnBrk="1" latinLnBrk="0" hangingPunct="1">
+              <a:spcBef>
+                <a:spcPct val="20000"/>
+              </a:spcBef>
+              <a:buFont typeface="Lucida Grande"/>
+              <a:buChar char="&gt;"/>
+              <a:defRPr sz="1400" b="1" i="0" kern="1200" baseline="0">
+                <a:solidFill>
+                  <a:srgbClr val="4B2E83"/>
+                </a:solidFill>
+                <a:latin typeface="Open Sans"/>
+                <a:ea typeface="+mn-ea"/>
+                <a:cs typeface="Open Sans"/>
+              </a:defRPr>
+            </a:lvl5pPr>
+            <a:lvl6pPr marL="2514600" indent="-228600" algn="l" defTabSz="457200" rtl="0" eaLnBrk="1" latinLnBrk="0" hangingPunct="1">
+              <a:spcBef>
+                <a:spcPct val="20000"/>
+              </a:spcBef>
+              <a:buFont typeface="Arial"/>
+              <a:buChar char="•"/>
+              <a:defRPr sz="2000" kern="1200">
+                <a:solidFill>
+                  <a:schemeClr val="tx1"/>
+                </a:solidFill>
+                <a:latin typeface="+mn-lt"/>
+                <a:ea typeface="+mn-ea"/>
+                <a:cs typeface="+mn-cs"/>
+              </a:defRPr>
+            </a:lvl6pPr>
+            <a:lvl7pPr marL="2971800" indent="-228600" algn="l" defTabSz="457200" rtl="0" eaLnBrk="1" latinLnBrk="0" hangingPunct="1">
+              <a:spcBef>
+                <a:spcPct val="20000"/>
+              </a:spcBef>
+              <a:buFont typeface="Arial"/>
+              <a:buChar char="•"/>
+              <a:defRPr sz="2000" kern="1200">
+                <a:solidFill>
+                  <a:schemeClr val="tx1"/>
+                </a:solidFill>
+                <a:latin typeface="+mn-lt"/>
+                <a:ea typeface="+mn-ea"/>
+                <a:cs typeface="+mn-cs"/>
+              </a:defRPr>
+            </a:lvl7pPr>
+            <a:lvl8pPr marL="3429000" indent="-228600" algn="l" defTabSz="457200" rtl="0" eaLnBrk="1" latinLnBrk="0" hangingPunct="1">
+              <a:spcBef>
+                <a:spcPct val="20000"/>
+              </a:spcBef>
+              <a:buFont typeface="Arial"/>
+              <a:buChar char="•"/>
+              <a:defRPr sz="2000" kern="1200">
+                <a:solidFill>
+                  <a:schemeClr val="tx1"/>
+                </a:solidFill>
+                <a:latin typeface="+mn-lt"/>
+                <a:ea typeface="+mn-ea"/>
+                <a:cs typeface="+mn-cs"/>
+              </a:defRPr>
+            </a:lvl8pPr>
+            <a:lvl9pPr marL="3886200" indent="-228600" algn="l" defTabSz="457200" rtl="0" eaLnBrk="1" latinLnBrk="0" hangingPunct="1">
+              <a:spcBef>
+                <a:spcPct val="20000"/>
+              </a:spcBef>
+              <a:buFont typeface="Arial"/>
+              <a:buChar char="•"/>
+              <a:defRPr sz="2000" kern="1200">
+                <a:solidFill>
+                  <a:schemeClr val="tx1"/>
+                </a:solidFill>
+                <a:latin typeface="+mn-lt"/>
+                <a:ea typeface="+mn-ea"/>
+                <a:cs typeface="+mn-cs"/>
+              </a:defRPr>
+            </a:lvl9pPr>
+          </a:lstStyle>
+          <a:p>
+            <a:r>
+              <a:rPr lang="en-US"/>
+              <a:t>Ridge replaces the RSS term:                                           with a new minimizer that includes a so-called </a:t>
+            </a:r>
+            <a:r>
+              <a:rPr lang="en-US" b="0"/>
+              <a:t>shrinkage penalty</a:t>
+            </a:r>
+            <a:r>
+              <a:rPr lang="en-US"/>
+              <a:t>: </a:t>
+            </a:r>
+          </a:p>
+          <a:p>
+            <a:endParaRPr lang="en-US"/>
+          </a:p>
+          <a:p>
+            <a:endParaRPr lang="en-US"/>
+          </a:p>
+          <a:p>
+            <a:endParaRPr lang="en-US"/>
+          </a:p>
+        </p:txBody>
+      </p:sp>
+      <p:sp>
+        <p:nvSpPr>
+          <p:cNvPr id="8" name="Text Placeholder 2">
+            <a:extLst>
+              <a:ext uri="{FF2B5EF4-FFF2-40B4-BE49-F238E27FC236}">
+                <a16:creationId xmlns:a16="http://schemas.microsoft.com/office/drawing/2014/main" id="{FB650850-3C50-4A9C-91E3-503643732CCC}"/>
+              </a:ext>
+            </a:extLst>
+          </p:cNvPr>
+          <p:cNvSpPr txBox="1">
+            <a:spLocks/>
+          </p:cNvSpPr>
+          <p:nvPr/>
+        </p:nvSpPr>
+        <p:spPr>
+          <a:xfrm>
+            <a:off x="659305" y="1736723"/>
+            <a:ext cx="8196210" cy="4015497"/>
+          </a:xfrm>
+          <a:prstGeom prst="rect">
+            <a:avLst/>
+          </a:prstGeom>
+        </p:spPr>
+        <p:txBody>
+          <a:bodyPr/>
+          <a:lstStyle>
+            <a:lvl1pPr marL="342900" indent="-342900" algn="l" defTabSz="457200" rtl="0" eaLnBrk="1" latinLnBrk="0" hangingPunct="1">
+              <a:spcBef>
+                <a:spcPct val="20000"/>
+              </a:spcBef>
+              <a:buFont typeface="Lucida Grande"/>
+              <a:buChar char="&gt;"/>
+              <a:defRPr sz="2400" b="1" i="0" kern="1200" baseline="0">
+                <a:solidFill>
+                  <a:srgbClr val="4B2E83"/>
+                </a:solidFill>
+                <a:latin typeface="Open Sans"/>
+                <a:ea typeface="+mn-ea"/>
+                <a:cs typeface="Open Sans"/>
+              </a:defRPr>
+            </a:lvl1pPr>
+            <a:lvl2pPr marL="742950" indent="-285750" algn="l" defTabSz="457200" rtl="0" eaLnBrk="1" latinLnBrk="0" hangingPunct="1">
+              <a:spcBef>
+                <a:spcPct val="20000"/>
+              </a:spcBef>
+              <a:buFont typeface="Arial"/>
+              <a:buChar char="–"/>
+              <a:defRPr sz="2000" b="1" i="0" kern="1200" baseline="0">
+                <a:solidFill>
+                  <a:srgbClr val="4B2E83"/>
+                </a:solidFill>
+                <a:latin typeface="Open Sans"/>
+                <a:ea typeface="+mn-ea"/>
+                <a:cs typeface="Open Sans"/>
+              </a:defRPr>
+            </a:lvl2pPr>
+            <a:lvl3pPr marL="1143000" indent="-228600" algn="l" defTabSz="457200" rtl="0" eaLnBrk="1" latinLnBrk="0" hangingPunct="1">
+              <a:spcBef>
+                <a:spcPct val="20000"/>
+              </a:spcBef>
+              <a:buSzPct val="100000"/>
+              <a:buFont typeface="Lucida Grande"/>
+              <a:buChar char="&gt;"/>
+              <a:defRPr sz="1800" b="1" i="0" kern="1200" baseline="0">
+                <a:solidFill>
+                  <a:srgbClr val="4B2E83"/>
+                </a:solidFill>
+                <a:latin typeface="Open Sans"/>
+                <a:ea typeface="+mn-ea"/>
+                <a:cs typeface="Open Sans"/>
+              </a:defRPr>
+            </a:lvl3pPr>
+            <a:lvl4pPr marL="1600200" indent="-228600" algn="l" defTabSz="457200" rtl="0" eaLnBrk="1" latinLnBrk="0" hangingPunct="1">
+              <a:spcBef>
+                <a:spcPct val="20000"/>
+              </a:spcBef>
+              <a:buFont typeface="Arial"/>
+              <a:buChar char="–"/>
+              <a:defRPr sz="1600" b="1" i="0" kern="1200" baseline="0">
+                <a:solidFill>
+                  <a:srgbClr val="4B2E83"/>
+                </a:solidFill>
+                <a:latin typeface="Open Sans"/>
+                <a:ea typeface="+mn-ea"/>
+                <a:cs typeface="Open Sans"/>
+              </a:defRPr>
+            </a:lvl4pPr>
+            <a:lvl5pPr marL="2057400" indent="-228600" algn="l" defTabSz="457200" rtl="0" eaLnBrk="1" latinLnBrk="0" hangingPunct="1">
+              <a:spcBef>
+                <a:spcPct val="20000"/>
+              </a:spcBef>
+              <a:buFont typeface="Lucida Grande"/>
+              <a:buChar char="&gt;"/>
+              <a:defRPr sz="1400" b="1" i="0" kern="1200" baseline="0">
+                <a:solidFill>
+                  <a:srgbClr val="4B2E83"/>
+                </a:solidFill>
+                <a:latin typeface="Open Sans"/>
+                <a:ea typeface="+mn-ea"/>
+                <a:cs typeface="Open Sans"/>
+              </a:defRPr>
+            </a:lvl5pPr>
+            <a:lvl6pPr marL="2514600" indent="-228600" algn="l" defTabSz="457200" rtl="0" eaLnBrk="1" latinLnBrk="0" hangingPunct="1">
+              <a:spcBef>
+                <a:spcPct val="20000"/>
+              </a:spcBef>
+              <a:buFont typeface="Arial"/>
+              <a:buChar char="•"/>
+              <a:defRPr sz="2000" kern="1200">
+                <a:solidFill>
+                  <a:schemeClr val="tx1"/>
+                </a:solidFill>
+                <a:latin typeface="+mn-lt"/>
+                <a:ea typeface="+mn-ea"/>
+                <a:cs typeface="+mn-cs"/>
+              </a:defRPr>
+            </a:lvl6pPr>
+            <a:lvl7pPr marL="2971800" indent="-228600" algn="l" defTabSz="457200" rtl="0" eaLnBrk="1" latinLnBrk="0" hangingPunct="1">
+              <a:spcBef>
+                <a:spcPct val="20000"/>
+              </a:spcBef>
+              <a:buFont typeface="Arial"/>
+              <a:buChar char="•"/>
+              <a:defRPr sz="2000" kern="1200">
+                <a:solidFill>
+                  <a:schemeClr val="tx1"/>
+                </a:solidFill>
+                <a:latin typeface="+mn-lt"/>
+                <a:ea typeface="+mn-ea"/>
+                <a:cs typeface="+mn-cs"/>
+              </a:defRPr>
+            </a:lvl7pPr>
+            <a:lvl8pPr marL="3429000" indent="-228600" algn="l" defTabSz="457200" rtl="0" eaLnBrk="1" latinLnBrk="0" hangingPunct="1">
+              <a:spcBef>
+                <a:spcPct val="20000"/>
+              </a:spcBef>
+              <a:buFont typeface="Arial"/>
+              <a:buChar char="•"/>
+              <a:defRPr sz="2000" kern="1200">
+                <a:solidFill>
+                  <a:schemeClr val="tx1"/>
+                </a:solidFill>
+                <a:latin typeface="+mn-lt"/>
+                <a:ea typeface="+mn-ea"/>
+                <a:cs typeface="+mn-cs"/>
+              </a:defRPr>
+            </a:lvl8pPr>
+            <a:lvl9pPr marL="3886200" indent="-228600" algn="l" defTabSz="457200" rtl="0" eaLnBrk="1" latinLnBrk="0" hangingPunct="1">
+              <a:spcBef>
+                <a:spcPct val="20000"/>
+              </a:spcBef>
+              <a:buFont typeface="Arial"/>
+              <a:buChar char="•"/>
+              <a:defRPr sz="2000" kern="1200">
+                <a:solidFill>
+                  <a:schemeClr val="tx1"/>
+                </a:solidFill>
+                <a:latin typeface="+mn-lt"/>
+                <a:ea typeface="+mn-ea"/>
+                <a:cs typeface="+mn-cs"/>
+              </a:defRPr>
+            </a:lvl9pPr>
+          </a:lstStyle>
+          <a:p>
+            <a:r>
+              <a:rPr lang="en-US"/>
+              <a:t>Ridge replaces the RSS term:                                           with a new minimizer that includes a so-called </a:t>
+            </a:r>
+            <a:r>
+              <a:rPr lang="en-US" b="0"/>
+              <a:t>shrinkage penalty</a:t>
+            </a:r>
+            <a:r>
+              <a:rPr lang="en-US"/>
+              <a:t>: </a:t>
+            </a:r>
+          </a:p>
+          <a:p>
+            <a:endParaRPr lang="en-US"/>
+          </a:p>
+          <a:p>
+            <a:endParaRPr lang="en-US"/>
+          </a:p>
+          <a:p>
+            <a:endParaRPr lang="en-US"/>
+          </a:p>
+          <a:p>
+            <a:r>
+              <a:rPr lang="en-US"/>
+              <a:t>The adjustable parameter </a:t>
+            </a:r>
+            <a:r>
+              <a:rPr lang="en-US">
+                <a:latin typeface="symbol" charset="2"/>
+              </a:rPr>
+              <a:t>l</a:t>
+            </a:r>
+            <a:r>
+              <a:rPr lang="en-US"/>
+              <a:t>, trades the baseline RSS with a penalty for nonzero coefficients.  As </a:t>
+            </a:r>
+            <a:r>
+              <a:rPr lang="en-US">
+                <a:latin typeface="symbol" charset="2"/>
+              </a:rPr>
+              <a:t>l</a:t>
+            </a:r>
+            <a:r>
+              <a:rPr lang="en-US"/>
+              <a:t> increases to infinity the minimized error drives all of the coefficients to zero </a:t>
+            </a:r>
+            <a:endParaRPr lang="en-US" dirty="0"/>
+          </a:p>
+        </p:txBody>
+      </p:sp>
     </p:spTree>
     <p:extLst>
       <p:ext uri="{BB962C8B-B14F-4D97-AF65-F5344CB8AC3E}">
@@ -7498,6 +7837,234 @@
   <p:clrMapOvr>
     <a:masterClrMapping/>
   </p:clrMapOvr>
+  <p:timing>
+    <p:tnLst>
+      <p:par>
+        <p:cTn id="1" dur="indefinite" restart="never" nodeType="tmRoot">
+          <p:childTnLst>
+            <p:seq concurrent="1" nextAc="seek">
+              <p:cTn id="2" dur="indefinite" nodeType="mainSeq">
+                <p:childTnLst>
+                  <p:par>
+                    <p:cTn id="3" fill="hold">
+                      <p:stCondLst>
+                        <p:cond delay="indefinite"/>
+                      </p:stCondLst>
+                      <p:childTnLst>
+                        <p:par>
+                          <p:cTn id="4" fill="hold">
+                            <p:stCondLst>
+                              <p:cond delay="0"/>
+                            </p:stCondLst>
+                            <p:childTnLst>
+                              <p:par>
+                                <p:cTn id="5" presetID="1" presetClass="entr" presetSubtype="0" fill="hold" grpId="0" nodeType="clickEffect">
+                                  <p:stCondLst>
+                                    <p:cond delay="0"/>
+                                  </p:stCondLst>
+                                  <p:childTnLst>
+                                    <p:set>
+                                      <p:cBhvr>
+                                        <p:cTn id="6" dur="1" fill="hold">
+                                          <p:stCondLst>
+                                            <p:cond delay="0"/>
+                                          </p:stCondLst>
+                                        </p:cTn>
+                                        <p:tgtEl>
+                                          <p:spTgt spid="3">
+                                            <p:txEl>
+                                              <p:pRg st="0" end="0"/>
+                                            </p:txEl>
+                                          </p:spTgt>
+                                        </p:tgtEl>
+                                        <p:attrNameLst>
+                                          <p:attrName>style.visibility</p:attrName>
+                                        </p:attrNameLst>
+                                      </p:cBhvr>
+                                      <p:to>
+                                        <p:strVal val="visible"/>
+                                      </p:to>
+                                    </p:set>
+                                  </p:childTnLst>
+                                </p:cTn>
+                              </p:par>
+                              <p:par>
+                                <p:cTn id="7" presetID="1" presetClass="entr" presetSubtype="0" fill="hold" nodeType="withEffect">
+                                  <p:stCondLst>
+                                    <p:cond delay="0"/>
+                                  </p:stCondLst>
+                                  <p:childTnLst>
+                                    <p:set>
+                                      <p:cBhvr>
+                                        <p:cTn id="8" dur="1" fill="hold">
+                                          <p:stCondLst>
+                                            <p:cond delay="0"/>
+                                          </p:stCondLst>
+                                        </p:cTn>
+                                        <p:tgtEl>
+                                          <p:spTgt spid="4"/>
+                                        </p:tgtEl>
+                                        <p:attrNameLst>
+                                          <p:attrName>style.visibility</p:attrName>
+                                        </p:attrNameLst>
+                                      </p:cBhvr>
+                                      <p:to>
+                                        <p:strVal val="visible"/>
+                                      </p:to>
+                                    </p:set>
+                                  </p:childTnLst>
+                                </p:cTn>
+                              </p:par>
+                            </p:childTnLst>
+                          </p:cTn>
+                        </p:par>
+                      </p:childTnLst>
+                    </p:cTn>
+                  </p:par>
+                  <p:par>
+                    <p:cTn id="9" fill="hold">
+                      <p:stCondLst>
+                        <p:cond delay="indefinite"/>
+                      </p:stCondLst>
+                      <p:childTnLst>
+                        <p:par>
+                          <p:cTn id="10" fill="hold">
+                            <p:stCondLst>
+                              <p:cond delay="0"/>
+                            </p:stCondLst>
+                            <p:childTnLst>
+                              <p:par>
+                                <p:cTn id="11" presetID="1" presetClass="entr" presetSubtype="0" fill="hold" nodeType="clickEffect">
+                                  <p:stCondLst>
+                                    <p:cond delay="0"/>
+                                  </p:stCondLst>
+                                  <p:childTnLst>
+                                    <p:set>
+                                      <p:cBhvr>
+                                        <p:cTn id="12" dur="1" fill="hold">
+                                          <p:stCondLst>
+                                            <p:cond delay="0"/>
+                                          </p:stCondLst>
+                                        </p:cTn>
+                                        <p:tgtEl>
+                                          <p:spTgt spid="6"/>
+                                        </p:tgtEl>
+                                        <p:attrNameLst>
+                                          <p:attrName>style.visibility</p:attrName>
+                                        </p:attrNameLst>
+                                      </p:cBhvr>
+                                      <p:to>
+                                        <p:strVal val="visible"/>
+                                      </p:to>
+                                    </p:set>
+                                  </p:childTnLst>
+                                </p:cTn>
+                              </p:par>
+                              <p:par>
+                                <p:cTn id="13" presetID="1" presetClass="entr" presetSubtype="0" fill="hold" grpId="0" nodeType="withEffect">
+                                  <p:stCondLst>
+                                    <p:cond delay="0"/>
+                                  </p:stCondLst>
+                                  <p:childTnLst>
+                                    <p:set>
+                                      <p:cBhvr>
+                                        <p:cTn id="14" dur="1" fill="hold">
+                                          <p:stCondLst>
+                                            <p:cond delay="0"/>
+                                          </p:stCondLst>
+                                        </p:cTn>
+                                        <p:tgtEl>
+                                          <p:spTgt spid="7"/>
+                                        </p:tgtEl>
+                                        <p:attrNameLst>
+                                          <p:attrName>style.visibility</p:attrName>
+                                        </p:attrNameLst>
+                                      </p:cBhvr>
+                                      <p:to>
+                                        <p:strVal val="visible"/>
+                                      </p:to>
+                                    </p:set>
+                                  </p:childTnLst>
+                                </p:cTn>
+                              </p:par>
+                            </p:childTnLst>
+                          </p:cTn>
+                        </p:par>
+                      </p:childTnLst>
+                    </p:cTn>
+                  </p:par>
+                  <p:par>
+                    <p:cTn id="15" fill="hold">
+                      <p:stCondLst>
+                        <p:cond delay="indefinite"/>
+                      </p:stCondLst>
+                      <p:childTnLst>
+                        <p:par>
+                          <p:cTn id="16" fill="hold">
+                            <p:stCondLst>
+                              <p:cond delay="0"/>
+                            </p:stCondLst>
+                            <p:childTnLst>
+                              <p:par>
+                                <p:cTn id="17" presetID="1" presetClass="entr" presetSubtype="0" fill="hold" grpId="0" nodeType="clickEffect">
+                                  <p:stCondLst>
+                                    <p:cond delay="0"/>
+                                  </p:stCondLst>
+                                  <p:childTnLst>
+                                    <p:set>
+                                      <p:cBhvr>
+                                        <p:cTn id="18" dur="1" fill="hold">
+                                          <p:stCondLst>
+                                            <p:cond delay="0"/>
+                                          </p:stCondLst>
+                                        </p:cTn>
+                                        <p:tgtEl>
+                                          <p:spTgt spid="8"/>
+                                        </p:tgtEl>
+                                        <p:attrNameLst>
+                                          <p:attrName>style.visibility</p:attrName>
+                                        </p:attrNameLst>
+                                      </p:cBhvr>
+                                      <p:to>
+                                        <p:strVal val="visible"/>
+                                      </p:to>
+                                    </p:set>
+                                  </p:childTnLst>
+                                </p:cTn>
+                              </p:par>
+                            </p:childTnLst>
+                          </p:cTn>
+                        </p:par>
+                      </p:childTnLst>
+                    </p:cTn>
+                  </p:par>
+                </p:childTnLst>
+              </p:cTn>
+              <p:prevCondLst>
+                <p:cond evt="onPrev" delay="0">
+                  <p:tgtEl>
+                    <p:sldTgt/>
+                  </p:tgtEl>
+                </p:cond>
+              </p:prevCondLst>
+              <p:nextCondLst>
+                <p:cond evt="onNext" delay="0">
+                  <p:tgtEl>
+                    <p:sldTgt/>
+                  </p:tgtEl>
+                </p:cond>
+              </p:nextCondLst>
+            </p:seq>
+          </p:childTnLst>
+        </p:cTn>
+      </p:par>
+    </p:tnLst>
+    <p:bldLst>
+      <p:bldP spid="3" grpId="0" build="p"/>
+      <p:bldP spid="7" grpId="0"/>
+      <p:bldP spid="8" grpId="0"/>
+    </p:bldLst>
+  </p:timing>
 </p:sld>
 </file>
 
@@ -7935,84 +8502,6 @@
   <p:clrMapOvr>
     <a:masterClrMapping/>
   </p:clrMapOvr>
-  <p:timing>
-    <p:tnLst>
-      <p:par>
-        <p:cTn id="1" dur="indefinite" restart="never" nodeType="tmRoot">
-          <p:childTnLst>
-            <p:seq concurrent="1" nextAc="seek">
-              <p:cTn id="2" dur="indefinite" nodeType="mainSeq">
-                <p:childTnLst>
-                  <p:par>
-                    <p:cTn id="3" fill="hold">
-                      <p:stCondLst>
-                        <p:cond delay="indefinite"/>
-                      </p:stCondLst>
-                      <p:childTnLst>
-                        <p:par>
-                          <p:cTn id="4" fill="hold">
-                            <p:stCondLst>
-                              <p:cond delay="0"/>
-                            </p:stCondLst>
-                            <p:childTnLst>
-                              <p:par>
-                                <p:cTn id="5" presetID="1" presetClass="entr" presetSubtype="0" fill="hold" grpId="0" nodeType="clickEffect">
-                                  <p:stCondLst>
-                                    <p:cond delay="0"/>
-                                  </p:stCondLst>
-                                  <p:childTnLst>
-                                    <p:set>
-                                      <p:cBhvr>
-                                        <p:cTn id="6" dur="1" fill="hold">
-                                          <p:stCondLst>
-                                            <p:cond delay="0"/>
-                                          </p:stCondLst>
-                                        </p:cTn>
-                                        <p:tgtEl>
-                                          <p:spTgt spid="10"/>
-                                        </p:tgtEl>
-                                        <p:attrNameLst>
-                                          <p:attrName>style.visibility</p:attrName>
-                                        </p:attrNameLst>
-                                      </p:cBhvr>
-                                      <p:to>
-                                        <p:strVal val="visible"/>
-                                      </p:to>
-                                    </p:set>
-                                  </p:childTnLst>
-                                </p:cTn>
-                              </p:par>
-                            </p:childTnLst>
-                          </p:cTn>
-                        </p:par>
-                      </p:childTnLst>
-                    </p:cTn>
-                  </p:par>
-                </p:childTnLst>
-              </p:cTn>
-              <p:prevCondLst>
-                <p:cond evt="onPrev" delay="0">
-                  <p:tgtEl>
-                    <p:sldTgt/>
-                  </p:tgtEl>
-                </p:cond>
-              </p:prevCondLst>
-              <p:nextCondLst>
-                <p:cond evt="onNext" delay="0">
-                  <p:tgtEl>
-                    <p:sldTgt/>
-                  </p:tgtEl>
-                </p:cond>
-              </p:nextCondLst>
-            </p:seq>
-          </p:childTnLst>
-        </p:cTn>
-      </p:par>
-    </p:tnLst>
-    <p:bldLst>
-      <p:bldP spid="10" grpId="0"/>
-    </p:bldLst>
-  </p:timing>
 </p:sld>
 </file>
 
@@ -8093,7 +8582,7 @@
 </file>
 
 <file path=ppt/slides/slide34.xml><?xml version="1.0" encoding="utf-8"?>
-<p:sld xmlns:a="http://schemas.openxmlformats.org/drawingml/2006/main" xmlns:r="http://schemas.openxmlformats.org/officeDocument/2006/relationships" xmlns:p="http://schemas.openxmlformats.org/presentationml/2006/main">
+<p:sld xmlns:a="http://schemas.openxmlformats.org/drawingml/2006/main" xmlns:r="http://schemas.openxmlformats.org/officeDocument/2006/relationships" xmlns:p="http://schemas.openxmlformats.org/presentationml/2006/main" show="0">
   <p:cSld>
     <p:spTree>
       <p:nvGrpSpPr>
@@ -8559,7 +9048,12 @@
             <p:ph type="body" sz="quarter" idx="11"/>
           </p:nvPr>
         </p:nvSpPr>
-        <p:spPr/>
+        <p:spPr>
+          <a:xfrm>
+            <a:off x="652627" y="1736725"/>
+            <a:ext cx="8196210" cy="4015497"/>
+          </a:xfrm>
+        </p:spPr>
         <p:txBody>
           <a:bodyPr/>
           <a:lstStyle/>
@@ -8576,43 +9070,14 @@
               <a:t>Final model still includes all </a:t>
             </a:r>
             <a:r>
-              <a:rPr lang="en-US" i="1" dirty="0"/>
+              <a:rPr lang="en-US" i="1"/>
               <a:t>p</a:t>
             </a:r>
             <a:r>
-              <a:rPr lang="en-US" dirty="0"/>
+              <a:rPr lang="en-US"/>
               <a:t> predictors</a:t>
             </a:r>
-          </a:p>
-          <a:p>
-            <a:r>
-              <a:rPr lang="en-US" dirty="0"/>
-              <a:t>The LASSO regression was developed, inspired by ridge, to provide the </a:t>
-            </a:r>
-            <a:r>
-              <a:rPr lang="en-US" b="0" dirty="0"/>
-              <a:t>possibility</a:t>
-            </a:r>
-            <a:r>
-              <a:rPr lang="en-US" dirty="0"/>
-              <a:t> that some of the coefficients can take a value of zero </a:t>
-            </a:r>
-          </a:p>
-          <a:p>
-            <a:r>
-              <a:rPr lang="en-US" dirty="0"/>
-              <a:t>Like ridge, the LASSO operator is minimized as a function of an adjustable </a:t>
-            </a:r>
-            <a:r>
-              <a:rPr lang="en-US" dirty="0">
-                <a:latin typeface="symbol" charset="2"/>
-              </a:rPr>
-              <a:t>l </a:t>
-            </a:r>
-            <a:r>
-              <a:rPr lang="en-US" dirty="0"/>
-              <a:t>parameter  </a:t>
-            </a:r>
+            <a:endParaRPr lang="en-US" dirty="0"/>
           </a:p>
         </p:txBody>
       </p:sp>
@@ -8640,6 +9105,423 @@
           </a:prstGeom>
         </p:spPr>
       </p:pic>
+      <p:sp>
+        <p:nvSpPr>
+          <p:cNvPr id="5" name="Text Placeholder 2">
+            <a:extLst>
+              <a:ext uri="{FF2B5EF4-FFF2-40B4-BE49-F238E27FC236}">
+                <a16:creationId xmlns:a16="http://schemas.microsoft.com/office/drawing/2014/main" id="{2B3D23C3-200A-4FE1-B309-4DA347C167E9}"/>
+              </a:ext>
+            </a:extLst>
+          </p:cNvPr>
+          <p:cNvSpPr txBox="1">
+            <a:spLocks/>
+          </p:cNvSpPr>
+          <p:nvPr/>
+        </p:nvSpPr>
+        <p:spPr>
+          <a:xfrm>
+            <a:off x="652627" y="1736725"/>
+            <a:ext cx="8196210" cy="4015497"/>
+          </a:xfrm>
+          <a:prstGeom prst="rect">
+            <a:avLst/>
+          </a:prstGeom>
+        </p:spPr>
+        <p:txBody>
+          <a:bodyPr/>
+          <a:lstStyle>
+            <a:lvl1pPr marL="342900" indent="-342900" algn="l" defTabSz="457200" rtl="0" eaLnBrk="1" latinLnBrk="0" hangingPunct="1">
+              <a:spcBef>
+                <a:spcPct val="20000"/>
+              </a:spcBef>
+              <a:buFont typeface="Lucida Grande"/>
+              <a:buChar char="&gt;"/>
+              <a:defRPr sz="2400" b="1" i="0" kern="1200" baseline="0">
+                <a:solidFill>
+                  <a:srgbClr val="4B2E83"/>
+                </a:solidFill>
+                <a:latin typeface="Open Sans"/>
+                <a:ea typeface="+mn-ea"/>
+                <a:cs typeface="Open Sans"/>
+              </a:defRPr>
+            </a:lvl1pPr>
+            <a:lvl2pPr marL="742950" indent="-285750" algn="l" defTabSz="457200" rtl="0" eaLnBrk="1" latinLnBrk="0" hangingPunct="1">
+              <a:spcBef>
+                <a:spcPct val="20000"/>
+              </a:spcBef>
+              <a:buFont typeface="Arial"/>
+              <a:buChar char="–"/>
+              <a:defRPr sz="2000" b="1" i="0" kern="1200" baseline="0">
+                <a:solidFill>
+                  <a:srgbClr val="4B2E83"/>
+                </a:solidFill>
+                <a:latin typeface="Open Sans"/>
+                <a:ea typeface="+mn-ea"/>
+                <a:cs typeface="Open Sans"/>
+              </a:defRPr>
+            </a:lvl2pPr>
+            <a:lvl3pPr marL="1143000" indent="-228600" algn="l" defTabSz="457200" rtl="0" eaLnBrk="1" latinLnBrk="0" hangingPunct="1">
+              <a:spcBef>
+                <a:spcPct val="20000"/>
+              </a:spcBef>
+              <a:buSzPct val="100000"/>
+              <a:buFont typeface="Lucida Grande"/>
+              <a:buChar char="&gt;"/>
+              <a:defRPr sz="1800" b="1" i="0" kern="1200" baseline="0">
+                <a:solidFill>
+                  <a:srgbClr val="4B2E83"/>
+                </a:solidFill>
+                <a:latin typeface="Open Sans"/>
+                <a:ea typeface="+mn-ea"/>
+                <a:cs typeface="Open Sans"/>
+              </a:defRPr>
+            </a:lvl3pPr>
+            <a:lvl4pPr marL="1600200" indent="-228600" algn="l" defTabSz="457200" rtl="0" eaLnBrk="1" latinLnBrk="0" hangingPunct="1">
+              <a:spcBef>
+                <a:spcPct val="20000"/>
+              </a:spcBef>
+              <a:buFont typeface="Arial"/>
+              <a:buChar char="–"/>
+              <a:defRPr sz="1600" b="1" i="0" kern="1200" baseline="0">
+                <a:solidFill>
+                  <a:srgbClr val="4B2E83"/>
+                </a:solidFill>
+                <a:latin typeface="Open Sans"/>
+                <a:ea typeface="+mn-ea"/>
+                <a:cs typeface="Open Sans"/>
+              </a:defRPr>
+            </a:lvl4pPr>
+            <a:lvl5pPr marL="2057400" indent="-228600" algn="l" defTabSz="457200" rtl="0" eaLnBrk="1" latinLnBrk="0" hangingPunct="1">
+              <a:spcBef>
+                <a:spcPct val="20000"/>
+              </a:spcBef>
+              <a:buFont typeface="Lucida Grande"/>
+              <a:buChar char="&gt;"/>
+              <a:defRPr sz="1400" b="1" i="0" kern="1200" baseline="0">
+                <a:solidFill>
+                  <a:srgbClr val="4B2E83"/>
+                </a:solidFill>
+                <a:latin typeface="Open Sans"/>
+                <a:ea typeface="+mn-ea"/>
+                <a:cs typeface="Open Sans"/>
+              </a:defRPr>
+            </a:lvl5pPr>
+            <a:lvl6pPr marL="2514600" indent="-228600" algn="l" defTabSz="457200" rtl="0" eaLnBrk="1" latinLnBrk="0" hangingPunct="1">
+              <a:spcBef>
+                <a:spcPct val="20000"/>
+              </a:spcBef>
+              <a:buFont typeface="Arial"/>
+              <a:buChar char="•"/>
+              <a:defRPr sz="2000" kern="1200">
+                <a:solidFill>
+                  <a:schemeClr val="tx1"/>
+                </a:solidFill>
+                <a:latin typeface="+mn-lt"/>
+                <a:ea typeface="+mn-ea"/>
+                <a:cs typeface="+mn-cs"/>
+              </a:defRPr>
+            </a:lvl6pPr>
+            <a:lvl7pPr marL="2971800" indent="-228600" algn="l" defTabSz="457200" rtl="0" eaLnBrk="1" latinLnBrk="0" hangingPunct="1">
+              <a:spcBef>
+                <a:spcPct val="20000"/>
+              </a:spcBef>
+              <a:buFont typeface="Arial"/>
+              <a:buChar char="•"/>
+              <a:defRPr sz="2000" kern="1200">
+                <a:solidFill>
+                  <a:schemeClr val="tx1"/>
+                </a:solidFill>
+                <a:latin typeface="+mn-lt"/>
+                <a:ea typeface="+mn-ea"/>
+                <a:cs typeface="+mn-cs"/>
+              </a:defRPr>
+            </a:lvl7pPr>
+            <a:lvl8pPr marL="3429000" indent="-228600" algn="l" defTabSz="457200" rtl="0" eaLnBrk="1" latinLnBrk="0" hangingPunct="1">
+              <a:spcBef>
+                <a:spcPct val="20000"/>
+              </a:spcBef>
+              <a:buFont typeface="Arial"/>
+              <a:buChar char="•"/>
+              <a:defRPr sz="2000" kern="1200">
+                <a:solidFill>
+                  <a:schemeClr val="tx1"/>
+                </a:solidFill>
+                <a:latin typeface="+mn-lt"/>
+                <a:ea typeface="+mn-ea"/>
+                <a:cs typeface="+mn-cs"/>
+              </a:defRPr>
+            </a:lvl8pPr>
+            <a:lvl9pPr marL="3886200" indent="-228600" algn="l" defTabSz="457200" rtl="0" eaLnBrk="1" latinLnBrk="0" hangingPunct="1">
+              <a:spcBef>
+                <a:spcPct val="20000"/>
+              </a:spcBef>
+              <a:buFont typeface="Arial"/>
+              <a:buChar char="•"/>
+              <a:defRPr sz="2000" kern="1200">
+                <a:solidFill>
+                  <a:schemeClr val="tx1"/>
+                </a:solidFill>
+                <a:latin typeface="+mn-lt"/>
+                <a:ea typeface="+mn-ea"/>
+                <a:cs typeface="+mn-cs"/>
+              </a:defRPr>
+            </a:lvl9pPr>
+          </a:lstStyle>
+          <a:p>
+            <a:r>
+              <a:rPr lang="en-US"/>
+              <a:t>Ridge regression does not set any of the coefficients exactly to zero but can shrink all of them </a:t>
+            </a:r>
+          </a:p>
+          <a:p>
+            <a:pPr lvl="1"/>
+            <a:r>
+              <a:rPr lang="en-US"/>
+              <a:t>Final model still includes all </a:t>
+            </a:r>
+            <a:r>
+              <a:rPr lang="en-US" i="1"/>
+              <a:t>p</a:t>
+            </a:r>
+            <a:r>
+              <a:rPr lang="en-US"/>
+              <a:t> predictors</a:t>
+            </a:r>
+          </a:p>
+          <a:p>
+            <a:r>
+              <a:rPr lang="en-US"/>
+              <a:t>The LASSO regression was developed, inspired by ridge, to provide the </a:t>
+            </a:r>
+            <a:r>
+              <a:rPr lang="en-US" b="0"/>
+              <a:t>possibility</a:t>
+            </a:r>
+            <a:r>
+              <a:rPr lang="en-US"/>
+              <a:t> that some of the coefficients can take a value of zero</a:t>
+            </a:r>
+          </a:p>
+        </p:txBody>
+      </p:sp>
+      <p:sp>
+        <p:nvSpPr>
+          <p:cNvPr id="7" name="Text Placeholder 2">
+            <a:extLst>
+              <a:ext uri="{FF2B5EF4-FFF2-40B4-BE49-F238E27FC236}">
+                <a16:creationId xmlns:a16="http://schemas.microsoft.com/office/drawing/2014/main" id="{7F6C6410-EED3-49CB-B804-6667ECB9E45D}"/>
+              </a:ext>
+            </a:extLst>
+          </p:cNvPr>
+          <p:cNvSpPr txBox="1">
+            <a:spLocks/>
+          </p:cNvSpPr>
+          <p:nvPr/>
+        </p:nvSpPr>
+        <p:spPr>
+          <a:xfrm>
+            <a:off x="652627" y="1736725"/>
+            <a:ext cx="8196210" cy="4015497"/>
+          </a:xfrm>
+          <a:prstGeom prst="rect">
+            <a:avLst/>
+          </a:prstGeom>
+        </p:spPr>
+        <p:txBody>
+          <a:bodyPr/>
+          <a:lstStyle>
+            <a:lvl1pPr marL="342900" indent="-342900" algn="l" defTabSz="457200" rtl="0" eaLnBrk="1" latinLnBrk="0" hangingPunct="1">
+              <a:spcBef>
+                <a:spcPct val="20000"/>
+              </a:spcBef>
+              <a:buFont typeface="Lucida Grande"/>
+              <a:buChar char="&gt;"/>
+              <a:defRPr sz="2400" b="1" i="0" kern="1200" baseline="0">
+                <a:solidFill>
+                  <a:srgbClr val="4B2E83"/>
+                </a:solidFill>
+                <a:latin typeface="Open Sans"/>
+                <a:ea typeface="+mn-ea"/>
+                <a:cs typeface="Open Sans"/>
+              </a:defRPr>
+            </a:lvl1pPr>
+            <a:lvl2pPr marL="742950" indent="-285750" algn="l" defTabSz="457200" rtl="0" eaLnBrk="1" latinLnBrk="0" hangingPunct="1">
+              <a:spcBef>
+                <a:spcPct val="20000"/>
+              </a:spcBef>
+              <a:buFont typeface="Arial"/>
+              <a:buChar char="–"/>
+              <a:defRPr sz="2000" b="1" i="0" kern="1200" baseline="0">
+                <a:solidFill>
+                  <a:srgbClr val="4B2E83"/>
+                </a:solidFill>
+                <a:latin typeface="Open Sans"/>
+                <a:ea typeface="+mn-ea"/>
+                <a:cs typeface="Open Sans"/>
+              </a:defRPr>
+            </a:lvl2pPr>
+            <a:lvl3pPr marL="1143000" indent="-228600" algn="l" defTabSz="457200" rtl="0" eaLnBrk="1" latinLnBrk="0" hangingPunct="1">
+              <a:spcBef>
+                <a:spcPct val="20000"/>
+              </a:spcBef>
+              <a:buSzPct val="100000"/>
+              <a:buFont typeface="Lucida Grande"/>
+              <a:buChar char="&gt;"/>
+              <a:defRPr sz="1800" b="1" i="0" kern="1200" baseline="0">
+                <a:solidFill>
+                  <a:srgbClr val="4B2E83"/>
+                </a:solidFill>
+                <a:latin typeface="Open Sans"/>
+                <a:ea typeface="+mn-ea"/>
+                <a:cs typeface="Open Sans"/>
+              </a:defRPr>
+            </a:lvl3pPr>
+            <a:lvl4pPr marL="1600200" indent="-228600" algn="l" defTabSz="457200" rtl="0" eaLnBrk="1" latinLnBrk="0" hangingPunct="1">
+              <a:spcBef>
+                <a:spcPct val="20000"/>
+              </a:spcBef>
+              <a:buFont typeface="Arial"/>
+              <a:buChar char="–"/>
+              <a:defRPr sz="1600" b="1" i="0" kern="1200" baseline="0">
+                <a:solidFill>
+                  <a:srgbClr val="4B2E83"/>
+                </a:solidFill>
+                <a:latin typeface="Open Sans"/>
+                <a:ea typeface="+mn-ea"/>
+                <a:cs typeface="Open Sans"/>
+              </a:defRPr>
+            </a:lvl4pPr>
+            <a:lvl5pPr marL="2057400" indent="-228600" algn="l" defTabSz="457200" rtl="0" eaLnBrk="1" latinLnBrk="0" hangingPunct="1">
+              <a:spcBef>
+                <a:spcPct val="20000"/>
+              </a:spcBef>
+              <a:buFont typeface="Lucida Grande"/>
+              <a:buChar char="&gt;"/>
+              <a:defRPr sz="1400" b="1" i="0" kern="1200" baseline="0">
+                <a:solidFill>
+                  <a:srgbClr val="4B2E83"/>
+                </a:solidFill>
+                <a:latin typeface="Open Sans"/>
+                <a:ea typeface="+mn-ea"/>
+                <a:cs typeface="Open Sans"/>
+              </a:defRPr>
+            </a:lvl5pPr>
+            <a:lvl6pPr marL="2514600" indent="-228600" algn="l" defTabSz="457200" rtl="0" eaLnBrk="1" latinLnBrk="0" hangingPunct="1">
+              <a:spcBef>
+                <a:spcPct val="20000"/>
+              </a:spcBef>
+              <a:buFont typeface="Arial"/>
+              <a:buChar char="•"/>
+              <a:defRPr sz="2000" kern="1200">
+                <a:solidFill>
+                  <a:schemeClr val="tx1"/>
+                </a:solidFill>
+                <a:latin typeface="+mn-lt"/>
+                <a:ea typeface="+mn-ea"/>
+                <a:cs typeface="+mn-cs"/>
+              </a:defRPr>
+            </a:lvl6pPr>
+            <a:lvl7pPr marL="2971800" indent="-228600" algn="l" defTabSz="457200" rtl="0" eaLnBrk="1" latinLnBrk="0" hangingPunct="1">
+              <a:spcBef>
+                <a:spcPct val="20000"/>
+              </a:spcBef>
+              <a:buFont typeface="Arial"/>
+              <a:buChar char="•"/>
+              <a:defRPr sz="2000" kern="1200">
+                <a:solidFill>
+                  <a:schemeClr val="tx1"/>
+                </a:solidFill>
+                <a:latin typeface="+mn-lt"/>
+                <a:ea typeface="+mn-ea"/>
+                <a:cs typeface="+mn-cs"/>
+              </a:defRPr>
+            </a:lvl7pPr>
+            <a:lvl8pPr marL="3429000" indent="-228600" algn="l" defTabSz="457200" rtl="0" eaLnBrk="1" latinLnBrk="0" hangingPunct="1">
+              <a:spcBef>
+                <a:spcPct val="20000"/>
+              </a:spcBef>
+              <a:buFont typeface="Arial"/>
+              <a:buChar char="•"/>
+              <a:defRPr sz="2000" kern="1200">
+                <a:solidFill>
+                  <a:schemeClr val="tx1"/>
+                </a:solidFill>
+                <a:latin typeface="+mn-lt"/>
+                <a:ea typeface="+mn-ea"/>
+                <a:cs typeface="+mn-cs"/>
+              </a:defRPr>
+            </a:lvl8pPr>
+            <a:lvl9pPr marL="3886200" indent="-228600" algn="l" defTabSz="457200" rtl="0" eaLnBrk="1" latinLnBrk="0" hangingPunct="1">
+              <a:spcBef>
+                <a:spcPct val="20000"/>
+              </a:spcBef>
+              <a:buFont typeface="Arial"/>
+              <a:buChar char="•"/>
+              <a:defRPr sz="2000" kern="1200">
+                <a:solidFill>
+                  <a:schemeClr val="tx1"/>
+                </a:solidFill>
+                <a:latin typeface="+mn-lt"/>
+                <a:ea typeface="+mn-ea"/>
+                <a:cs typeface="+mn-cs"/>
+              </a:defRPr>
+            </a:lvl9pPr>
+          </a:lstStyle>
+          <a:p>
+            <a:r>
+              <a:rPr lang="en-US"/>
+              <a:t>Ridge regression does not set any of the coefficients exactly to zero but can shrink all of them </a:t>
+            </a:r>
+          </a:p>
+          <a:p>
+            <a:pPr lvl="1"/>
+            <a:r>
+              <a:rPr lang="en-US"/>
+              <a:t>Final model still includes all </a:t>
+            </a:r>
+            <a:r>
+              <a:rPr lang="en-US" i="1"/>
+              <a:t>p</a:t>
+            </a:r>
+            <a:r>
+              <a:rPr lang="en-US"/>
+              <a:t> predictors</a:t>
+            </a:r>
+          </a:p>
+          <a:p>
+            <a:r>
+              <a:rPr lang="en-US"/>
+              <a:t>The LASSO regression was developed, inspired by ridge, to provide the </a:t>
+            </a:r>
+            <a:r>
+              <a:rPr lang="en-US" b="0"/>
+              <a:t>possibility</a:t>
+            </a:r>
+            <a:r>
+              <a:rPr lang="en-US"/>
+              <a:t> that some of the coefficients can take a value of zero </a:t>
+            </a:r>
+          </a:p>
+          <a:p>
+            <a:r>
+              <a:rPr lang="en-US"/>
+              <a:t>Like ridge, the LASSO operator is minimized as a function of an adjustable </a:t>
+            </a:r>
+            <a:r>
+              <a:rPr lang="en-US">
+                <a:latin typeface="symbol" charset="2"/>
+              </a:rPr>
+              <a:t>l </a:t>
+            </a:r>
+            <a:r>
+              <a:rPr lang="en-US"/>
+              <a:t>parameter  </a:t>
+            </a:r>
+            <a:endParaRPr lang="en-US" dirty="0"/>
+          </a:p>
+        </p:txBody>
+      </p:sp>
     </p:spTree>
     <p:extLst>
       <p:ext uri="{BB962C8B-B14F-4D97-AF65-F5344CB8AC3E}">
@@ -8650,11 +9532,261 @@
   <p:clrMapOvr>
     <a:masterClrMapping/>
   </p:clrMapOvr>
+  <p:timing>
+    <p:tnLst>
+      <p:par>
+        <p:cTn id="1" dur="indefinite" restart="never" nodeType="tmRoot">
+          <p:childTnLst>
+            <p:seq concurrent="1" nextAc="seek">
+              <p:cTn id="2" dur="indefinite" nodeType="mainSeq">
+                <p:childTnLst>
+                  <p:par>
+                    <p:cTn id="3" fill="hold">
+                      <p:stCondLst>
+                        <p:cond delay="indefinite"/>
+                      </p:stCondLst>
+                      <p:childTnLst>
+                        <p:par>
+                          <p:cTn id="4" fill="hold">
+                            <p:stCondLst>
+                              <p:cond delay="0"/>
+                            </p:stCondLst>
+                            <p:childTnLst>
+                              <p:par>
+                                <p:cTn id="5" presetID="1" presetClass="entr" presetSubtype="0" fill="hold" grpId="0" nodeType="clickEffect">
+                                  <p:stCondLst>
+                                    <p:cond delay="0"/>
+                                  </p:stCondLst>
+                                  <p:childTnLst>
+                                    <p:set>
+                                      <p:cBhvr>
+                                        <p:cTn id="6" dur="1" fill="hold">
+                                          <p:stCondLst>
+                                            <p:cond delay="0"/>
+                                          </p:stCondLst>
+                                        </p:cTn>
+                                        <p:tgtEl>
+                                          <p:spTgt spid="3">
+                                            <p:txEl>
+                                              <p:pRg st="0" end="0"/>
+                                            </p:txEl>
+                                          </p:spTgt>
+                                        </p:tgtEl>
+                                        <p:attrNameLst>
+                                          <p:attrName>style.visibility</p:attrName>
+                                        </p:attrNameLst>
+                                      </p:cBhvr>
+                                      <p:to>
+                                        <p:strVal val="visible"/>
+                                      </p:to>
+                                    </p:set>
+                                  </p:childTnLst>
+                                </p:cTn>
+                              </p:par>
+                              <p:par>
+                                <p:cTn id="7" presetID="1" presetClass="entr" presetSubtype="0" fill="hold" grpId="0" nodeType="withEffect">
+                                  <p:stCondLst>
+                                    <p:cond delay="0"/>
+                                  </p:stCondLst>
+                                  <p:childTnLst>
+                                    <p:set>
+                                      <p:cBhvr>
+                                        <p:cTn id="8" dur="1" fill="hold">
+                                          <p:stCondLst>
+                                            <p:cond delay="0"/>
+                                          </p:stCondLst>
+                                        </p:cTn>
+                                        <p:tgtEl>
+                                          <p:spTgt spid="3">
+                                            <p:txEl>
+                                              <p:pRg st="1" end="1"/>
+                                            </p:txEl>
+                                          </p:spTgt>
+                                        </p:tgtEl>
+                                        <p:attrNameLst>
+                                          <p:attrName>style.visibility</p:attrName>
+                                        </p:attrNameLst>
+                                      </p:cBhvr>
+                                      <p:to>
+                                        <p:strVal val="visible"/>
+                                      </p:to>
+                                    </p:set>
+                                  </p:childTnLst>
+                                </p:cTn>
+                              </p:par>
+                            </p:childTnLst>
+                          </p:cTn>
+                        </p:par>
+                      </p:childTnLst>
+                    </p:cTn>
+                  </p:par>
+                  <p:par>
+                    <p:cTn id="9" fill="hold">
+                      <p:stCondLst>
+                        <p:cond delay="indefinite"/>
+                      </p:stCondLst>
+                      <p:childTnLst>
+                        <p:par>
+                          <p:cTn id="10" fill="hold">
+                            <p:stCondLst>
+                              <p:cond delay="0"/>
+                            </p:stCondLst>
+                            <p:childTnLst>
+                              <p:par>
+                                <p:cTn id="11" presetID="1" presetClass="entr" presetSubtype="0" fill="hold" grpId="0" nodeType="clickEffect">
+                                  <p:stCondLst>
+                                    <p:cond delay="0"/>
+                                  </p:stCondLst>
+                                  <p:childTnLst>
+                                    <p:set>
+                                      <p:cBhvr>
+                                        <p:cTn id="12" dur="1" fill="hold">
+                                          <p:stCondLst>
+                                            <p:cond delay="0"/>
+                                          </p:stCondLst>
+                                        </p:cTn>
+                                        <p:tgtEl>
+                                          <p:spTgt spid="5"/>
+                                        </p:tgtEl>
+                                        <p:attrNameLst>
+                                          <p:attrName>style.visibility</p:attrName>
+                                        </p:attrNameLst>
+                                      </p:cBhvr>
+                                      <p:to>
+                                        <p:strVal val="visible"/>
+                                      </p:to>
+                                    </p:set>
+                                  </p:childTnLst>
+                                </p:cTn>
+                              </p:par>
+                            </p:childTnLst>
+                          </p:cTn>
+                        </p:par>
+                      </p:childTnLst>
+                    </p:cTn>
+                  </p:par>
+                  <p:par>
+                    <p:cTn id="13" fill="hold">
+                      <p:stCondLst>
+                        <p:cond delay="indefinite"/>
+                      </p:stCondLst>
+                      <p:childTnLst>
+                        <p:par>
+                          <p:cTn id="14" fill="hold">
+                            <p:stCondLst>
+                              <p:cond delay="0"/>
+                            </p:stCondLst>
+                            <p:childTnLst>
+                              <p:par>
+                                <p:cTn id="15" presetID="1" presetClass="entr" presetSubtype="0" fill="hold" grpId="0" nodeType="clickEffect">
+                                  <p:stCondLst>
+                                    <p:cond delay="0"/>
+                                  </p:stCondLst>
+                                  <p:childTnLst>
+                                    <p:set>
+                                      <p:cBhvr>
+                                        <p:cTn id="16" dur="1" fill="hold">
+                                          <p:stCondLst>
+                                            <p:cond delay="0"/>
+                                          </p:stCondLst>
+                                        </p:cTn>
+                                        <p:tgtEl>
+                                          <p:spTgt spid="7"/>
+                                        </p:tgtEl>
+                                        <p:attrNameLst>
+                                          <p:attrName>style.visibility</p:attrName>
+                                        </p:attrNameLst>
+                                      </p:cBhvr>
+                                      <p:to>
+                                        <p:strVal val="visible"/>
+                                      </p:to>
+                                    </p:set>
+                                  </p:childTnLst>
+                                </p:cTn>
+                              </p:par>
+                            </p:childTnLst>
+                          </p:cTn>
+                        </p:par>
+                      </p:childTnLst>
+                    </p:cTn>
+                  </p:par>
+                  <p:par>
+                    <p:cTn id="17" fill="hold">
+                      <p:stCondLst>
+                        <p:cond delay="indefinite"/>
+                      </p:stCondLst>
+                      <p:childTnLst>
+                        <p:par>
+                          <p:cTn id="18" fill="hold">
+                            <p:stCondLst>
+                              <p:cond delay="0"/>
+                            </p:stCondLst>
+                            <p:childTnLst>
+                              <p:par>
+                                <p:cTn id="19" presetID="1" presetClass="entr" presetSubtype="0" fill="hold" nodeType="clickEffect">
+                                  <p:stCondLst>
+                                    <p:cond delay="0"/>
+                                  </p:stCondLst>
+                                  <p:childTnLst>
+                                    <p:set>
+                                      <p:cBhvr>
+                                        <p:cTn id="20" dur="1" fill="hold">
+                                          <p:stCondLst>
+                                            <p:cond delay="0"/>
+                                          </p:stCondLst>
+                                        </p:cTn>
+                                        <p:tgtEl>
+                                          <p:spTgt spid="4"/>
+                                        </p:tgtEl>
+                                        <p:attrNameLst>
+                                          <p:attrName>style.visibility</p:attrName>
+                                        </p:attrNameLst>
+                                      </p:cBhvr>
+                                      <p:to>
+                                        <p:strVal val="visible"/>
+                                      </p:to>
+                                    </p:set>
+                                  </p:childTnLst>
+                                </p:cTn>
+                              </p:par>
+                            </p:childTnLst>
+                          </p:cTn>
+                        </p:par>
+                      </p:childTnLst>
+                    </p:cTn>
+                  </p:par>
+                </p:childTnLst>
+              </p:cTn>
+              <p:prevCondLst>
+                <p:cond evt="onPrev" delay="0">
+                  <p:tgtEl>
+                    <p:sldTgt/>
+                  </p:tgtEl>
+                </p:cond>
+              </p:prevCondLst>
+              <p:nextCondLst>
+                <p:cond evt="onNext" delay="0">
+                  <p:tgtEl>
+                    <p:sldTgt/>
+                  </p:tgtEl>
+                </p:cond>
+              </p:nextCondLst>
+            </p:seq>
+          </p:childTnLst>
+        </p:cTn>
+      </p:par>
+    </p:tnLst>
+    <p:bldLst>
+      <p:bldP spid="3" grpId="0" build="p"/>
+      <p:bldP spid="5" grpId="0"/>
+      <p:bldP spid="7" grpId="0"/>
+    </p:bldLst>
+  </p:timing>
 </p:sld>
 </file>
 
 <file path=ppt/slides/slide37.xml><?xml version="1.0" encoding="utf-8"?>
-<p:sld xmlns:a="http://schemas.openxmlformats.org/drawingml/2006/main" xmlns:r="http://schemas.openxmlformats.org/officeDocument/2006/relationships" xmlns:p="http://schemas.openxmlformats.org/presentationml/2006/main">
+<p:sld xmlns:a="http://schemas.openxmlformats.org/drawingml/2006/main" xmlns:r="http://schemas.openxmlformats.org/officeDocument/2006/relationships" xmlns:p="http://schemas.openxmlformats.org/presentationml/2006/main" show="0">
   <p:cSld>
     <p:spTree>
       <p:nvGrpSpPr>
@@ -8776,7 +9908,7 @@
 </file>
 
 <file path=ppt/slides/slide38.xml><?xml version="1.0" encoding="utf-8"?>
-<p:sld xmlns:a="http://schemas.openxmlformats.org/drawingml/2006/main" xmlns:r="http://schemas.openxmlformats.org/officeDocument/2006/relationships" xmlns:p="http://schemas.openxmlformats.org/presentationml/2006/main">
+<p:sld xmlns:a="http://schemas.openxmlformats.org/drawingml/2006/main" xmlns:r="http://schemas.openxmlformats.org/officeDocument/2006/relationships" xmlns:p="http://schemas.openxmlformats.org/presentationml/2006/main" show="0">
   <p:cSld>
     <p:spTree>
       <p:nvGrpSpPr>

</xml_diff>